<commit_message>
Retouches du powerpoint (1)
</commit_message>
<xml_diff>
--- a/Cloud Computing - F.pptx
+++ b/Cloud Computing - F.pptx
@@ -944,7 +944,7 @@
           <a:noFill/>
           <a:extLst>
             <a:ext uri="{909E8E84-426E-40dd-AFC4-6F175D3DCCD1}">
-              <a14:hiddenFill xmlns="" xmlns:a14="http://schemas.microsoft.com/office/drawing/2010/main">
+              <a14:hiddenFill xmlns:a14="http://schemas.microsoft.com/office/drawing/2010/main" xmlns="">
                 <a:solidFill>
                   <a:srgbClr val="FFFFFF"/>
                 </a:solidFill>
@@ -1003,7 +1003,7 @@
             </a:ln>
             <a:extLst>
               <a:ext uri="{91240B29-F687-4f45-9708-019B960494DF}">
-                <a14:hiddenLine xmlns="" xmlns:a14="http://schemas.microsoft.com/office/drawing/2010/main" w="9525">
+                <a14:hiddenLine xmlns:a14="http://schemas.microsoft.com/office/drawing/2010/main" xmlns="" w="9525">
                   <a:solidFill>
                     <a:srgbClr val="000000"/>
                   </a:solidFill>
@@ -1093,7 +1093,7 @@
             </a:ln>
             <a:extLst>
               <a:ext uri="{91240B29-F687-4f45-9708-019B960494DF}">
-                <a14:hiddenLine xmlns="" xmlns:a14="http://schemas.microsoft.com/office/drawing/2010/main" w="9525">
+                <a14:hiddenLine xmlns:a14="http://schemas.microsoft.com/office/drawing/2010/main" xmlns="" w="9525">
                   <a:solidFill>
                     <a:srgbClr val="000000"/>
                   </a:solidFill>
@@ -1183,7 +1183,7 @@
             </a:ln>
             <a:extLst>
               <a:ext uri="{91240B29-F687-4f45-9708-019B960494DF}">
-                <a14:hiddenLine xmlns="" xmlns:a14="http://schemas.microsoft.com/office/drawing/2010/main" w="9525">
+                <a14:hiddenLine xmlns:a14="http://schemas.microsoft.com/office/drawing/2010/main" xmlns="" w="9525">
                   <a:solidFill>
                     <a:srgbClr val="000000"/>
                   </a:solidFill>
@@ -1217,7 +1217,7 @@
             </a:ln>
             <a:extLst>
               <a:ext uri="{91240B29-F687-4f45-9708-019B960494DF}">
-                <a14:hiddenLine xmlns="" xmlns:a14="http://schemas.microsoft.com/office/drawing/2010/main" w="9525">
+                <a14:hiddenLine xmlns:a14="http://schemas.microsoft.com/office/drawing/2010/main" xmlns="" w="9525">
                   <a:solidFill>
                     <a:srgbClr val="000000"/>
                   </a:solidFill>
@@ -1307,7 +1307,7 @@
             </a:ln>
             <a:extLst>
               <a:ext uri="{91240B29-F687-4f45-9708-019B960494DF}">
-                <a14:hiddenLine xmlns="" xmlns:a14="http://schemas.microsoft.com/office/drawing/2010/main" w="9525">
+                <a14:hiddenLine xmlns:a14="http://schemas.microsoft.com/office/drawing/2010/main" xmlns="" w="9525">
                   <a:solidFill>
                     <a:srgbClr val="000000"/>
                   </a:solidFill>
@@ -1369,7 +1369,7 @@
             </a:ln>
             <a:extLst>
               <a:ext uri="{91240B29-F687-4f45-9708-019B960494DF}">
-                <a14:hiddenLine xmlns="" xmlns:a14="http://schemas.microsoft.com/office/drawing/2010/main" w="9525">
+                <a14:hiddenLine xmlns:a14="http://schemas.microsoft.com/office/drawing/2010/main" xmlns="" w="9525">
                   <a:solidFill>
                     <a:srgbClr val="000000"/>
                   </a:solidFill>
@@ -1431,7 +1431,7 @@
             </a:ln>
             <a:extLst>
               <a:ext uri="{91240B29-F687-4f45-9708-019B960494DF}">
-                <a14:hiddenLine xmlns="" xmlns:a14="http://schemas.microsoft.com/office/drawing/2010/main" w="9525">
+                <a14:hiddenLine xmlns:a14="http://schemas.microsoft.com/office/drawing/2010/main" xmlns="" w="9525">
                   <a:solidFill>
                     <a:srgbClr val="000000"/>
                   </a:solidFill>
@@ -1521,7 +1521,7 @@
             </a:ln>
             <a:extLst>
               <a:ext uri="{91240B29-F687-4f45-9708-019B960494DF}">
-                <a14:hiddenLine xmlns="" xmlns:a14="http://schemas.microsoft.com/office/drawing/2010/main" w="9525">
+                <a14:hiddenLine xmlns:a14="http://schemas.microsoft.com/office/drawing/2010/main" xmlns="" w="9525">
                   <a:solidFill>
                     <a:srgbClr val="000000"/>
                   </a:solidFill>
@@ -1583,7 +1583,7 @@
             </a:ln>
             <a:extLst>
               <a:ext uri="{91240B29-F687-4f45-9708-019B960494DF}">
-                <a14:hiddenLine xmlns="" xmlns:a14="http://schemas.microsoft.com/office/drawing/2010/main" w="9525">
+                <a14:hiddenLine xmlns:a14="http://schemas.microsoft.com/office/drawing/2010/main" xmlns="" w="9525">
                   <a:solidFill>
                     <a:srgbClr val="000000"/>
                   </a:solidFill>
@@ -1645,7 +1645,7 @@
             </a:ln>
             <a:extLst>
               <a:ext uri="{91240B29-F687-4f45-9708-019B960494DF}">
-                <a14:hiddenLine xmlns="" xmlns:a14="http://schemas.microsoft.com/office/drawing/2010/main" w="9525">
+                <a14:hiddenLine xmlns:a14="http://schemas.microsoft.com/office/drawing/2010/main" xmlns="" w="9525">
                   <a:solidFill>
                     <a:srgbClr val="000000"/>
                   </a:solidFill>
@@ -1735,7 +1735,7 @@
             </a:ln>
             <a:extLst>
               <a:ext uri="{91240B29-F687-4f45-9708-019B960494DF}">
-                <a14:hiddenLine xmlns="" xmlns:a14="http://schemas.microsoft.com/office/drawing/2010/main" w="9525">
+                <a14:hiddenLine xmlns:a14="http://schemas.microsoft.com/office/drawing/2010/main" xmlns="" w="9525">
                   <a:solidFill>
                     <a:srgbClr val="000000"/>
                   </a:solidFill>
@@ -1825,7 +1825,7 @@
             </a:ln>
             <a:extLst>
               <a:ext uri="{91240B29-F687-4f45-9708-019B960494DF}">
-                <a14:hiddenLine xmlns="" xmlns:a14="http://schemas.microsoft.com/office/drawing/2010/main" w="9525">
+                <a14:hiddenLine xmlns:a14="http://schemas.microsoft.com/office/drawing/2010/main" xmlns="" w="9525">
                   <a:solidFill>
                     <a:srgbClr val="000000"/>
                   </a:solidFill>
@@ -1887,7 +1887,7 @@
             </a:ln>
             <a:extLst>
               <a:ext uri="{91240B29-F687-4f45-9708-019B960494DF}">
-                <a14:hiddenLine xmlns="" xmlns:a14="http://schemas.microsoft.com/office/drawing/2010/main" w="9525">
+                <a14:hiddenLine xmlns:a14="http://schemas.microsoft.com/office/drawing/2010/main" xmlns="" w="9525">
                   <a:solidFill>
                     <a:srgbClr val="000000"/>
                   </a:solidFill>
@@ -1997,7 +1997,7 @@
             </a:ln>
             <a:extLst>
               <a:ext uri="{91240B29-F687-4f45-9708-019B960494DF}">
-                <a14:hiddenLine xmlns="" xmlns:a14="http://schemas.microsoft.com/office/drawing/2010/main" w="9525">
+                <a14:hiddenLine xmlns:a14="http://schemas.microsoft.com/office/drawing/2010/main" xmlns="" w="9525">
                   <a:solidFill>
                     <a:srgbClr val="000000"/>
                   </a:solidFill>
@@ -2059,7 +2059,7 @@
             </a:ln>
             <a:extLst>
               <a:ext uri="{91240B29-F687-4f45-9708-019B960494DF}">
-                <a14:hiddenLine xmlns="" xmlns:a14="http://schemas.microsoft.com/office/drawing/2010/main" w="9525">
+                <a14:hiddenLine xmlns:a14="http://schemas.microsoft.com/office/drawing/2010/main" xmlns="" w="9525">
                   <a:solidFill>
                     <a:srgbClr val="000000"/>
                   </a:solidFill>
@@ -2149,7 +2149,7 @@
             </a:ln>
             <a:extLst>
               <a:ext uri="{91240B29-F687-4f45-9708-019B960494DF}">
-                <a14:hiddenLine xmlns="" xmlns:a14="http://schemas.microsoft.com/office/drawing/2010/main" w="9525">
+                <a14:hiddenLine xmlns:a14="http://schemas.microsoft.com/office/drawing/2010/main" xmlns="" w="9525">
                   <a:solidFill>
                     <a:srgbClr val="000000"/>
                   </a:solidFill>
@@ -2239,7 +2239,7 @@
             </a:ln>
             <a:extLst>
               <a:ext uri="{91240B29-F687-4f45-9708-019B960494DF}">
-                <a14:hiddenLine xmlns="" xmlns:a14="http://schemas.microsoft.com/office/drawing/2010/main" w="9525">
+                <a14:hiddenLine xmlns:a14="http://schemas.microsoft.com/office/drawing/2010/main" xmlns="" w="9525">
                   <a:solidFill>
                     <a:srgbClr val="000000"/>
                   </a:solidFill>
@@ -2301,7 +2301,7 @@
             </a:ln>
             <a:extLst>
               <a:ext uri="{91240B29-F687-4f45-9708-019B960494DF}">
-                <a14:hiddenLine xmlns="" xmlns:a14="http://schemas.microsoft.com/office/drawing/2010/main" w="9525">
+                <a14:hiddenLine xmlns:a14="http://schemas.microsoft.com/office/drawing/2010/main" xmlns="" w="9525">
                   <a:solidFill>
                     <a:srgbClr val="000000"/>
                   </a:solidFill>
@@ -2391,7 +2391,7 @@
             </a:ln>
             <a:extLst>
               <a:ext uri="{91240B29-F687-4f45-9708-019B960494DF}">
-                <a14:hiddenLine xmlns="" xmlns:a14="http://schemas.microsoft.com/office/drawing/2010/main" w="9525">
+                <a14:hiddenLine xmlns:a14="http://schemas.microsoft.com/office/drawing/2010/main" xmlns="" w="9525">
                   <a:solidFill>
                     <a:srgbClr val="000000"/>
                   </a:solidFill>
@@ -2481,7 +2481,7 @@
             </a:ln>
             <a:extLst>
               <a:ext uri="{91240B29-F687-4f45-9708-019B960494DF}">
-                <a14:hiddenLine xmlns="" xmlns:a14="http://schemas.microsoft.com/office/drawing/2010/main" w="9525">
+                <a14:hiddenLine xmlns:a14="http://schemas.microsoft.com/office/drawing/2010/main" xmlns="" w="9525">
                   <a:solidFill>
                     <a:srgbClr val="000000"/>
                   </a:solidFill>
@@ -2537,7 +2537,7 @@
             </a:ln>
             <a:extLst>
               <a:ext uri="{91240B29-F687-4f45-9708-019B960494DF}">
-                <a14:hiddenLine xmlns="" xmlns:a14="http://schemas.microsoft.com/office/drawing/2010/main" w="9525">
+                <a14:hiddenLine xmlns:a14="http://schemas.microsoft.com/office/drawing/2010/main" xmlns="" w="9525">
                   <a:solidFill>
                     <a:srgbClr val="000000"/>
                   </a:solidFill>
@@ -2627,7 +2627,7 @@
             </a:ln>
             <a:extLst>
               <a:ext uri="{91240B29-F687-4f45-9708-019B960494DF}">
-                <a14:hiddenLine xmlns="" xmlns:a14="http://schemas.microsoft.com/office/drawing/2010/main" w="9525">
+                <a14:hiddenLine xmlns:a14="http://schemas.microsoft.com/office/drawing/2010/main" xmlns="" w="9525">
                   <a:solidFill>
                     <a:srgbClr val="000000"/>
                   </a:solidFill>
@@ -2683,7 +2683,7 @@
             </a:ln>
             <a:extLst>
               <a:ext uri="{91240B29-F687-4f45-9708-019B960494DF}">
-                <a14:hiddenLine xmlns="" xmlns:a14="http://schemas.microsoft.com/office/drawing/2010/main" w="9525">
+                <a14:hiddenLine xmlns:a14="http://schemas.microsoft.com/office/drawing/2010/main" xmlns="" w="9525">
                   <a:solidFill>
                     <a:srgbClr val="000000"/>
                   </a:solidFill>
@@ -2773,7 +2773,7 @@
             </a:ln>
             <a:extLst>
               <a:ext uri="{91240B29-F687-4f45-9708-019B960494DF}">
-                <a14:hiddenLine xmlns="" xmlns:a14="http://schemas.microsoft.com/office/drawing/2010/main" w="9525">
+                <a14:hiddenLine xmlns:a14="http://schemas.microsoft.com/office/drawing/2010/main" xmlns="" w="9525">
                   <a:solidFill>
                     <a:srgbClr val="000000"/>
                   </a:solidFill>
@@ -2841,7 +2841,7 @@
             </a:ln>
             <a:extLst>
               <a:ext uri="{91240B29-F687-4f45-9708-019B960494DF}">
-                <a14:hiddenLine xmlns="" xmlns:a14="http://schemas.microsoft.com/office/drawing/2010/main" w="9525">
+                <a14:hiddenLine xmlns:a14="http://schemas.microsoft.com/office/drawing/2010/main" xmlns="" w="9525">
                   <a:solidFill>
                     <a:srgbClr val="000000"/>
                   </a:solidFill>
@@ -2931,7 +2931,7 @@
             </a:ln>
             <a:extLst>
               <a:ext uri="{91240B29-F687-4f45-9708-019B960494DF}">
-                <a14:hiddenLine xmlns="" xmlns:a14="http://schemas.microsoft.com/office/drawing/2010/main" w="9525">
+                <a14:hiddenLine xmlns:a14="http://schemas.microsoft.com/office/drawing/2010/main" xmlns="" w="9525">
                   <a:solidFill>
                     <a:srgbClr val="000000"/>
                   </a:solidFill>
@@ -2999,7 +2999,7 @@
             </a:ln>
             <a:extLst>
               <a:ext uri="{91240B29-F687-4f45-9708-019B960494DF}">
-                <a14:hiddenLine xmlns="" xmlns:a14="http://schemas.microsoft.com/office/drawing/2010/main" w="9525">
+                <a14:hiddenLine xmlns:a14="http://schemas.microsoft.com/office/drawing/2010/main" xmlns="" w="9525">
                   <a:solidFill>
                     <a:srgbClr val="000000"/>
                   </a:solidFill>
@@ -3089,7 +3089,7 @@
             </a:ln>
             <a:extLst>
               <a:ext uri="{91240B29-F687-4f45-9708-019B960494DF}">
-                <a14:hiddenLine xmlns="" xmlns:a14="http://schemas.microsoft.com/office/drawing/2010/main" w="9525">
+                <a14:hiddenLine xmlns:a14="http://schemas.microsoft.com/office/drawing/2010/main" xmlns="" w="9525">
                   <a:solidFill>
                     <a:srgbClr val="000000"/>
                   </a:solidFill>
@@ -3123,7 +3123,7 @@
             </a:ln>
             <a:extLst>
               <a:ext uri="{91240B29-F687-4f45-9708-019B960494DF}">
-                <a14:hiddenLine xmlns="" xmlns:a14="http://schemas.microsoft.com/office/drawing/2010/main" w="9525">
+                <a14:hiddenLine xmlns:a14="http://schemas.microsoft.com/office/drawing/2010/main" xmlns="" w="9525">
                   <a:solidFill>
                     <a:srgbClr val="000000"/>
                   </a:solidFill>
@@ -3213,7 +3213,7 @@
             </a:ln>
             <a:extLst>
               <a:ext uri="{91240B29-F687-4f45-9708-019B960494DF}">
-                <a14:hiddenLine xmlns="" xmlns:a14="http://schemas.microsoft.com/office/drawing/2010/main" w="9525">
+                <a14:hiddenLine xmlns:a14="http://schemas.microsoft.com/office/drawing/2010/main" xmlns="" w="9525">
                   <a:solidFill>
                     <a:srgbClr val="000000"/>
                   </a:solidFill>
@@ -3275,7 +3275,7 @@
             </a:ln>
             <a:extLst>
               <a:ext uri="{91240B29-F687-4f45-9708-019B960494DF}">
-                <a14:hiddenLine xmlns="" xmlns:a14="http://schemas.microsoft.com/office/drawing/2010/main" w="9525">
+                <a14:hiddenLine xmlns:a14="http://schemas.microsoft.com/office/drawing/2010/main" xmlns="" w="9525">
                   <a:solidFill>
                     <a:srgbClr val="000000"/>
                   </a:solidFill>
@@ -3337,7 +3337,7 @@
             </a:ln>
             <a:extLst>
               <a:ext uri="{91240B29-F687-4f45-9708-019B960494DF}">
-                <a14:hiddenLine xmlns="" xmlns:a14="http://schemas.microsoft.com/office/drawing/2010/main" w="9525">
+                <a14:hiddenLine xmlns:a14="http://schemas.microsoft.com/office/drawing/2010/main" xmlns="" w="9525">
                   <a:solidFill>
                     <a:srgbClr val="000000"/>
                   </a:solidFill>
@@ -3427,7 +3427,7 @@
             </a:ln>
             <a:extLst>
               <a:ext uri="{91240B29-F687-4f45-9708-019B960494DF}">
-                <a14:hiddenLine xmlns="" xmlns:a14="http://schemas.microsoft.com/office/drawing/2010/main" w="9525">
+                <a14:hiddenLine xmlns:a14="http://schemas.microsoft.com/office/drawing/2010/main" xmlns="" w="9525">
                   <a:solidFill>
                     <a:srgbClr val="000000"/>
                   </a:solidFill>
@@ -3495,7 +3495,7 @@
             </a:ln>
             <a:extLst>
               <a:ext uri="{91240B29-F687-4f45-9708-019B960494DF}">
-                <a14:hiddenLine xmlns="" xmlns:a14="http://schemas.microsoft.com/office/drawing/2010/main" w="9525">
+                <a14:hiddenLine xmlns:a14="http://schemas.microsoft.com/office/drawing/2010/main" xmlns="" w="9525">
                   <a:solidFill>
                     <a:srgbClr val="000000"/>
                   </a:solidFill>
@@ -3557,7 +3557,7 @@
             </a:ln>
             <a:extLst>
               <a:ext uri="{91240B29-F687-4f45-9708-019B960494DF}">
-                <a14:hiddenLine xmlns="" xmlns:a14="http://schemas.microsoft.com/office/drawing/2010/main" w="9525">
+                <a14:hiddenLine xmlns:a14="http://schemas.microsoft.com/office/drawing/2010/main" xmlns="" w="9525">
                   <a:solidFill>
                     <a:srgbClr val="000000"/>
                   </a:solidFill>
@@ -3647,7 +3647,7 @@
             </a:ln>
             <a:extLst>
               <a:ext uri="{91240B29-F687-4f45-9708-019B960494DF}">
-                <a14:hiddenLine xmlns="" xmlns:a14="http://schemas.microsoft.com/office/drawing/2010/main" w="9525">
+                <a14:hiddenLine xmlns:a14="http://schemas.microsoft.com/office/drawing/2010/main" xmlns="" w="9525">
                   <a:solidFill>
                     <a:srgbClr val="000000"/>
                   </a:solidFill>
@@ -3709,7 +3709,7 @@
             </a:ln>
             <a:extLst>
               <a:ext uri="{91240B29-F687-4f45-9708-019B960494DF}">
-                <a14:hiddenLine xmlns="" xmlns:a14="http://schemas.microsoft.com/office/drawing/2010/main" w="9525">
+                <a14:hiddenLine xmlns:a14="http://schemas.microsoft.com/office/drawing/2010/main" xmlns="" w="9525">
                   <a:solidFill>
                     <a:srgbClr val="000000"/>
                   </a:solidFill>
@@ -3799,7 +3799,7 @@
             </a:ln>
             <a:extLst>
               <a:ext uri="{91240B29-F687-4f45-9708-019B960494DF}">
-                <a14:hiddenLine xmlns="" xmlns:a14="http://schemas.microsoft.com/office/drawing/2010/main" w="9525">
+                <a14:hiddenLine xmlns:a14="http://schemas.microsoft.com/office/drawing/2010/main" xmlns="" w="9525">
                   <a:solidFill>
                     <a:srgbClr val="000000"/>
                   </a:solidFill>
@@ -3861,7 +3861,7 @@
             </a:ln>
             <a:extLst>
               <a:ext uri="{91240B29-F687-4f45-9708-019B960494DF}">
-                <a14:hiddenLine xmlns="" xmlns:a14="http://schemas.microsoft.com/office/drawing/2010/main" w="9525">
+                <a14:hiddenLine xmlns:a14="http://schemas.microsoft.com/office/drawing/2010/main" xmlns="" w="9525">
                   <a:solidFill>
                     <a:srgbClr val="000000"/>
                   </a:solidFill>
@@ -3951,7 +3951,7 @@
             </a:ln>
             <a:extLst>
               <a:ext uri="{91240B29-F687-4f45-9708-019B960494DF}">
-                <a14:hiddenLine xmlns="" xmlns:a14="http://schemas.microsoft.com/office/drawing/2010/main" w="9525">
+                <a14:hiddenLine xmlns:a14="http://schemas.microsoft.com/office/drawing/2010/main" xmlns="" w="9525">
                   <a:solidFill>
                     <a:srgbClr val="000000"/>
                   </a:solidFill>
@@ -3985,7 +3985,7 @@
             </a:ln>
             <a:extLst>
               <a:ext uri="{91240B29-F687-4f45-9708-019B960494DF}">
-                <a14:hiddenLine xmlns="" xmlns:a14="http://schemas.microsoft.com/office/drawing/2010/main" w="9525">
+                <a14:hiddenLine xmlns:a14="http://schemas.microsoft.com/office/drawing/2010/main" xmlns="" w="9525">
                   <a:solidFill>
                     <a:srgbClr val="000000"/>
                   </a:solidFill>
@@ -4050,7 +4050,7 @@
             </a:ln>
             <a:extLst>
               <a:ext uri="{91240B29-F687-4f45-9708-019B960494DF}">
-                <a14:hiddenLine xmlns="" xmlns:a14="http://schemas.microsoft.com/office/drawing/2010/main" w="9525">
+                <a14:hiddenLine xmlns:a14="http://schemas.microsoft.com/office/drawing/2010/main" xmlns="" w="9525">
                   <a:solidFill>
                     <a:srgbClr val="000000"/>
                   </a:solidFill>
@@ -4140,7 +4140,7 @@
             </a:ln>
             <a:extLst>
               <a:ext uri="{91240B29-F687-4f45-9708-019B960494DF}">
-                <a14:hiddenLine xmlns="" xmlns:a14="http://schemas.microsoft.com/office/drawing/2010/main" w="9525">
+                <a14:hiddenLine xmlns:a14="http://schemas.microsoft.com/office/drawing/2010/main" xmlns="" w="9525">
                   <a:solidFill>
                     <a:srgbClr val="000000"/>
                   </a:solidFill>
@@ -4202,7 +4202,7 @@
             </a:ln>
             <a:extLst>
               <a:ext uri="{91240B29-F687-4f45-9708-019B960494DF}">
-                <a14:hiddenLine xmlns="" xmlns:a14="http://schemas.microsoft.com/office/drawing/2010/main" w="9525">
+                <a14:hiddenLine xmlns:a14="http://schemas.microsoft.com/office/drawing/2010/main" xmlns="" w="9525">
                   <a:solidFill>
                     <a:srgbClr val="000000"/>
                   </a:solidFill>
@@ -4292,7 +4292,7 @@
             </a:ln>
             <a:extLst>
               <a:ext uri="{91240B29-F687-4f45-9708-019B960494DF}">
-                <a14:hiddenLine xmlns="" xmlns:a14="http://schemas.microsoft.com/office/drawing/2010/main" w="9525">
+                <a14:hiddenLine xmlns:a14="http://schemas.microsoft.com/office/drawing/2010/main" xmlns="" w="9525">
                   <a:solidFill>
                     <a:srgbClr val="000000"/>
                   </a:solidFill>
@@ -4382,7 +4382,7 @@
             </a:ln>
             <a:extLst>
               <a:ext uri="{91240B29-F687-4f45-9708-019B960494DF}">
-                <a14:hiddenLine xmlns="" xmlns:a14="http://schemas.microsoft.com/office/drawing/2010/main" w="9525">
+                <a14:hiddenLine xmlns:a14="http://schemas.microsoft.com/office/drawing/2010/main" xmlns="" w="9525">
                   <a:solidFill>
                     <a:srgbClr val="000000"/>
                   </a:solidFill>
@@ -4447,7 +4447,7 @@
             </a:ln>
             <a:extLst>
               <a:ext uri="{91240B29-F687-4f45-9708-019B960494DF}">
-                <a14:hiddenLine xmlns="" xmlns:a14="http://schemas.microsoft.com/office/drawing/2010/main" w="9525">
+                <a14:hiddenLine xmlns:a14="http://schemas.microsoft.com/office/drawing/2010/main" xmlns="" w="9525">
                   <a:solidFill>
                     <a:srgbClr val="000000"/>
                   </a:solidFill>
@@ -4509,7 +4509,7 @@
             </a:ln>
             <a:extLst>
               <a:ext uri="{91240B29-F687-4f45-9708-019B960494DF}">
-                <a14:hiddenLine xmlns="" xmlns:a14="http://schemas.microsoft.com/office/drawing/2010/main" w="9525">
+                <a14:hiddenLine xmlns:a14="http://schemas.microsoft.com/office/drawing/2010/main" xmlns="" w="9525">
                   <a:solidFill>
                     <a:srgbClr val="000000"/>
                   </a:solidFill>
@@ -4599,7 +4599,7 @@
             </a:ln>
             <a:extLst>
               <a:ext uri="{91240B29-F687-4f45-9708-019B960494DF}">
-                <a14:hiddenLine xmlns="" xmlns:a14="http://schemas.microsoft.com/office/drawing/2010/main" w="9525">
+                <a14:hiddenLine xmlns:a14="http://schemas.microsoft.com/office/drawing/2010/main" xmlns="" w="9525">
                   <a:solidFill>
                     <a:srgbClr val="000000"/>
                   </a:solidFill>
@@ -4689,7 +4689,7 @@
             </a:ln>
             <a:extLst>
               <a:ext uri="{91240B29-F687-4f45-9708-019B960494DF}">
-                <a14:hiddenLine xmlns="" xmlns:a14="http://schemas.microsoft.com/office/drawing/2010/main" w="9525">
+                <a14:hiddenLine xmlns:a14="http://schemas.microsoft.com/office/drawing/2010/main" xmlns="" w="9525">
                   <a:solidFill>
                     <a:srgbClr val="000000"/>
                   </a:solidFill>
@@ -4751,7 +4751,7 @@
             </a:ln>
             <a:extLst>
               <a:ext uri="{91240B29-F687-4f45-9708-019B960494DF}">
-                <a14:hiddenLine xmlns="" xmlns:a14="http://schemas.microsoft.com/office/drawing/2010/main" w="9525">
+                <a14:hiddenLine xmlns:a14="http://schemas.microsoft.com/office/drawing/2010/main" xmlns="" w="9525">
                   <a:solidFill>
                     <a:srgbClr val="000000"/>
                   </a:solidFill>
@@ -4871,7 +4871,7 @@
             </a:ln>
             <a:extLst>
               <a:ext uri="{91240B29-F687-4f45-9708-019B960494DF}">
-                <a14:hiddenLine xmlns="" xmlns:a14="http://schemas.microsoft.com/office/drawing/2010/main" w="9525">
+                <a14:hiddenLine xmlns:a14="http://schemas.microsoft.com/office/drawing/2010/main" xmlns="" w="9525">
                   <a:solidFill>
                     <a:srgbClr val="000000"/>
                   </a:solidFill>
@@ -4939,7 +4939,7 @@
             </a:ln>
             <a:extLst>
               <a:ext uri="{91240B29-F687-4f45-9708-019B960494DF}">
-                <a14:hiddenLine xmlns="" xmlns:a14="http://schemas.microsoft.com/office/drawing/2010/main" w="9525">
+                <a14:hiddenLine xmlns:a14="http://schemas.microsoft.com/office/drawing/2010/main" xmlns="" w="9525">
                   <a:solidFill>
                     <a:srgbClr val="000000"/>
                   </a:solidFill>
@@ -5029,7 +5029,7 @@
             </a:ln>
             <a:extLst>
               <a:ext uri="{91240B29-F687-4f45-9708-019B960494DF}">
-                <a14:hiddenLine xmlns="" xmlns:a14="http://schemas.microsoft.com/office/drawing/2010/main" w="9525">
+                <a14:hiddenLine xmlns:a14="http://schemas.microsoft.com/office/drawing/2010/main" xmlns="" w="9525">
                   <a:solidFill>
                     <a:srgbClr val="000000"/>
                   </a:solidFill>
@@ -9758,7 +9758,7 @@
           <a:noFill/>
           <a:extLst>
             <a:ext uri="{909E8E84-426E-40dd-AFC4-6F175D3DCCD1}">
-              <a14:hiddenFill xmlns="" xmlns:a14="http://schemas.microsoft.com/office/drawing/2010/main">
+              <a14:hiddenFill xmlns:a14="http://schemas.microsoft.com/office/drawing/2010/main" xmlns="">
                 <a:solidFill>
                   <a:srgbClr val="FFFFFF"/>
                 </a:solidFill>
@@ -9832,7 +9832,7 @@
               </a:ln>
               <a:extLst>
                 <a:ext uri="{91240B29-F687-4f45-9708-019B960494DF}">
-                  <a14:hiddenLine xmlns="" xmlns:a14="http://schemas.microsoft.com/office/drawing/2010/main" w="9525">
+                  <a14:hiddenLine xmlns:a14="http://schemas.microsoft.com/office/drawing/2010/main" xmlns="" w="9525">
                     <a:solidFill>
                       <a:srgbClr val="000000"/>
                     </a:solidFill>
@@ -9922,7 +9922,7 @@
               </a:ln>
               <a:extLst>
                 <a:ext uri="{91240B29-F687-4f45-9708-019B960494DF}">
-                  <a14:hiddenLine xmlns="" xmlns:a14="http://schemas.microsoft.com/office/drawing/2010/main" w="9525">
+                  <a14:hiddenLine xmlns:a14="http://schemas.microsoft.com/office/drawing/2010/main" xmlns="" w="9525">
                     <a:solidFill>
                       <a:srgbClr val="000000"/>
                     </a:solidFill>
@@ -10012,7 +10012,7 @@
               </a:ln>
               <a:extLst>
                 <a:ext uri="{91240B29-F687-4f45-9708-019B960494DF}">
-                  <a14:hiddenLine xmlns="" xmlns:a14="http://schemas.microsoft.com/office/drawing/2010/main" w="9525">
+                  <a14:hiddenLine xmlns:a14="http://schemas.microsoft.com/office/drawing/2010/main" xmlns="" w="9525">
                     <a:solidFill>
                       <a:srgbClr val="000000"/>
                     </a:solidFill>
@@ -10074,7 +10074,7 @@
               </a:ln>
               <a:extLst>
                 <a:ext uri="{91240B29-F687-4f45-9708-019B960494DF}">
-                  <a14:hiddenLine xmlns="" xmlns:a14="http://schemas.microsoft.com/office/drawing/2010/main" w="9525">
+                  <a14:hiddenLine xmlns:a14="http://schemas.microsoft.com/office/drawing/2010/main" xmlns="" w="9525">
                     <a:solidFill>
                       <a:srgbClr val="000000"/>
                     </a:solidFill>
@@ -10164,7 +10164,7 @@
               </a:ln>
               <a:extLst>
                 <a:ext uri="{91240B29-F687-4f45-9708-019B960494DF}">
-                  <a14:hiddenLine xmlns="" xmlns:a14="http://schemas.microsoft.com/office/drawing/2010/main" w="9525">
+                  <a14:hiddenLine xmlns:a14="http://schemas.microsoft.com/office/drawing/2010/main" xmlns="" w="9525">
                     <a:solidFill>
                       <a:srgbClr val="000000"/>
                     </a:solidFill>
@@ -10226,7 +10226,7 @@
               </a:ln>
               <a:extLst>
                 <a:ext uri="{91240B29-F687-4f45-9708-019B960494DF}">
-                  <a14:hiddenLine xmlns="" xmlns:a14="http://schemas.microsoft.com/office/drawing/2010/main" w="9525">
+                  <a14:hiddenLine xmlns:a14="http://schemas.microsoft.com/office/drawing/2010/main" xmlns="" w="9525">
                     <a:solidFill>
                       <a:srgbClr val="000000"/>
                     </a:solidFill>
@@ -10288,7 +10288,7 @@
               </a:ln>
               <a:extLst>
                 <a:ext uri="{91240B29-F687-4f45-9708-019B960494DF}">
-                  <a14:hiddenLine xmlns="" xmlns:a14="http://schemas.microsoft.com/office/drawing/2010/main" w="9525">
+                  <a14:hiddenLine xmlns:a14="http://schemas.microsoft.com/office/drawing/2010/main" xmlns="" w="9525">
                     <a:solidFill>
                       <a:srgbClr val="000000"/>
                     </a:solidFill>
@@ -10378,7 +10378,7 @@
               </a:ln>
               <a:extLst>
                 <a:ext uri="{91240B29-F687-4f45-9708-019B960494DF}">
-                  <a14:hiddenLine xmlns="" xmlns:a14="http://schemas.microsoft.com/office/drawing/2010/main" w="9525">
+                  <a14:hiddenLine xmlns:a14="http://schemas.microsoft.com/office/drawing/2010/main" xmlns="" w="9525">
                     <a:solidFill>
                       <a:srgbClr val="000000"/>
                     </a:solidFill>
@@ -10468,7 +10468,7 @@
               </a:ln>
               <a:extLst>
                 <a:ext uri="{91240B29-F687-4f45-9708-019B960494DF}">
-                  <a14:hiddenLine xmlns="" xmlns:a14="http://schemas.microsoft.com/office/drawing/2010/main" w="9525">
+                  <a14:hiddenLine xmlns:a14="http://schemas.microsoft.com/office/drawing/2010/main" xmlns="" w="9525">
                     <a:solidFill>
                       <a:srgbClr val="000000"/>
                     </a:solidFill>
@@ -10530,7 +10530,7 @@
               </a:ln>
               <a:extLst>
                 <a:ext uri="{91240B29-F687-4f45-9708-019B960494DF}">
-                  <a14:hiddenLine xmlns="" xmlns:a14="http://schemas.microsoft.com/office/drawing/2010/main" w="9525">
+                  <a14:hiddenLine xmlns:a14="http://schemas.microsoft.com/office/drawing/2010/main" xmlns="" w="9525">
                     <a:solidFill>
                       <a:srgbClr val="000000"/>
                     </a:solidFill>
@@ -10640,7 +10640,7 @@
               </a:ln>
               <a:extLst>
                 <a:ext uri="{91240B29-F687-4f45-9708-019B960494DF}">
-                  <a14:hiddenLine xmlns="" xmlns:a14="http://schemas.microsoft.com/office/drawing/2010/main" w="9525">
+                  <a14:hiddenLine xmlns:a14="http://schemas.microsoft.com/office/drawing/2010/main" xmlns="" w="9525">
                     <a:solidFill>
                       <a:srgbClr val="000000"/>
                     </a:solidFill>
@@ -10724,7 +10724,7 @@
               </a:ln>
               <a:extLst>
                 <a:ext uri="{91240B29-F687-4f45-9708-019B960494DF}">
-                  <a14:hiddenLine xmlns="" xmlns:a14="http://schemas.microsoft.com/office/drawing/2010/main" w="9525">
+                  <a14:hiddenLine xmlns:a14="http://schemas.microsoft.com/office/drawing/2010/main" xmlns="" w="9525">
                     <a:solidFill>
                       <a:srgbClr val="000000"/>
                     </a:solidFill>
@@ -10786,7 +10786,7 @@
               </a:ln>
               <a:extLst>
                 <a:ext uri="{91240B29-F687-4f45-9708-019B960494DF}">
-                  <a14:hiddenLine xmlns="" xmlns:a14="http://schemas.microsoft.com/office/drawing/2010/main" w="9525">
+                  <a14:hiddenLine xmlns:a14="http://schemas.microsoft.com/office/drawing/2010/main" xmlns="" w="9525">
                     <a:solidFill>
                       <a:srgbClr val="000000"/>
                     </a:solidFill>
@@ -10848,7 +10848,7 @@
               </a:ln>
               <a:extLst>
                 <a:ext uri="{91240B29-F687-4f45-9708-019B960494DF}">
-                  <a14:hiddenLine xmlns="" xmlns:a14="http://schemas.microsoft.com/office/drawing/2010/main" w="9525">
+                  <a14:hiddenLine xmlns:a14="http://schemas.microsoft.com/office/drawing/2010/main" xmlns="" w="9525">
                     <a:solidFill>
                       <a:srgbClr val="000000"/>
                     </a:solidFill>
@@ -10938,7 +10938,7 @@
               </a:ln>
               <a:extLst>
                 <a:ext uri="{91240B29-F687-4f45-9708-019B960494DF}">
-                  <a14:hiddenLine xmlns="" xmlns:a14="http://schemas.microsoft.com/office/drawing/2010/main" w="9525">
+                  <a14:hiddenLine xmlns:a14="http://schemas.microsoft.com/office/drawing/2010/main" xmlns="" w="9525">
                     <a:solidFill>
                       <a:srgbClr val="000000"/>
                     </a:solidFill>
@@ -10972,7 +10972,7 @@
               </a:ln>
               <a:extLst>
                 <a:ext uri="{91240B29-F687-4f45-9708-019B960494DF}">
-                  <a14:hiddenLine xmlns="" xmlns:a14="http://schemas.microsoft.com/office/drawing/2010/main" w="9525">
+                  <a14:hiddenLine xmlns:a14="http://schemas.microsoft.com/office/drawing/2010/main" xmlns="" w="9525">
                     <a:solidFill>
                       <a:srgbClr val="000000"/>
                     </a:solidFill>
@@ -11037,7 +11037,7 @@
               </a:ln>
               <a:extLst>
                 <a:ext uri="{91240B29-F687-4f45-9708-019B960494DF}">
-                  <a14:hiddenLine xmlns="" xmlns:a14="http://schemas.microsoft.com/office/drawing/2010/main" w="9525">
+                  <a14:hiddenLine xmlns:a14="http://schemas.microsoft.com/office/drawing/2010/main" xmlns="" w="9525">
                     <a:solidFill>
                       <a:srgbClr val="000000"/>
                     </a:solidFill>
@@ -11127,7 +11127,7 @@
               </a:ln>
               <a:extLst>
                 <a:ext uri="{91240B29-F687-4f45-9708-019B960494DF}">
-                  <a14:hiddenLine xmlns="" xmlns:a14="http://schemas.microsoft.com/office/drawing/2010/main" w="9525">
+                  <a14:hiddenLine xmlns:a14="http://schemas.microsoft.com/office/drawing/2010/main" xmlns="" w="9525">
                     <a:solidFill>
                       <a:srgbClr val="000000"/>
                     </a:solidFill>
@@ -11189,7 +11189,7 @@
               </a:ln>
               <a:extLst>
                 <a:ext uri="{91240B29-F687-4f45-9708-019B960494DF}">
-                  <a14:hiddenLine xmlns="" xmlns:a14="http://schemas.microsoft.com/office/drawing/2010/main" w="9525">
+                  <a14:hiddenLine xmlns:a14="http://schemas.microsoft.com/office/drawing/2010/main" xmlns="" w="9525">
                     <a:solidFill>
                       <a:srgbClr val="000000"/>
                     </a:solidFill>
@@ -11279,7 +11279,7 @@
               </a:ln>
               <a:extLst>
                 <a:ext uri="{91240B29-F687-4f45-9708-019B960494DF}">
-                  <a14:hiddenLine xmlns="" xmlns:a14="http://schemas.microsoft.com/office/drawing/2010/main" w="9525">
+                  <a14:hiddenLine xmlns:a14="http://schemas.microsoft.com/office/drawing/2010/main" xmlns="" w="9525">
                     <a:solidFill>
                       <a:srgbClr val="000000"/>
                     </a:solidFill>
@@ -11344,7 +11344,7 @@
               </a:ln>
               <a:extLst>
                 <a:ext uri="{91240B29-F687-4f45-9708-019B960494DF}">
-                  <a14:hiddenLine xmlns="" xmlns:a14="http://schemas.microsoft.com/office/drawing/2010/main" w="9525">
+                  <a14:hiddenLine xmlns:a14="http://schemas.microsoft.com/office/drawing/2010/main" xmlns="" w="9525">
                     <a:solidFill>
                       <a:srgbClr val="000000"/>
                     </a:solidFill>
@@ -11406,7 +11406,7 @@
               </a:ln>
               <a:extLst>
                 <a:ext uri="{91240B29-F687-4f45-9708-019B960494DF}">
-                  <a14:hiddenLine xmlns="" xmlns:a14="http://schemas.microsoft.com/office/drawing/2010/main" w="9525">
+                  <a14:hiddenLine xmlns:a14="http://schemas.microsoft.com/office/drawing/2010/main" xmlns="" w="9525">
                     <a:solidFill>
                       <a:srgbClr val="000000"/>
                     </a:solidFill>
@@ -11496,7 +11496,7 @@
               </a:ln>
               <a:extLst>
                 <a:ext uri="{91240B29-F687-4f45-9708-019B960494DF}">
-                  <a14:hiddenLine xmlns="" xmlns:a14="http://schemas.microsoft.com/office/drawing/2010/main" w="9525">
+                  <a14:hiddenLine xmlns:a14="http://schemas.microsoft.com/office/drawing/2010/main" xmlns="" w="9525">
                     <a:solidFill>
                       <a:srgbClr val="000000"/>
                     </a:solidFill>
@@ -11586,7 +11586,7 @@
               </a:ln>
               <a:extLst>
                 <a:ext uri="{91240B29-F687-4f45-9708-019B960494DF}">
-                  <a14:hiddenLine xmlns="" xmlns:a14="http://schemas.microsoft.com/office/drawing/2010/main" w="9525">
+                  <a14:hiddenLine xmlns:a14="http://schemas.microsoft.com/office/drawing/2010/main" xmlns="" w="9525">
                     <a:solidFill>
                       <a:srgbClr val="000000"/>
                     </a:solidFill>
@@ -11651,7 +11651,7 @@
               </a:ln>
               <a:extLst>
                 <a:ext uri="{91240B29-F687-4f45-9708-019B960494DF}">
-                  <a14:hiddenLine xmlns="" xmlns:a14="http://schemas.microsoft.com/office/drawing/2010/main" w="9525">
+                  <a14:hiddenLine xmlns:a14="http://schemas.microsoft.com/office/drawing/2010/main" xmlns="" w="9525">
                     <a:solidFill>
                       <a:srgbClr val="000000"/>
                     </a:solidFill>
@@ -11771,7 +11771,7 @@
               </a:ln>
               <a:extLst>
                 <a:ext uri="{91240B29-F687-4f45-9708-019B960494DF}">
-                  <a14:hiddenLine xmlns="" xmlns:a14="http://schemas.microsoft.com/office/drawing/2010/main" w="9525">
+                  <a14:hiddenLine xmlns:a14="http://schemas.microsoft.com/office/drawing/2010/main" xmlns="" w="9525">
                     <a:solidFill>
                       <a:srgbClr val="000000"/>
                     </a:solidFill>
@@ -11852,7 +11852,7 @@
               </a:ln>
               <a:extLst>
                 <a:ext uri="{91240B29-F687-4f45-9708-019B960494DF}">
-                  <a14:hiddenLine xmlns="" xmlns:a14="http://schemas.microsoft.com/office/drawing/2010/main" w="9525">
+                  <a14:hiddenLine xmlns:a14="http://schemas.microsoft.com/office/drawing/2010/main" xmlns="" w="9525">
                     <a:solidFill>
                       <a:srgbClr val="000000"/>
                     </a:solidFill>
@@ -11967,7 +11967,7 @@
               </a:ln>
               <a:extLst>
                 <a:ext uri="{91240B29-F687-4f45-9708-019B960494DF}">
-                  <a14:hiddenLine xmlns="" xmlns:a14="http://schemas.microsoft.com/office/drawing/2010/main" w="9525">
+                  <a14:hiddenLine xmlns:a14="http://schemas.microsoft.com/office/drawing/2010/main" xmlns="" w="9525">
                     <a:solidFill>
                       <a:srgbClr val="000000"/>
                     </a:solidFill>
@@ -12057,7 +12057,7 @@
               </a:ln>
               <a:extLst>
                 <a:ext uri="{91240B29-F687-4f45-9708-019B960494DF}">
-                  <a14:hiddenLine xmlns="" xmlns:a14="http://schemas.microsoft.com/office/drawing/2010/main" w="9525">
+                  <a14:hiddenLine xmlns:a14="http://schemas.microsoft.com/office/drawing/2010/main" xmlns="" w="9525">
                     <a:solidFill>
                       <a:srgbClr val="000000"/>
                     </a:solidFill>
@@ -12122,7 +12122,7 @@
               </a:ln>
               <a:extLst>
                 <a:ext uri="{91240B29-F687-4f45-9708-019B960494DF}">
-                  <a14:hiddenLine xmlns="" xmlns:a14="http://schemas.microsoft.com/office/drawing/2010/main" w="9525">
+                  <a14:hiddenLine xmlns:a14="http://schemas.microsoft.com/office/drawing/2010/main" xmlns="" w="9525">
                     <a:solidFill>
                       <a:srgbClr val="000000"/>
                     </a:solidFill>
@@ -12212,7 +12212,7 @@
               </a:ln>
               <a:extLst>
                 <a:ext uri="{91240B29-F687-4f45-9708-019B960494DF}">
-                  <a14:hiddenLine xmlns="" xmlns:a14="http://schemas.microsoft.com/office/drawing/2010/main" w="9525">
+                  <a14:hiddenLine xmlns:a14="http://schemas.microsoft.com/office/drawing/2010/main" xmlns="" w="9525">
                     <a:solidFill>
                       <a:srgbClr val="000000"/>
                     </a:solidFill>
@@ -12280,7 +12280,7 @@
               </a:ln>
               <a:extLst>
                 <a:ext uri="{91240B29-F687-4f45-9708-019B960494DF}">
-                  <a14:hiddenLine xmlns="" xmlns:a14="http://schemas.microsoft.com/office/drawing/2010/main" w="9525">
+                  <a14:hiddenLine xmlns:a14="http://schemas.microsoft.com/office/drawing/2010/main" xmlns="" w="9525">
                     <a:solidFill>
                       <a:srgbClr val="000000"/>
                     </a:solidFill>
@@ -12370,7 +12370,7 @@
               </a:ln>
               <a:extLst>
                 <a:ext uri="{91240B29-F687-4f45-9708-019B960494DF}">
-                  <a14:hiddenLine xmlns="" xmlns:a14="http://schemas.microsoft.com/office/drawing/2010/main" w="9525">
+                  <a14:hiddenLine xmlns:a14="http://schemas.microsoft.com/office/drawing/2010/main" xmlns="" w="9525">
                     <a:solidFill>
                       <a:srgbClr val="000000"/>
                     </a:solidFill>
@@ -12438,7 +12438,7 @@
               </a:ln>
               <a:extLst>
                 <a:ext uri="{91240B29-F687-4f45-9708-019B960494DF}">
-                  <a14:hiddenLine xmlns="" xmlns:a14="http://schemas.microsoft.com/office/drawing/2010/main" w="9525">
+                  <a14:hiddenLine xmlns:a14="http://schemas.microsoft.com/office/drawing/2010/main" xmlns="" w="9525">
                     <a:solidFill>
                       <a:srgbClr val="000000"/>
                     </a:solidFill>
@@ -12528,7 +12528,7 @@
               </a:ln>
               <a:extLst>
                 <a:ext uri="{91240B29-F687-4f45-9708-019B960494DF}">
-                  <a14:hiddenLine xmlns="" xmlns:a14="http://schemas.microsoft.com/office/drawing/2010/main" w="9525">
+                  <a14:hiddenLine xmlns:a14="http://schemas.microsoft.com/office/drawing/2010/main" xmlns="" w="9525">
                     <a:solidFill>
                       <a:srgbClr val="000000"/>
                     </a:solidFill>
@@ -12562,7 +12562,7 @@
               </a:ln>
               <a:extLst>
                 <a:ext uri="{91240B29-F687-4f45-9708-019B960494DF}">
-                  <a14:hiddenLine xmlns="" xmlns:a14="http://schemas.microsoft.com/office/drawing/2010/main" w="9525">
+                  <a14:hiddenLine xmlns:a14="http://schemas.microsoft.com/office/drawing/2010/main" xmlns="" w="9525">
                     <a:solidFill>
                       <a:srgbClr val="000000"/>
                     </a:solidFill>
@@ -13322,15 +13322,15 @@
           <a:lstStyle/>
           <a:p>
             <a:r>
-              <a:rPr lang="fr-FR" sz="1600" dirty="0"/>
+              <a:rPr lang="fr-FR" sz="2000" dirty="0"/>
               <a:t>Platform as a Service (PaaS), est une catégorie de services de Cloud </a:t>
             </a:r>
             <a:r>
-              <a:rPr lang="fr-FR" sz="1600" dirty="0" err="1"/>
+              <a:rPr lang="fr-FR" sz="2000" dirty="0" err="1"/>
               <a:t>computing</a:t>
             </a:r>
             <a:r>
-              <a:rPr lang="fr-FR" sz="1600" dirty="0"/>
+              <a:rPr lang="fr-FR" sz="2000" dirty="0"/>
               <a:t> qui fournit la plateforme et l'environnement informatique nécessaire aux développeurs pour mettre en place leurs différents services et applications sur Internet. Les services PaaS sont hébergés dans le Cloud et les utilisateurs y accèdent simplement, par leur navigateur web.</a:t>
             </a:r>
           </a:p>
@@ -13763,7 +13763,7 @@
               <a:buNone/>
             </a:pPr>
             <a:r>
-              <a:rPr lang="fr-FR" dirty="0"/>
+              <a:rPr lang="fr-FR" sz="2800" dirty="0"/>
               <a:t>Voici quelques exemples de PAAS :</a:t>
             </a:r>
           </a:p>
@@ -13777,7 +13777,7 @@
               </a:spcBef>
             </a:pPr>
             <a:r>
-              <a:rPr lang="fr-FR" dirty="0"/>
+              <a:rPr lang="fr-FR" sz="2800" dirty="0"/>
               <a:t>Salesforce</a:t>
             </a:r>
           </a:p>
@@ -13791,7 +13791,7 @@
               </a:spcBef>
             </a:pPr>
             <a:r>
-              <a:rPr lang="fr-FR" dirty="0"/>
+              <a:rPr lang="fr-FR" sz="2800" dirty="0"/>
               <a:t>Slack</a:t>
             </a:r>
           </a:p>
@@ -13805,7 +13805,7 @@
               </a:spcBef>
             </a:pPr>
             <a:r>
-              <a:rPr lang="fr-FR" dirty="0"/>
+              <a:rPr lang="fr-FR" sz="2800" dirty="0"/>
               <a:t>Office 365 </a:t>
             </a:r>
           </a:p>
@@ -13819,7 +13819,7 @@
               </a:spcBef>
             </a:pPr>
             <a:r>
-              <a:rPr lang="fr-FR" dirty="0"/>
+              <a:rPr lang="fr-FR" sz="2800" dirty="0"/>
               <a:t>Adobe Creative Cloud</a:t>
             </a:r>
           </a:p>
@@ -14052,14 +14052,14 @@
               <a:rPr lang="fr-FR" b="1" dirty="0"/>
               <a:t>Hébergement Cloud </a:t>
             </a:r>
-            <a:endParaRPr lang="fr-FR"/>
+            <a:endParaRPr lang="fr-FR" dirty="0"/>
           </a:p>
           <a:p>
             <a:r>
               <a:rPr lang="fr-FR" b="1" dirty="0"/>
               <a:t>Virtual Data Centres </a:t>
             </a:r>
-            <a:endParaRPr lang="fr-FR"/>
+            <a:endParaRPr lang="fr-FR" dirty="0"/>
           </a:p>
         </p:txBody>
       </p:sp>
@@ -16010,16 +16010,20 @@
         <p:spPr/>
         <p:txBody>
           <a:bodyPr vert="horz" lIns="91440" tIns="45720" rIns="91440" bIns="45720" rtlCol="0" anchor="t">
-            <a:normAutofit lnSpcReduction="10000"/>
+            <a:normAutofit/>
           </a:bodyPr>
           <a:lstStyle/>
           <a:p>
             <a:r>
               <a:rPr lang="fr-FR" dirty="0"/>
-              <a:t>Les principes sous-jacents au </a:t>
-            </a:r>
-            <a:r>
-              <a:rPr lang="fr-FR" i="1" dirty="0"/>
+              <a:t>Les principes </a:t>
+            </a:r>
+            <a:r>
+              <a:rPr lang="fr-FR" dirty="0" smtClean="0"/>
+              <a:t>de </a:t>
+            </a:r>
+            <a:r>
+              <a:rPr lang="fr-FR" i="1" dirty="0" smtClean="0"/>
               <a:t>cloud </a:t>
             </a:r>
             <a:r>
@@ -16036,15 +16040,15 @@
             </a:r>
             <a:r>
               <a:rPr lang="fr-FR" dirty="0"/>
-              <a:t> »). À cette époque, les utilisateurs accédaient depuis leurs terminaux à des applications fonctionnant sur des systèmes centraux (les </a:t>
-            </a:r>
-            <a:r>
-              <a:rPr lang="fr-FR" i="1" dirty="0"/>
-              <a:t>mainframes</a:t>
+              <a:t> »). À cette époque, les utilisateurs accédaient depuis leurs terminaux à des applications fonctionnant sur des systèmes </a:t>
+            </a:r>
+            <a:r>
+              <a:rPr lang="fr-FR" dirty="0" smtClean="0"/>
+              <a:t>centraux, qui </a:t>
             </a:r>
             <a:r>
               <a:rPr lang="fr-FR" dirty="0"/>
-              <a:t>), qui correspondaient aux ancêtres des serveurs du </a:t>
+              <a:t>correspondaient aux ancêtres des serveurs du </a:t>
             </a:r>
             <a:r>
               <a:rPr lang="fr-FR" i="1" dirty="0"/>
@@ -16052,7 +16056,15 @@
             </a:r>
             <a:r>
               <a:rPr lang="fr-FR" dirty="0"/>
-              <a:t>. Les architectes de réseaux (ceux qui conçoivent les réseaux intra- et interentreprises) schématisaient Internet par un nuage dans leurs croquis. En anglais, on parlait alors de « </a:t>
+              <a:t>. Les architectes de réseaux </a:t>
+            </a:r>
+            <a:r>
+              <a:rPr lang="fr-FR" dirty="0" smtClean="0"/>
+              <a:t>schématisaient </a:t>
+            </a:r>
+            <a:r>
+              <a:rPr lang="fr-FR" dirty="0"/>
+              <a:t>Internet par un nuage dans leurs croquis. En anglais, on parlait alors de « </a:t>
             </a:r>
             <a:r>
               <a:rPr lang="en" i="1" dirty="0"/>
@@ -16153,7 +16165,47 @@
           <a:bodyPr/>
           <a:lstStyle/>
           <a:p>
-            <a:endParaRPr lang="fr-FR"/>
+            <a:r>
+              <a:rPr lang="fr-FR" dirty="0" smtClean="0"/>
+              <a:t>Aujourd’hui selon le cabinet de conseil en technologie CITO </a:t>
+            </a:r>
+            <a:r>
+              <a:rPr lang="fr-FR" dirty="0" err="1" smtClean="0"/>
+              <a:t>Research</a:t>
+            </a:r>
+            <a:r>
+              <a:rPr lang="fr-FR" dirty="0" smtClean="0"/>
+              <a:t>, 93% d’informaticien utiliserait le cloud </a:t>
+            </a:r>
+            <a:r>
+              <a:rPr lang="fr-FR" dirty="0" err="1" smtClean="0"/>
+              <a:t>computing</a:t>
+            </a:r>
+            <a:r>
+              <a:rPr lang="fr-FR" dirty="0" smtClean="0"/>
+              <a:t>, que ce soit en privé ou en public </a:t>
+            </a:r>
+            <a:r>
+              <a:rPr lang="fr-FR" dirty="0" smtClean="0"/>
+              <a:t>et selon le </a:t>
+            </a:r>
+            <a:r>
+              <a:rPr lang="fr-FR" dirty="0" err="1" smtClean="0"/>
+              <a:t>SolarWinds</a:t>
+            </a:r>
+            <a:r>
+              <a:rPr lang="fr-FR" dirty="0" smtClean="0"/>
+              <a:t> IT Trends Report 2017, 95% auraient migré certaines de leurs applications dans le cloud</a:t>
+            </a:r>
+            <a:r>
+              <a:rPr lang="fr-FR" dirty="0"/>
+              <a:t> , ce qui démontre que le cloud est utilisé partout, dans le monde de l’entreprise comme dans la vie </a:t>
+            </a:r>
+            <a:r>
+              <a:rPr lang="fr-FR" dirty="0" smtClean="0"/>
+              <a:t>quotidienne.</a:t>
+            </a:r>
+            <a:endParaRPr lang="fr-FR" dirty="0" smtClean="0"/>
           </a:p>
         </p:txBody>
       </p:sp>
@@ -16245,6 +16297,30 @@
           <a:bodyPr/>
           <a:lstStyle/>
           <a:p>
+            <a:r>
+              <a:rPr lang="fr-FR" dirty="0" smtClean="0"/>
+              <a:t>Le futur du cloud </a:t>
+            </a:r>
+            <a:r>
+              <a:rPr lang="fr-FR" dirty="0" err="1" smtClean="0"/>
+              <a:t>computing</a:t>
+            </a:r>
+            <a:r>
+              <a:rPr lang="fr-FR" dirty="0" smtClean="0"/>
+              <a:t> semble assuré avec un marché global de 383 milliards prévus pour 2020 contre 246 milliards en 2017 et une estimation de 73% d’utilisation de solutions </a:t>
+            </a:r>
+            <a:r>
+              <a:rPr lang="fr-FR" dirty="0" err="1" smtClean="0"/>
+              <a:t>SaaS</a:t>
+            </a:r>
+            <a:r>
+              <a:rPr lang="fr-FR" dirty="0" smtClean="0"/>
+              <a:t> pour les entreprises pour au moins 80% de </a:t>
+            </a:r>
+            <a:r>
+              <a:rPr lang="fr-FR" smtClean="0"/>
+              <a:t>leurs activités.</a:t>
+            </a:r>
             <a:endParaRPr lang="fr-FR"/>
           </a:p>
         </p:txBody>
@@ -17884,56 +17960,55 @@
           <a:lstStyle/>
           <a:p>
             <a:r>
-              <a:rPr lang="fr-FR" sz="1600" b="1" dirty="0"/>
+              <a:rPr lang="fr-FR" b="1" dirty="0"/>
               <a:t>Davantage de sécurité et de confidentialité</a:t>
             </a:r>
             <a:r>
-              <a:rPr lang="fr-FR" sz="1600" dirty="0"/>
+              <a:rPr lang="fr-FR" dirty="0"/>
               <a:t> </a:t>
             </a:r>
-            <a:endParaRPr lang="fr-FR" sz="1600"/>
-          </a:p>
-          <a:p>
-            <a:r>
-              <a:rPr lang="fr-FR" sz="1600" b="1" dirty="0"/>
+          </a:p>
+          <a:p>
+            <a:r>
+              <a:rPr lang="fr-FR" b="1" dirty="0"/>
               <a:t>Davantage de contrôle</a:t>
             </a:r>
             <a:r>
-              <a:rPr lang="fr-FR" sz="1600" dirty="0"/>
+              <a:rPr lang="fr-FR" dirty="0"/>
               <a:t> </a:t>
             </a:r>
           </a:p>
           <a:p>
             <a:r>
-              <a:rPr lang="fr-FR" sz="1600" b="1" dirty="0"/>
+              <a:rPr lang="fr-FR" b="1" dirty="0"/>
               <a:t>Efficacité en termes de coûts et d'énergie</a:t>
             </a:r>
-            <a:endParaRPr lang="fr-FR" sz="1600" dirty="0"/>
-          </a:p>
-          <a:p>
-            <a:r>
-              <a:rPr lang="fr-FR" sz="1600" b="1" dirty="0"/>
+            <a:endParaRPr lang="fr-FR" dirty="0"/>
+          </a:p>
+          <a:p>
+            <a:r>
+              <a:rPr lang="fr-FR" b="1" dirty="0"/>
               <a:t>Davantage de fiabilité</a:t>
             </a:r>
             <a:r>
-              <a:rPr lang="fr-FR" sz="1600" dirty="0"/>
+              <a:rPr lang="fr-FR" dirty="0"/>
               <a:t> </a:t>
             </a:r>
           </a:p>
           <a:p>
             <a:r>
-              <a:rPr lang="fr-FR" sz="1600" b="1" dirty="0"/>
+              <a:rPr lang="fr-FR" b="1" dirty="0"/>
               <a:t>Cloud </a:t>
             </a:r>
             <a:r>
-              <a:rPr lang="fr-FR" sz="1600" b="1" dirty="0" err="1"/>
+              <a:rPr lang="fr-FR" b="1" dirty="0" err="1"/>
               <a:t>Bursting</a:t>
             </a:r>
             <a:r>
-              <a:rPr lang="fr-FR" sz="1600" dirty="0"/>
+              <a:rPr lang="fr-FR" dirty="0"/>
               <a:t> </a:t>
             </a:r>
-            <a:endParaRPr lang="en-US" sz="1600" dirty="0"/>
+            <a:endParaRPr lang="en-US" dirty="0"/>
           </a:p>
         </p:txBody>
       </p:sp>
@@ -18128,37 +18203,36 @@
           <a:lstStyle/>
           <a:p>
             <a:r>
-              <a:rPr lang="fr-FR" sz="1600" b="1" dirty="0"/>
+              <a:rPr lang="fr-FR" b="1" dirty="0"/>
               <a:t>Extensibilité</a:t>
             </a:r>
             <a:r>
-              <a:rPr lang="fr-FR" sz="1600" dirty="0"/>
+              <a:rPr lang="fr-FR" dirty="0"/>
               <a:t> </a:t>
             </a:r>
-            <a:endParaRPr lang="fr-FR" sz="1600"/>
-          </a:p>
-          <a:p>
-            <a:r>
-              <a:rPr lang="fr-FR" sz="1600" b="1" dirty="0"/>
+          </a:p>
+          <a:p>
+            <a:r>
+              <a:rPr lang="fr-FR" b="1" dirty="0"/>
               <a:t>Avantages en termes de coûts</a:t>
             </a:r>
           </a:p>
           <a:p>
             <a:r>
-              <a:rPr lang="fr-FR" sz="1600" b="1" dirty="0"/>
+              <a:rPr lang="fr-FR" b="1" dirty="0"/>
               <a:t>Sécurité</a:t>
             </a:r>
             <a:r>
-              <a:rPr lang="fr-FR" sz="1600" dirty="0"/>
+              <a:rPr lang="fr-FR" dirty="0"/>
               <a:t> </a:t>
             </a:r>
           </a:p>
           <a:p>
             <a:r>
-              <a:rPr lang="fr-FR" sz="1600" b="1" dirty="0"/>
+              <a:rPr lang="fr-FR" b="1" dirty="0"/>
               <a:t>Flexibilité</a:t>
             </a:r>
-            <a:endParaRPr lang="fr-FR" sz="1600" dirty="0"/>
+            <a:endParaRPr lang="fr-FR" dirty="0"/>
           </a:p>
         </p:txBody>
       </p:sp>

</xml_diff>

<commit_message>
Correction de fautes et supressions d'une info
</commit_message>
<xml_diff>
--- a/Cloud Computing - F.pptx
+++ b/Cloud Computing - F.pptx
@@ -149,2642 +149,6 @@
     <p1510:client id="{DD509A43-B970-4054-B7AC-6D7EC92A76F8}" v="443" dt="2019-04-18T20:49:25.094"/>
   </p1510:revLst>
 </p1510:revInfo>
-</file>
-
-<file path=ppt/changesInfos/changesInfo1.xml><?xml version="1.0" encoding="utf-8"?>
-<pc:chgInfo xmlns:a="http://schemas.openxmlformats.org/drawingml/2006/main" xmlns:r="http://schemas.openxmlformats.org/officeDocument/2006/relationships" xmlns:ac="http://schemas.microsoft.com/office/drawing/2013/main/command" xmlns:pc="http://schemas.microsoft.com/office/powerpoint/2013/main/command">
-  <pc:docChgLst>
-    <pc:chgData name="François Espiasse" userId="c0683628fcfb6d84" providerId="LiveId" clId="{DD509A43-B970-4054-B7AC-6D7EC92A76F8}"/>
-    <pc:docChg chg="undo redo custSel mod addSld delSld modSld sldOrd">
-      <pc:chgData name="François Espiasse" userId="c0683628fcfb6d84" providerId="LiveId" clId="{DD509A43-B970-4054-B7AC-6D7EC92A76F8}" dt="2019-04-18T21:00:57.614" v="4656" actId="20577"/>
-      <pc:docMkLst>
-        <pc:docMk/>
-      </pc:docMkLst>
-      <pc:sldChg chg="addSp delSp modSp">
-        <pc:chgData name="François Espiasse" userId="c0683628fcfb6d84" providerId="LiveId" clId="{DD509A43-B970-4054-B7AC-6D7EC92A76F8}" dt="2019-04-18T08:31:26.302" v="2788" actId="1076"/>
-        <pc:sldMkLst>
-          <pc:docMk/>
-          <pc:sldMk cId="2456242256" sldId="256"/>
-        </pc:sldMkLst>
-        <pc:spChg chg="mod">
-          <ac:chgData name="François Espiasse" userId="c0683628fcfb6d84" providerId="LiveId" clId="{DD509A43-B970-4054-B7AC-6D7EC92A76F8}" dt="2019-04-18T08:18:39.596" v="2749" actId="122"/>
-          <ac:spMkLst>
-            <pc:docMk/>
-            <pc:sldMk cId="2456242256" sldId="256"/>
-            <ac:spMk id="2" creationId="{9B27290A-C5A4-43E6-9F4F-96A81D640098}"/>
-          </ac:spMkLst>
-        </pc:spChg>
-        <pc:spChg chg="mod">
-          <ac:chgData name="François Espiasse" userId="c0683628fcfb6d84" providerId="LiveId" clId="{DD509A43-B970-4054-B7AC-6D7EC92A76F8}" dt="2019-04-18T08:31:16.678" v="2786" actId="1076"/>
-          <ac:spMkLst>
-            <pc:docMk/>
-            <pc:sldMk cId="2456242256" sldId="256"/>
-            <ac:spMk id="3" creationId="{C01B7D5C-D6FB-457D-BDE6-CB0645839E6A}"/>
-          </ac:spMkLst>
-        </pc:spChg>
-        <pc:picChg chg="del mod">
-          <ac:chgData name="François Espiasse" userId="c0683628fcfb6d84" providerId="LiveId" clId="{DD509A43-B970-4054-B7AC-6D7EC92A76F8}" dt="2019-04-18T08:17:35.702" v="2637" actId="478"/>
-          <ac:picMkLst>
-            <pc:docMk/>
-            <pc:sldMk cId="2456242256" sldId="256"/>
-            <ac:picMk id="4" creationId="{7631FE5D-2998-4B68-9C62-902C4CEE2ABD}"/>
-          </ac:picMkLst>
-        </pc:picChg>
-        <pc:picChg chg="del">
-          <ac:chgData name="François Espiasse" userId="c0683628fcfb6d84" providerId="LiveId" clId="{DD509A43-B970-4054-B7AC-6D7EC92A76F8}" dt="2019-04-18T08:18:16.365" v="2744"/>
-          <ac:picMkLst>
-            <pc:docMk/>
-            <pc:sldMk cId="2456242256" sldId="256"/>
-            <ac:picMk id="8" creationId="{78CC8E7D-4BC1-4F9B-963E-F504DE961C4D}"/>
-          </ac:picMkLst>
-        </pc:picChg>
-        <pc:picChg chg="add mod">
-          <ac:chgData name="François Espiasse" userId="c0683628fcfb6d84" providerId="LiveId" clId="{DD509A43-B970-4054-B7AC-6D7EC92A76F8}" dt="2019-04-18T08:31:26.302" v="2788" actId="1076"/>
-          <ac:picMkLst>
-            <pc:docMk/>
-            <pc:sldMk cId="2456242256" sldId="256"/>
-            <ac:picMk id="5122" creationId="{460337F8-A175-4B1E-8096-402677F0CED4}"/>
-          </ac:picMkLst>
-        </pc:picChg>
-      </pc:sldChg>
-      <pc:sldChg chg="modSp modTransition">
-        <pc:chgData name="François Espiasse" userId="c0683628fcfb6d84" providerId="LiveId" clId="{DD509A43-B970-4054-B7AC-6D7EC92A76F8}" dt="2019-04-18T08:15:35.329" v="2631" actId="404"/>
-        <pc:sldMkLst>
-          <pc:docMk/>
-          <pc:sldMk cId="1861688003" sldId="257"/>
-        </pc:sldMkLst>
-        <pc:spChg chg="mod">
-          <ac:chgData name="François Espiasse" userId="c0683628fcfb6d84" providerId="LiveId" clId="{DD509A43-B970-4054-B7AC-6D7EC92A76F8}" dt="2019-04-18T08:15:35.329" v="2631" actId="404"/>
-          <ac:spMkLst>
-            <pc:docMk/>
-            <pc:sldMk cId="1861688003" sldId="257"/>
-            <ac:spMk id="3" creationId="{BBA67958-2C1F-4332-8659-515522679AD9}"/>
-          </ac:spMkLst>
-        </pc:spChg>
-        <pc:picChg chg="mod">
-          <ac:chgData name="François Espiasse" userId="c0683628fcfb6d84" providerId="LiveId" clId="{DD509A43-B970-4054-B7AC-6D7EC92A76F8}" dt="2019-04-16T22:16:51.636" v="469" actId="14100"/>
-          <ac:picMkLst>
-            <pc:docMk/>
-            <pc:sldMk cId="1861688003" sldId="257"/>
-            <ac:picMk id="4" creationId="{CBA788A6-E702-42DD-B4A4-C986F4AABB8D}"/>
-          </ac:picMkLst>
-        </pc:picChg>
-      </pc:sldChg>
-      <pc:sldChg chg="addSp delSp modSp modTransition">
-        <pc:chgData name="François Espiasse" userId="c0683628fcfb6d84" providerId="LiveId" clId="{DD509A43-B970-4054-B7AC-6D7EC92A76F8}" dt="2019-04-18T20:18:38.331" v="4270" actId="27636"/>
-        <pc:sldMkLst>
-          <pc:docMk/>
-          <pc:sldMk cId="3813215803" sldId="258"/>
-        </pc:sldMkLst>
-        <pc:spChg chg="mod">
-          <ac:chgData name="François Espiasse" userId="c0683628fcfb6d84" providerId="LiveId" clId="{DD509A43-B970-4054-B7AC-6D7EC92A76F8}" dt="2019-04-18T20:18:38.331" v="4270" actId="27636"/>
-          <ac:spMkLst>
-            <pc:docMk/>
-            <pc:sldMk cId="3813215803" sldId="258"/>
-            <ac:spMk id="3" creationId="{BBA67958-2C1F-4332-8659-515522679AD9}"/>
-          </ac:spMkLst>
-        </pc:spChg>
-        <pc:picChg chg="add">
-          <ac:chgData name="François Espiasse" userId="c0683628fcfb6d84" providerId="LiveId" clId="{DD509A43-B970-4054-B7AC-6D7EC92A76F8}" dt="2019-04-16T22:16:58.698" v="471"/>
-          <ac:picMkLst>
-            <pc:docMk/>
-            <pc:sldMk cId="3813215803" sldId="258"/>
-            <ac:picMk id="5" creationId="{F032A468-1CCD-411D-936F-0DCFE5D00CCC}"/>
-          </ac:picMkLst>
-        </pc:picChg>
-        <pc:picChg chg="del">
-          <ac:chgData name="François Espiasse" userId="c0683628fcfb6d84" providerId="LiveId" clId="{DD509A43-B970-4054-B7AC-6D7EC92A76F8}" dt="2019-04-16T22:16:58.428" v="470" actId="478"/>
-          <ac:picMkLst>
-            <pc:docMk/>
-            <pc:sldMk cId="3813215803" sldId="258"/>
-            <ac:picMk id="1026" creationId="{23AEA423-B88D-478E-B716-C694754A8797}"/>
-          </ac:picMkLst>
-        </pc:picChg>
-      </pc:sldChg>
-      <pc:sldChg chg="addSp delSp modSp mod modTransition setBg">
-        <pc:chgData name="François Espiasse" userId="c0683628fcfb6d84" providerId="LiveId" clId="{DD509A43-B970-4054-B7AC-6D7EC92A76F8}" dt="2019-04-17T15:19:18.971" v="1454" actId="20577"/>
-        <pc:sldMkLst>
-          <pc:docMk/>
-          <pc:sldMk cId="3161874831" sldId="259"/>
-        </pc:sldMkLst>
-        <pc:spChg chg="mod">
-          <ac:chgData name="François Espiasse" userId="c0683628fcfb6d84" providerId="LiveId" clId="{DD509A43-B970-4054-B7AC-6D7EC92A76F8}" dt="2019-04-17T14:52:35.776" v="1185" actId="122"/>
-          <ac:spMkLst>
-            <pc:docMk/>
-            <pc:sldMk cId="3161874831" sldId="259"/>
-            <ac:spMk id="2" creationId="{37E78542-7C8C-4FB1-854D-BF0ECC432EA5}"/>
-          </ac:spMkLst>
-        </pc:spChg>
-        <pc:spChg chg="mod ord">
-          <ac:chgData name="François Espiasse" userId="c0683628fcfb6d84" providerId="LiveId" clId="{DD509A43-B970-4054-B7AC-6D7EC92A76F8}" dt="2019-04-17T15:19:18.971" v="1454" actId="20577"/>
-          <ac:spMkLst>
-            <pc:docMk/>
-            <pc:sldMk cId="3161874831" sldId="259"/>
-            <ac:spMk id="3" creationId="{493F11BA-F9F5-4522-9FDC-00096238AC4B}"/>
-          </ac:spMkLst>
-        </pc:spChg>
-        <pc:picChg chg="add del mod">
-          <ac:chgData name="François Espiasse" userId="c0683628fcfb6d84" providerId="LiveId" clId="{DD509A43-B970-4054-B7AC-6D7EC92A76F8}" dt="2019-04-17T14:38:58.817" v="1045" actId="478"/>
-          <ac:picMkLst>
-            <pc:docMk/>
-            <pc:sldMk cId="3161874831" sldId="259"/>
-            <ac:picMk id="4" creationId="{095505C4-C6C0-4F65-B9E6-5615B8A44BB8}"/>
-          </ac:picMkLst>
-        </pc:picChg>
-        <pc:picChg chg="add del mod">
-          <ac:chgData name="François Espiasse" userId="c0683628fcfb6d84" providerId="LiveId" clId="{DD509A43-B970-4054-B7AC-6D7EC92A76F8}" dt="2019-04-17T14:39:00.789" v="1046" actId="478"/>
-          <ac:picMkLst>
-            <pc:docMk/>
-            <pc:sldMk cId="3161874831" sldId="259"/>
-            <ac:picMk id="5" creationId="{BAA47149-F443-4E0D-86A3-8943BF22D253}"/>
-          </ac:picMkLst>
-        </pc:picChg>
-        <pc:picChg chg="add del mod">
-          <ac:chgData name="François Espiasse" userId="c0683628fcfb6d84" providerId="LiveId" clId="{DD509A43-B970-4054-B7AC-6D7EC92A76F8}" dt="2019-04-17T14:38:58.817" v="1045" actId="478"/>
-          <ac:picMkLst>
-            <pc:docMk/>
-            <pc:sldMk cId="3161874831" sldId="259"/>
-            <ac:picMk id="6" creationId="{405E7432-444A-4B6A-8132-1E90CC0472DC}"/>
-          </ac:picMkLst>
-        </pc:picChg>
-        <pc:picChg chg="add del mod">
-          <ac:chgData name="François Espiasse" userId="c0683628fcfb6d84" providerId="LiveId" clId="{DD509A43-B970-4054-B7AC-6D7EC92A76F8}" dt="2019-04-17T14:38:58.817" v="1045" actId="478"/>
-          <ac:picMkLst>
-            <pc:docMk/>
-            <pc:sldMk cId="3161874831" sldId="259"/>
-            <ac:picMk id="7" creationId="{200643D4-9C23-4843-82F4-D14F43FB7FF0}"/>
-          </ac:picMkLst>
-        </pc:picChg>
-        <pc:picChg chg="add del mod">
-          <ac:chgData name="François Espiasse" userId="c0683628fcfb6d84" providerId="LiveId" clId="{DD509A43-B970-4054-B7AC-6D7EC92A76F8}" dt="2019-04-17T14:38:58.817" v="1045" actId="478"/>
-          <ac:picMkLst>
-            <pc:docMk/>
-            <pc:sldMk cId="3161874831" sldId="259"/>
-            <ac:picMk id="8" creationId="{DD765EF9-A0C7-4526-8F1D-3C3092D60A1A}"/>
-          </ac:picMkLst>
-        </pc:picChg>
-        <pc:picChg chg="add del mod">
-          <ac:chgData name="François Espiasse" userId="c0683628fcfb6d84" providerId="LiveId" clId="{DD509A43-B970-4054-B7AC-6D7EC92A76F8}" dt="2019-04-17T14:38:58.817" v="1045" actId="478"/>
-          <ac:picMkLst>
-            <pc:docMk/>
-            <pc:sldMk cId="3161874831" sldId="259"/>
-            <ac:picMk id="9" creationId="{69C44797-9AB3-40DF-8295-D54EDC870915}"/>
-          </ac:picMkLst>
-        </pc:picChg>
-        <pc:picChg chg="add mod">
-          <ac:chgData name="François Espiasse" userId="c0683628fcfb6d84" providerId="LiveId" clId="{DD509A43-B970-4054-B7AC-6D7EC92A76F8}" dt="2019-04-17T14:40:35.928" v="1049" actId="1440"/>
-          <ac:picMkLst>
-            <pc:docMk/>
-            <pc:sldMk cId="3161874831" sldId="259"/>
-            <ac:picMk id="1026" creationId="{D94C02C8-12E1-4536-82E4-9C7274565A51}"/>
-          </ac:picMkLst>
-        </pc:picChg>
-      </pc:sldChg>
-      <pc:sldChg chg="modSp modTransition">
-        <pc:chgData name="François Espiasse" userId="c0683628fcfb6d84" providerId="LiveId" clId="{DD509A43-B970-4054-B7AC-6D7EC92A76F8}" dt="2019-04-18T20:27:20.583" v="4601" actId="14100"/>
-        <pc:sldMkLst>
-          <pc:docMk/>
-          <pc:sldMk cId="3447485952" sldId="263"/>
-        </pc:sldMkLst>
-        <pc:spChg chg="mod">
-          <ac:chgData name="François Espiasse" userId="c0683628fcfb6d84" providerId="LiveId" clId="{DD509A43-B970-4054-B7AC-6D7EC92A76F8}" dt="2019-04-18T20:27:20.583" v="4601" actId="14100"/>
-          <ac:spMkLst>
-            <pc:docMk/>
-            <pc:sldMk cId="3447485952" sldId="263"/>
-            <ac:spMk id="3" creationId="{493F11BA-F9F5-4522-9FDC-00096238AC4B}"/>
-          </ac:spMkLst>
-        </pc:spChg>
-        <pc:picChg chg="mod">
-          <ac:chgData name="François Espiasse" userId="c0683628fcfb6d84" providerId="LiveId" clId="{DD509A43-B970-4054-B7AC-6D7EC92A76F8}" dt="2019-04-17T14:42:20.839" v="1054" actId="1440"/>
-          <ac:picMkLst>
-            <pc:docMk/>
-            <pc:sldMk cId="3447485952" sldId="263"/>
-            <ac:picMk id="2050" creationId="{0142F96D-6D8C-4384-BD1E-0B06D27D14B7}"/>
-          </ac:picMkLst>
-        </pc:picChg>
-      </pc:sldChg>
-      <pc:sldChg chg="modSp modTransition">
-        <pc:chgData name="François Espiasse" userId="c0683628fcfb6d84" providerId="LiveId" clId="{DD509A43-B970-4054-B7AC-6D7EC92A76F8}" dt="2019-04-17T15:13:48.783" v="1348" actId="20577"/>
-        <pc:sldMkLst>
-          <pc:docMk/>
-          <pc:sldMk cId="2425671074" sldId="264"/>
-        </pc:sldMkLst>
-        <pc:spChg chg="mod">
-          <ac:chgData name="François Espiasse" userId="c0683628fcfb6d84" providerId="LiveId" clId="{DD509A43-B970-4054-B7AC-6D7EC92A76F8}" dt="2019-04-17T15:13:48.783" v="1348" actId="20577"/>
-          <ac:spMkLst>
-            <pc:docMk/>
-            <pc:sldMk cId="2425671074" sldId="264"/>
-            <ac:spMk id="3" creationId="{493F11BA-F9F5-4522-9FDC-00096238AC4B}"/>
-          </ac:spMkLst>
-        </pc:spChg>
-        <pc:picChg chg="mod">
-          <ac:chgData name="François Espiasse" userId="c0683628fcfb6d84" providerId="LiveId" clId="{DD509A43-B970-4054-B7AC-6D7EC92A76F8}" dt="2019-04-17T14:43:03.567" v="1056" actId="1440"/>
-          <ac:picMkLst>
-            <pc:docMk/>
-            <pc:sldMk cId="2425671074" sldId="264"/>
-            <ac:picMk id="3074" creationId="{0BE33BA3-40A8-4718-8800-F5356D92E147}"/>
-          </ac:picMkLst>
-        </pc:picChg>
-      </pc:sldChg>
-      <pc:sldChg chg="addSp delSp modSp mod modTransition setBg setClrOvrMap delDesignElem">
-        <pc:chgData name="François Espiasse" userId="c0683628fcfb6d84" providerId="LiveId" clId="{DD509A43-B970-4054-B7AC-6D7EC92A76F8}" dt="2019-04-18T08:14:26.019" v="2629"/>
-        <pc:sldMkLst>
-          <pc:docMk/>
-          <pc:sldMk cId="2763620956" sldId="265"/>
-        </pc:sldMkLst>
-        <pc:spChg chg="mod">
-          <ac:chgData name="François Espiasse" userId="c0683628fcfb6d84" providerId="LiveId" clId="{DD509A43-B970-4054-B7AC-6D7EC92A76F8}" dt="2019-04-18T08:14:26.019" v="2629"/>
-          <ac:spMkLst>
-            <pc:docMk/>
-            <pc:sldMk cId="2763620956" sldId="265"/>
-            <ac:spMk id="2" creationId="{37E78542-7C8C-4FB1-854D-BF0ECC432EA5}"/>
-          </ac:spMkLst>
-        </pc:spChg>
-        <pc:spChg chg="add del mod">
-          <ac:chgData name="François Espiasse" userId="c0683628fcfb6d84" providerId="LiveId" clId="{DD509A43-B970-4054-B7AC-6D7EC92A76F8}" dt="2019-04-16T22:09:09.382" v="393" actId="26606"/>
-          <ac:spMkLst>
-            <pc:docMk/>
-            <pc:sldMk cId="2763620956" sldId="265"/>
-            <ac:spMk id="3" creationId="{493F11BA-F9F5-4522-9FDC-00096238AC4B}"/>
-          </ac:spMkLst>
-        </pc:spChg>
-        <pc:spChg chg="add mod ord">
-          <ac:chgData name="François Espiasse" userId="c0683628fcfb6d84" providerId="LiveId" clId="{DD509A43-B970-4054-B7AC-6D7EC92A76F8}" dt="2019-04-18T08:01:15.058" v="2390" actId="1076"/>
-          <ac:spMkLst>
-            <pc:docMk/>
-            <pc:sldMk cId="2763620956" sldId="265"/>
-            <ac:spMk id="4" creationId="{3042AD0C-5982-4846-8DC9-AC786DE620EB}"/>
-          </ac:spMkLst>
-        </pc:spChg>
-        <pc:spChg chg="add mod">
-          <ac:chgData name="François Espiasse" userId="c0683628fcfb6d84" providerId="LiveId" clId="{DD509A43-B970-4054-B7AC-6D7EC92A76F8}" dt="2019-04-18T07:31:22.234" v="1972" actId="207"/>
-          <ac:spMkLst>
-            <pc:docMk/>
-            <pc:sldMk cId="2763620956" sldId="265"/>
-            <ac:spMk id="5" creationId="{4D240630-B5B9-45DA-8407-4049A9C80335}"/>
-          </ac:spMkLst>
-        </pc:spChg>
-        <pc:spChg chg="add del mod">
-          <ac:chgData name="François Espiasse" userId="c0683628fcfb6d84" providerId="LiveId" clId="{DD509A43-B970-4054-B7AC-6D7EC92A76F8}" dt="2019-04-18T07:24:33.079" v="1837" actId="478"/>
-          <ac:spMkLst>
-            <pc:docMk/>
-            <pc:sldMk cId="2763620956" sldId="265"/>
-            <ac:spMk id="6" creationId="{1C13F2A5-A93B-4487-9EF2-3BA2084CC5F1}"/>
-          </ac:spMkLst>
-        </pc:spChg>
-        <pc:spChg chg="add del mod">
-          <ac:chgData name="François Espiasse" userId="c0683628fcfb6d84" providerId="LiveId" clId="{DD509A43-B970-4054-B7AC-6D7EC92A76F8}" dt="2019-04-18T07:24:44.277" v="1842"/>
-          <ac:spMkLst>
-            <pc:docMk/>
-            <pc:sldMk cId="2763620956" sldId="265"/>
-            <ac:spMk id="7" creationId="{353ADE0E-B2FB-42C4-970D-D6F8C87AD535}"/>
-          </ac:spMkLst>
-        </pc:spChg>
-        <pc:spChg chg="add del">
-          <ac:chgData name="François Espiasse" userId="c0683628fcfb6d84" providerId="LiveId" clId="{DD509A43-B970-4054-B7AC-6D7EC92A76F8}" dt="2019-04-16T22:09:19.911" v="394" actId="26606"/>
-          <ac:spMkLst>
-            <pc:docMk/>
-            <pc:sldMk cId="2763620956" sldId="265"/>
-            <ac:spMk id="8" creationId="{E9B448F0-DA06-4165-AB5F-4330A20E06D0}"/>
-          </ac:spMkLst>
-        </pc:spChg>
-        <pc:spChg chg="add del mod">
-          <ac:chgData name="François Espiasse" userId="c0683628fcfb6d84" providerId="LiveId" clId="{DD509A43-B970-4054-B7AC-6D7EC92A76F8}" dt="2019-04-18T07:27:57.955" v="1940" actId="1076"/>
-          <ac:spMkLst>
-            <pc:docMk/>
-            <pc:sldMk cId="2763620956" sldId="265"/>
-            <ac:spMk id="8" creationId="{FBD2FED4-5092-4877-B291-D829C50C7B2C}"/>
-          </ac:spMkLst>
-        </pc:spChg>
-        <pc:spChg chg="add del mod">
-          <ac:chgData name="François Espiasse" userId="c0683628fcfb6d84" providerId="LiveId" clId="{DD509A43-B970-4054-B7AC-6D7EC92A76F8}" dt="2019-04-18T07:28:14.646" v="1944" actId="767"/>
-          <ac:spMkLst>
-            <pc:docMk/>
-            <pc:sldMk cId="2763620956" sldId="265"/>
-            <ac:spMk id="9" creationId="{D8CC226C-B807-477E-BFA3-D0BB9979AFED}"/>
-          </ac:spMkLst>
-        </pc:spChg>
-        <pc:spChg chg="add del">
-          <ac:chgData name="François Espiasse" userId="c0683628fcfb6d84" providerId="LiveId" clId="{DD509A43-B970-4054-B7AC-6D7EC92A76F8}" dt="2019-04-16T22:08:50.708" v="386" actId="26606"/>
-          <ac:spMkLst>
-            <pc:docMk/>
-            <pc:sldMk cId="2763620956" sldId="265"/>
-            <ac:spMk id="10" creationId="{35E27155-981B-41FD-8670-5A3DAB78E144}"/>
-          </ac:spMkLst>
-        </pc:spChg>
-        <pc:spChg chg="add mod">
-          <ac:chgData name="François Espiasse" userId="c0683628fcfb6d84" providerId="LiveId" clId="{DD509A43-B970-4054-B7AC-6D7EC92A76F8}" dt="2019-04-18T07:28:33.848" v="1949" actId="113"/>
-          <ac:spMkLst>
-            <pc:docMk/>
-            <pc:sldMk cId="2763620956" sldId="265"/>
-            <ac:spMk id="10" creationId="{4490AD00-05EA-4058-9443-0D9B9C5CBA1B}"/>
-          </ac:spMkLst>
-        </pc:spChg>
-        <pc:spChg chg="add mod">
-          <ac:chgData name="François Espiasse" userId="c0683628fcfb6d84" providerId="LiveId" clId="{DD509A43-B970-4054-B7AC-6D7EC92A76F8}" dt="2019-04-18T07:30:21.711" v="1970" actId="1076"/>
-          <ac:spMkLst>
-            <pc:docMk/>
-            <pc:sldMk cId="2763620956" sldId="265"/>
-            <ac:spMk id="11" creationId="{82082EE0-AD49-4ACA-A6E3-8E6B3CEFB1D7}"/>
-          </ac:spMkLst>
-        </pc:spChg>
-        <pc:spChg chg="add del">
-          <ac:chgData name="François Espiasse" userId="c0683628fcfb6d84" providerId="LiveId" clId="{DD509A43-B970-4054-B7AC-6D7EC92A76F8}" dt="2019-04-16T22:08:59.005" v="388" actId="26606"/>
-          <ac:spMkLst>
-            <pc:docMk/>
-            <pc:sldMk cId="2763620956" sldId="265"/>
-            <ac:spMk id="12" creationId="{493F11BA-F9F5-4522-9FDC-00096238AC4B}"/>
-          </ac:spMkLst>
-        </pc:spChg>
-        <pc:spChg chg="add del">
-          <ac:chgData name="François Espiasse" userId="c0683628fcfb6d84" providerId="LiveId" clId="{DD509A43-B970-4054-B7AC-6D7EC92A76F8}" dt="2019-04-16T22:09:06.136" v="390" actId="26606"/>
-          <ac:spMkLst>
-            <pc:docMk/>
-            <pc:sldMk cId="2763620956" sldId="265"/>
-            <ac:spMk id="14" creationId="{35E27155-981B-41FD-8670-5A3DAB78E144}"/>
-          </ac:spMkLst>
-        </pc:spChg>
-        <pc:spChg chg="add del mod">
-          <ac:chgData name="François Espiasse" userId="c0683628fcfb6d84" providerId="LiveId" clId="{DD509A43-B970-4054-B7AC-6D7EC92A76F8}" dt="2019-04-18T07:16:46.105" v="1669" actId="478"/>
-          <ac:spMkLst>
-            <pc:docMk/>
-            <pc:sldMk cId="2763620956" sldId="265"/>
-            <ac:spMk id="56" creationId="{493F11BA-F9F5-4522-9FDC-00096238AC4B}"/>
-          </ac:spMkLst>
-        </pc:spChg>
-        <pc:spChg chg="add del">
-          <ac:chgData name="François Espiasse" userId="c0683628fcfb6d84" providerId="LiveId" clId="{DD509A43-B970-4054-B7AC-6D7EC92A76F8}" dt="2019-04-16T22:18:54.415" v="481"/>
-          <ac:spMkLst>
-            <pc:docMk/>
-            <pc:sldMk cId="2763620956" sldId="265"/>
-            <ac:spMk id="58" creationId="{6BFC9644-673A-459F-B3C5-9310A4E50E3B}"/>
-          </ac:spMkLst>
-        </pc:spChg>
-        <pc:spChg chg="add del">
-          <ac:chgData name="François Espiasse" userId="c0683628fcfb6d84" providerId="LiveId" clId="{DD509A43-B970-4054-B7AC-6D7EC92A76F8}" dt="2019-04-16T22:18:54.415" v="481"/>
-          <ac:spMkLst>
-            <pc:docMk/>
-            <pc:sldMk cId="2763620956" sldId="265"/>
-            <ac:spMk id="60" creationId="{7D1C411D-0818-4640-8657-2AF78250C802}"/>
-          </ac:spMkLst>
-        </pc:spChg>
-        <pc:spChg chg="add del">
-          <ac:chgData name="François Espiasse" userId="c0683628fcfb6d84" providerId="LiveId" clId="{DD509A43-B970-4054-B7AC-6D7EC92A76F8}" dt="2019-04-16T22:12:22.286" v="432"/>
-          <ac:spMkLst>
-            <pc:docMk/>
-            <pc:sldMk cId="2763620956" sldId="265"/>
-            <ac:spMk id="61" creationId="{6BFC9644-673A-459F-B3C5-9310A4E50E3B}"/>
-          </ac:spMkLst>
-        </pc:spChg>
-        <pc:spChg chg="add del">
-          <ac:chgData name="François Espiasse" userId="c0683628fcfb6d84" providerId="LiveId" clId="{DD509A43-B970-4054-B7AC-6D7EC92A76F8}" dt="2019-04-18T07:17:25.740" v="1675" actId="26606"/>
-          <ac:spMkLst>
-            <pc:docMk/>
-            <pc:sldMk cId="2763620956" sldId="265"/>
-            <ac:spMk id="62" creationId="{6BFC9644-673A-459F-B3C5-9310A4E50E3B}"/>
-          </ac:spMkLst>
-        </pc:spChg>
-        <pc:spChg chg="add del">
-          <ac:chgData name="François Espiasse" userId="c0683628fcfb6d84" providerId="LiveId" clId="{DD509A43-B970-4054-B7AC-6D7EC92A76F8}" dt="2019-04-16T22:12:22.286" v="432"/>
-          <ac:spMkLst>
-            <pc:docMk/>
-            <pc:sldMk cId="2763620956" sldId="265"/>
-            <ac:spMk id="92" creationId="{7D1C411D-0818-4640-8657-2AF78250C802}"/>
-          </ac:spMkLst>
-        </pc:spChg>
-        <pc:spChg chg="add del">
-          <ac:chgData name="François Espiasse" userId="c0683628fcfb6d84" providerId="LiveId" clId="{DD509A43-B970-4054-B7AC-6D7EC92A76F8}" dt="2019-04-18T07:17:25.740" v="1675" actId="26606"/>
-          <ac:spMkLst>
-            <pc:docMk/>
-            <pc:sldMk cId="2763620956" sldId="265"/>
-            <ac:spMk id="93" creationId="{7D1C411D-0818-4640-8657-2AF78250C802}"/>
-          </ac:spMkLst>
-        </pc:spChg>
-        <pc:spChg chg="add del">
-          <ac:chgData name="François Espiasse" userId="c0683628fcfb6d84" providerId="LiveId" clId="{DD509A43-B970-4054-B7AC-6D7EC92A76F8}" dt="2019-04-18T07:17:25.709" v="1674" actId="26606"/>
-          <ac:spMkLst>
-            <pc:docMk/>
-            <pc:sldMk cId="2763620956" sldId="265"/>
-            <ac:spMk id="135" creationId="{14436AD2-BD0F-4545-B2E9-06007B35B8A7}"/>
-          </ac:spMkLst>
-        </pc:spChg>
-        <pc:spChg chg="add del">
-          <ac:chgData name="François Espiasse" userId="c0683628fcfb6d84" providerId="LiveId" clId="{DD509A43-B970-4054-B7AC-6D7EC92A76F8}" dt="2019-04-18T08:12:31.126" v="2606"/>
-          <ac:spMkLst>
-            <pc:docMk/>
-            <pc:sldMk cId="2763620956" sldId="265"/>
-            <ac:spMk id="2052" creationId="{E4B7B3E3-827A-48BE-AD67-A57C45AA6949}"/>
-          </ac:spMkLst>
-        </pc:spChg>
-        <pc:grpChg chg="add del">
-          <ac:chgData name="François Espiasse" userId="c0683628fcfb6d84" providerId="LiveId" clId="{DD509A43-B970-4054-B7AC-6D7EC92A76F8}" dt="2019-04-16T22:09:19.911" v="394" actId="26606"/>
-          <ac:grpSpMkLst>
-            <pc:docMk/>
-            <pc:sldMk cId="2763620956" sldId="265"/>
-            <ac:grpSpMk id="41" creationId="{8DB4BB99-C854-45F9-BED1-63D15E3A2411}"/>
-          </ac:grpSpMkLst>
-        </pc:grpChg>
-        <pc:grpChg chg="add del">
-          <ac:chgData name="François Espiasse" userId="c0683628fcfb6d84" providerId="LiveId" clId="{DD509A43-B970-4054-B7AC-6D7EC92A76F8}" dt="2019-04-16T22:09:19.911" v="394" actId="26606"/>
-          <ac:grpSpMkLst>
-            <pc:docMk/>
-            <pc:sldMk cId="2763620956" sldId="265"/>
-            <ac:grpSpMk id="52" creationId="{2576BCDF-119F-4EB5-83D7-ED823C93EBBD}"/>
-          </ac:grpSpMkLst>
-        </pc:grpChg>
-        <pc:grpChg chg="add del">
-          <ac:chgData name="François Espiasse" userId="c0683628fcfb6d84" providerId="LiveId" clId="{DD509A43-B970-4054-B7AC-6D7EC92A76F8}" dt="2019-04-16T22:18:54.415" v="481"/>
-          <ac:grpSpMkLst>
-            <pc:docMk/>
-            <pc:sldMk cId="2763620956" sldId="265"/>
-            <ac:grpSpMk id="59" creationId="{4ADB9295-9645-4BF2-ADFD-75800B7FAD06}"/>
-          </ac:grpSpMkLst>
-        </pc:grpChg>
-        <pc:grpChg chg="add del">
-          <ac:chgData name="François Espiasse" userId="c0683628fcfb6d84" providerId="LiveId" clId="{DD509A43-B970-4054-B7AC-6D7EC92A76F8}" dt="2019-04-16T22:12:22.286" v="432"/>
-          <ac:grpSpMkLst>
-            <pc:docMk/>
-            <pc:sldMk cId="2763620956" sldId="265"/>
-            <ac:grpSpMk id="63" creationId="{4ADB9295-9645-4BF2-ADFD-75800B7FAD06}"/>
-          </ac:grpSpMkLst>
-        </pc:grpChg>
-        <pc:grpChg chg="add del">
-          <ac:chgData name="François Espiasse" userId="c0683628fcfb6d84" providerId="LiveId" clId="{DD509A43-B970-4054-B7AC-6D7EC92A76F8}" dt="2019-04-18T07:17:25.740" v="1675" actId="26606"/>
-          <ac:grpSpMkLst>
-            <pc:docMk/>
-            <pc:sldMk cId="2763620956" sldId="265"/>
-            <ac:grpSpMk id="91" creationId="{4ADB9295-9645-4BF2-ADFD-75800B7FAD06}"/>
-          </ac:grpSpMkLst>
-        </pc:grpChg>
-        <pc:graphicFrameChg chg="add del">
-          <ac:chgData name="François Espiasse" userId="c0683628fcfb6d84" providerId="LiveId" clId="{DD509A43-B970-4054-B7AC-6D7EC92A76F8}" dt="2019-04-16T22:08:50.708" v="386" actId="26606"/>
-          <ac:graphicFrameMkLst>
-            <pc:docMk/>
-            <pc:sldMk cId="2763620956" sldId="265"/>
-            <ac:graphicFrameMk id="5" creationId="{BB42D3F2-956E-4060-9612-3717C1E1A09E}"/>
-          </ac:graphicFrameMkLst>
-        </pc:graphicFrameChg>
-        <pc:graphicFrameChg chg="add del">
-          <ac:chgData name="François Espiasse" userId="c0683628fcfb6d84" providerId="LiveId" clId="{DD509A43-B970-4054-B7AC-6D7EC92A76F8}" dt="2019-04-16T22:09:06.136" v="390" actId="26606"/>
-          <ac:graphicFrameMkLst>
-            <pc:docMk/>
-            <pc:sldMk cId="2763620956" sldId="265"/>
-            <ac:graphicFrameMk id="15" creationId="{EF0C5B88-F6BC-46D8-9AB6-25F2063C4D08}"/>
-          </ac:graphicFrameMkLst>
-        </pc:graphicFrameChg>
-        <pc:graphicFrameChg chg="add del">
-          <ac:chgData name="François Espiasse" userId="c0683628fcfb6d84" providerId="LiveId" clId="{DD509A43-B970-4054-B7AC-6D7EC92A76F8}" dt="2019-04-16T22:09:09.333" v="392" actId="26606"/>
-          <ac:graphicFrameMkLst>
-            <pc:docMk/>
-            <pc:sldMk cId="2763620956" sldId="265"/>
-            <ac:graphicFrameMk id="17" creationId="{BD196AE4-0494-428B-874C-DE0682F13627}"/>
-          </ac:graphicFrameMkLst>
-        </pc:graphicFrameChg>
-        <pc:picChg chg="add del">
-          <ac:chgData name="François Espiasse" userId="c0683628fcfb6d84" providerId="LiveId" clId="{DD509A43-B970-4054-B7AC-6D7EC92A76F8}" dt="2019-04-16T22:08:59.005" v="388" actId="26606"/>
-          <ac:picMkLst>
-            <pc:docMk/>
-            <pc:sldMk cId="2763620956" sldId="265"/>
-            <ac:picMk id="7" creationId="{13F2606E-17B1-4494-A95A-06F22AA0D849}"/>
-          </ac:picMkLst>
-        </pc:picChg>
-        <pc:picChg chg="add del">
-          <ac:chgData name="François Espiasse" userId="c0683628fcfb6d84" providerId="LiveId" clId="{DD509A43-B970-4054-B7AC-6D7EC92A76F8}" dt="2019-04-16T22:09:19.911" v="394" actId="26606"/>
-          <ac:picMkLst>
-            <pc:docMk/>
-            <pc:sldMk cId="2763620956" sldId="265"/>
-            <ac:picMk id="40" creationId="{92D83638-A467-411A-9C31-FE9A111CD885}"/>
-          </ac:picMkLst>
-        </pc:picChg>
-        <pc:picChg chg="add mod">
-          <ac:chgData name="François Espiasse" userId="c0683628fcfb6d84" providerId="LiveId" clId="{DD509A43-B970-4054-B7AC-6D7EC92A76F8}" dt="2019-04-18T07:28:14.130" v="1943" actId="1076"/>
-          <ac:picMkLst>
-            <pc:docMk/>
-            <pc:sldMk cId="2763620956" sldId="265"/>
-            <ac:picMk id="2050" creationId="{5E809315-E7A0-411C-AC1C-422F9CAC6708}"/>
-          </ac:picMkLst>
-        </pc:picChg>
-      </pc:sldChg>
-      <pc:sldChg chg="addSp delSp modSp mod modTransition setBg delDesignElem">
-        <pc:chgData name="François Espiasse" userId="c0683628fcfb6d84" providerId="LiveId" clId="{DD509A43-B970-4054-B7AC-6D7EC92A76F8}" dt="2019-04-18T08:12:31.126" v="2606"/>
-        <pc:sldMkLst>
-          <pc:docMk/>
-          <pc:sldMk cId="1514422471" sldId="267"/>
-        </pc:sldMkLst>
-        <pc:spChg chg="mod">
-          <ac:chgData name="François Espiasse" userId="c0683628fcfb6d84" providerId="LiveId" clId="{DD509A43-B970-4054-B7AC-6D7EC92A76F8}" dt="2019-04-16T23:12:14.019" v="930" actId="255"/>
-          <ac:spMkLst>
-            <pc:docMk/>
-            <pc:sldMk cId="1514422471" sldId="267"/>
-            <ac:spMk id="2" creationId="{37E78542-7C8C-4FB1-854D-BF0ECC432EA5}"/>
-          </ac:spMkLst>
-        </pc:spChg>
-        <pc:spChg chg="mod">
-          <ac:chgData name="François Espiasse" userId="c0683628fcfb6d84" providerId="LiveId" clId="{DD509A43-B970-4054-B7AC-6D7EC92A76F8}" dt="2019-04-17T15:14:11.068" v="1350" actId="1076"/>
-          <ac:spMkLst>
-            <pc:docMk/>
-            <pc:sldMk cId="1514422471" sldId="267"/>
-            <ac:spMk id="3" creationId="{493F11BA-F9F5-4522-9FDC-00096238AC4B}"/>
-          </ac:spMkLst>
-        </pc:spChg>
-        <pc:spChg chg="add del">
-          <ac:chgData name="François Espiasse" userId="c0683628fcfb6d84" providerId="LiveId" clId="{DD509A43-B970-4054-B7AC-6D7EC92A76F8}" dt="2019-04-16T22:18:54.415" v="481"/>
-          <ac:spMkLst>
-            <pc:docMk/>
-            <pc:sldMk cId="1514422471" sldId="267"/>
-            <ac:spMk id="5" creationId="{6BFC9644-673A-459F-B3C5-9310A4E50E3B}"/>
-          </ac:spMkLst>
-        </pc:spChg>
-        <pc:spChg chg="add del">
-          <ac:chgData name="François Espiasse" userId="c0683628fcfb6d84" providerId="LiveId" clId="{DD509A43-B970-4054-B7AC-6D7EC92A76F8}" dt="2019-04-16T22:18:54.415" v="481"/>
-          <ac:spMkLst>
-            <pc:docMk/>
-            <pc:sldMk cId="1514422471" sldId="267"/>
-            <ac:spMk id="7" creationId="{7D1C411D-0818-4640-8657-2AF78250C802}"/>
-          </ac:spMkLst>
-        </pc:spChg>
-        <pc:spChg chg="add del">
-          <ac:chgData name="François Espiasse" userId="c0683628fcfb6d84" providerId="LiveId" clId="{DD509A43-B970-4054-B7AC-6D7EC92A76F8}" dt="2019-04-16T22:11:03.486" v="411" actId="26606"/>
-          <ac:spMkLst>
-            <pc:docMk/>
-            <pc:sldMk cId="1514422471" sldId="267"/>
-            <ac:spMk id="8" creationId="{6BFC9644-673A-459F-B3C5-9310A4E50E3B}"/>
-          </ac:spMkLst>
-        </pc:spChg>
-        <pc:spChg chg="add del">
-          <ac:chgData name="François Espiasse" userId="c0683628fcfb6d84" providerId="LiveId" clId="{DD509A43-B970-4054-B7AC-6D7EC92A76F8}" dt="2019-04-18T08:12:31.126" v="2606"/>
-          <ac:spMkLst>
-            <pc:docMk/>
-            <pc:sldMk cId="1514422471" sldId="267"/>
-            <ac:spMk id="9" creationId="{6BFC9644-673A-459F-B3C5-9310A4E50E3B}"/>
-          </ac:spMkLst>
-        </pc:spChg>
-        <pc:spChg chg="add del">
-          <ac:chgData name="François Espiasse" userId="c0683628fcfb6d84" providerId="LiveId" clId="{DD509A43-B970-4054-B7AC-6D7EC92A76F8}" dt="2019-04-16T22:11:03.486" v="411" actId="26606"/>
-          <ac:spMkLst>
-            <pc:docMk/>
-            <pc:sldMk cId="1514422471" sldId="267"/>
-            <ac:spMk id="39" creationId="{7D1C411D-0818-4640-8657-2AF78250C802}"/>
-          </ac:spMkLst>
-        </pc:spChg>
-        <pc:spChg chg="add del">
-          <ac:chgData name="François Espiasse" userId="c0683628fcfb6d84" providerId="LiveId" clId="{DD509A43-B970-4054-B7AC-6D7EC92A76F8}" dt="2019-04-18T08:12:31.126" v="2606"/>
-          <ac:spMkLst>
-            <pc:docMk/>
-            <pc:sldMk cId="1514422471" sldId="267"/>
-            <ac:spMk id="40" creationId="{7D1C411D-0818-4640-8657-2AF78250C802}"/>
-          </ac:spMkLst>
-        </pc:spChg>
-        <pc:spChg chg="add del">
-          <ac:chgData name="François Espiasse" userId="c0683628fcfb6d84" providerId="LiveId" clId="{DD509A43-B970-4054-B7AC-6D7EC92A76F8}" dt="2019-04-16T22:11:03.470" v="410" actId="26606"/>
-          <ac:spMkLst>
-            <pc:docMk/>
-            <pc:sldMk cId="1514422471" sldId="267"/>
-            <ac:spMk id="44" creationId="{E978A47D-4F17-40FE-AB70-7AF78A9575EB}"/>
-          </ac:spMkLst>
-        </pc:spChg>
-        <pc:spChg chg="add del">
-          <ac:chgData name="François Espiasse" userId="c0683628fcfb6d84" providerId="LiveId" clId="{DD509A43-B970-4054-B7AC-6D7EC92A76F8}" dt="2019-04-16T22:12:22.286" v="432"/>
-          <ac:spMkLst>
-            <pc:docMk/>
-            <pc:sldMk cId="1514422471" sldId="267"/>
-            <ac:spMk id="89" creationId="{6BFC9644-673A-459F-B3C5-9310A4E50E3B}"/>
-          </ac:spMkLst>
-        </pc:spChg>
-        <pc:spChg chg="add del">
-          <ac:chgData name="François Espiasse" userId="c0683628fcfb6d84" providerId="LiveId" clId="{DD509A43-B970-4054-B7AC-6D7EC92A76F8}" dt="2019-04-16T22:12:22.286" v="432"/>
-          <ac:spMkLst>
-            <pc:docMk/>
-            <pc:sldMk cId="1514422471" sldId="267"/>
-            <ac:spMk id="91" creationId="{7D1C411D-0818-4640-8657-2AF78250C802}"/>
-          </ac:spMkLst>
-        </pc:spChg>
-        <pc:grpChg chg="add del">
-          <ac:chgData name="François Espiasse" userId="c0683628fcfb6d84" providerId="LiveId" clId="{DD509A43-B970-4054-B7AC-6D7EC92A76F8}" dt="2019-04-16T22:18:54.415" v="481"/>
-          <ac:grpSpMkLst>
-            <pc:docMk/>
-            <pc:sldMk cId="1514422471" sldId="267"/>
-            <ac:grpSpMk id="6" creationId="{4ADB9295-9645-4BF2-ADFD-75800B7FAD06}"/>
-          </ac:grpSpMkLst>
-        </pc:grpChg>
-        <pc:grpChg chg="add del">
-          <ac:chgData name="François Espiasse" userId="c0683628fcfb6d84" providerId="LiveId" clId="{DD509A43-B970-4054-B7AC-6D7EC92A76F8}" dt="2019-04-16T22:11:03.486" v="411" actId="26606"/>
-          <ac:grpSpMkLst>
-            <pc:docMk/>
-            <pc:sldMk cId="1514422471" sldId="267"/>
-            <ac:grpSpMk id="10" creationId="{4ADB9295-9645-4BF2-ADFD-75800B7FAD06}"/>
-          </ac:grpSpMkLst>
-        </pc:grpChg>
-        <pc:grpChg chg="add del">
-          <ac:chgData name="François Espiasse" userId="c0683628fcfb6d84" providerId="LiveId" clId="{DD509A43-B970-4054-B7AC-6D7EC92A76F8}" dt="2019-04-18T08:12:31.126" v="2606"/>
-          <ac:grpSpMkLst>
-            <pc:docMk/>
-            <pc:sldMk cId="1514422471" sldId="267"/>
-            <ac:grpSpMk id="38" creationId="{4ADB9295-9645-4BF2-ADFD-75800B7FAD06}"/>
-          </ac:grpSpMkLst>
-        </pc:grpChg>
-        <pc:grpChg chg="add del">
-          <ac:chgData name="François Espiasse" userId="c0683628fcfb6d84" providerId="LiveId" clId="{DD509A43-B970-4054-B7AC-6D7EC92A76F8}" dt="2019-04-16T22:11:03.470" v="410" actId="26606"/>
-          <ac:grpSpMkLst>
-            <pc:docMk/>
-            <pc:sldMk cId="1514422471" sldId="267"/>
-            <ac:grpSpMk id="46" creationId="{85BE3A7E-6A3F-401E-A025-BBB8FDB8DD30}"/>
-          </ac:grpSpMkLst>
-        </pc:grpChg>
-        <pc:grpChg chg="add del">
-          <ac:chgData name="François Espiasse" userId="c0683628fcfb6d84" providerId="LiveId" clId="{DD509A43-B970-4054-B7AC-6D7EC92A76F8}" dt="2019-04-16T22:11:03.470" v="410" actId="26606"/>
-          <ac:grpSpMkLst>
-            <pc:docMk/>
-            <pc:sldMk cId="1514422471" sldId="267"/>
-            <ac:grpSpMk id="77" creationId="{F4E035BE-9FF4-43D3-BC25-CF582D7FF85E}"/>
-          </ac:grpSpMkLst>
-        </pc:grpChg>
-        <pc:grpChg chg="add del">
-          <ac:chgData name="François Espiasse" userId="c0683628fcfb6d84" providerId="LiveId" clId="{DD509A43-B970-4054-B7AC-6D7EC92A76F8}" dt="2019-04-16T22:12:22.286" v="432"/>
-          <ac:grpSpMkLst>
-            <pc:docMk/>
-            <pc:sldMk cId="1514422471" sldId="267"/>
-            <ac:grpSpMk id="90" creationId="{4ADB9295-9645-4BF2-ADFD-75800B7FAD06}"/>
-          </ac:grpSpMkLst>
-        </pc:grpChg>
-        <pc:cxnChg chg="add del">
-          <ac:chgData name="François Espiasse" userId="c0683628fcfb6d84" providerId="LiveId" clId="{DD509A43-B970-4054-B7AC-6D7EC92A76F8}" dt="2019-04-16T22:11:03.470" v="410" actId="26606"/>
-          <ac:cxnSpMkLst>
-            <pc:docMk/>
-            <pc:sldMk cId="1514422471" sldId="267"/>
-            <ac:cxnSpMk id="75" creationId="{085ECEC0-FF5D-4348-92C7-1EA7C61E770C}"/>
-          </ac:cxnSpMkLst>
-        </pc:cxnChg>
-      </pc:sldChg>
-      <pc:sldChg chg="addSp delSp modSp mod modTransition setBg delDesignElem">
-        <pc:chgData name="François Espiasse" userId="c0683628fcfb6d84" providerId="LiveId" clId="{DD509A43-B970-4054-B7AC-6D7EC92A76F8}" dt="2019-04-18T19:58:44.297" v="3175" actId="20577"/>
-        <pc:sldMkLst>
-          <pc:docMk/>
-          <pc:sldMk cId="2081856987" sldId="268"/>
-        </pc:sldMkLst>
-        <pc:spChg chg="mod">
-          <ac:chgData name="François Espiasse" userId="c0683628fcfb6d84" providerId="LiveId" clId="{DD509A43-B970-4054-B7AC-6D7EC92A76F8}" dt="2019-04-16T23:01:38.342" v="911" actId="403"/>
-          <ac:spMkLst>
-            <pc:docMk/>
-            <pc:sldMk cId="2081856987" sldId="268"/>
-            <ac:spMk id="2" creationId="{37E78542-7C8C-4FB1-854D-BF0ECC432EA5}"/>
-          </ac:spMkLst>
-        </pc:spChg>
-        <pc:spChg chg="mod">
-          <ac:chgData name="François Espiasse" userId="c0683628fcfb6d84" providerId="LiveId" clId="{DD509A43-B970-4054-B7AC-6D7EC92A76F8}" dt="2019-04-18T19:58:44.297" v="3175" actId="20577"/>
-          <ac:spMkLst>
-            <pc:docMk/>
-            <pc:sldMk cId="2081856987" sldId="268"/>
-            <ac:spMk id="3" creationId="{493F11BA-F9F5-4522-9FDC-00096238AC4B}"/>
-          </ac:spMkLst>
-        </pc:spChg>
-        <pc:spChg chg="add del">
-          <ac:chgData name="François Espiasse" userId="c0683628fcfb6d84" providerId="LiveId" clId="{DD509A43-B970-4054-B7AC-6D7EC92A76F8}" dt="2019-04-18T08:12:31.126" v="2606"/>
-          <ac:spMkLst>
-            <pc:docMk/>
-            <pc:sldMk cId="2081856987" sldId="268"/>
-            <ac:spMk id="8" creationId="{6BFC9644-673A-459F-B3C5-9310A4E50E3B}"/>
-          </ac:spMkLst>
-        </pc:spChg>
-        <pc:spChg chg="add del">
-          <ac:chgData name="François Espiasse" userId="c0683628fcfb6d84" providerId="LiveId" clId="{DD509A43-B970-4054-B7AC-6D7EC92A76F8}" dt="2019-04-18T08:12:31.126" v="2606"/>
-          <ac:spMkLst>
-            <pc:docMk/>
-            <pc:sldMk cId="2081856987" sldId="268"/>
-            <ac:spMk id="39" creationId="{7D1C411D-0818-4640-8657-2AF78250C802}"/>
-          </ac:spMkLst>
-        </pc:spChg>
-        <pc:grpChg chg="add del">
-          <ac:chgData name="François Espiasse" userId="c0683628fcfb6d84" providerId="LiveId" clId="{DD509A43-B970-4054-B7AC-6D7EC92A76F8}" dt="2019-04-18T08:12:31.126" v="2606"/>
-          <ac:grpSpMkLst>
-            <pc:docMk/>
-            <pc:sldMk cId="2081856987" sldId="268"/>
-            <ac:grpSpMk id="10" creationId="{4ADB9295-9645-4BF2-ADFD-75800B7FAD06}"/>
-          </ac:grpSpMkLst>
-        </pc:grpChg>
-      </pc:sldChg>
-      <pc:sldChg chg="addSp modSp mod modTransition setBg">
-        <pc:chgData name="François Espiasse" userId="c0683628fcfb6d84" providerId="LiveId" clId="{DD509A43-B970-4054-B7AC-6D7EC92A76F8}" dt="2019-04-18T20:48:04.193" v="4648" actId="20577"/>
-        <pc:sldMkLst>
-          <pc:docMk/>
-          <pc:sldMk cId="2578654956" sldId="269"/>
-        </pc:sldMkLst>
-        <pc:spChg chg="mod">
-          <ac:chgData name="François Espiasse" userId="c0683628fcfb6d84" providerId="LiveId" clId="{DD509A43-B970-4054-B7AC-6D7EC92A76F8}" dt="2019-04-17T14:46:57.600" v="1082" actId="122"/>
-          <ac:spMkLst>
-            <pc:docMk/>
-            <pc:sldMk cId="2578654956" sldId="269"/>
-            <ac:spMk id="2" creationId="{9217F341-07CB-4121-943F-8D8F8E22F211}"/>
-          </ac:spMkLst>
-        </pc:spChg>
-        <pc:spChg chg="mod">
-          <ac:chgData name="François Espiasse" userId="c0683628fcfb6d84" providerId="LiveId" clId="{DD509A43-B970-4054-B7AC-6D7EC92A76F8}" dt="2019-04-18T08:14:26.019" v="2629"/>
-          <ac:spMkLst>
-            <pc:docMk/>
-            <pc:sldMk cId="2578654956" sldId="269"/>
-            <ac:spMk id="3" creationId="{2ED55F86-98B7-4496-BCEF-A8A40D70AD12}"/>
-          </ac:spMkLst>
-        </pc:spChg>
-        <pc:spChg chg="add mod">
-          <ac:chgData name="François Espiasse" userId="c0683628fcfb6d84" providerId="LiveId" clId="{DD509A43-B970-4054-B7AC-6D7EC92A76F8}" dt="2019-04-18T20:48:04.193" v="4648" actId="20577"/>
-          <ac:spMkLst>
-            <pc:docMk/>
-            <pc:sldMk cId="2578654956" sldId="269"/>
-            <ac:spMk id="4" creationId="{1833D6EF-CB05-4884-90F3-4E65D34202AA}"/>
-          </ac:spMkLst>
-        </pc:spChg>
-        <pc:picChg chg="mod ord">
-          <ac:chgData name="François Espiasse" userId="c0683628fcfb6d84" providerId="LiveId" clId="{DD509A43-B970-4054-B7AC-6D7EC92A76F8}" dt="2019-04-17T14:46:25.864" v="1078"/>
-          <ac:picMkLst>
-            <pc:docMk/>
-            <pc:sldMk cId="2578654956" sldId="269"/>
-            <ac:picMk id="2050" creationId="{3E7513AA-DB90-4008-9E95-9890074B0CCE}"/>
-          </ac:picMkLst>
-        </pc:picChg>
-      </pc:sldChg>
-      <pc:sldChg chg="modSp mod ord modTransition setBg">
-        <pc:chgData name="François Espiasse" userId="c0683628fcfb6d84" providerId="LiveId" clId="{DD509A43-B970-4054-B7AC-6D7EC92A76F8}" dt="2019-04-18T20:49:25.094" v="4649"/>
-        <pc:sldMkLst>
-          <pc:docMk/>
-          <pc:sldMk cId="628382419" sldId="270"/>
-        </pc:sldMkLst>
-        <pc:spChg chg="mod">
-          <ac:chgData name="François Espiasse" userId="c0683628fcfb6d84" providerId="LiveId" clId="{DD509A43-B970-4054-B7AC-6D7EC92A76F8}" dt="2019-04-17T14:47:01.513" v="1083" actId="122"/>
-          <ac:spMkLst>
-            <pc:docMk/>
-            <pc:sldMk cId="628382419" sldId="270"/>
-            <ac:spMk id="2" creationId="{9217F341-07CB-4121-943F-8D8F8E22F211}"/>
-          </ac:spMkLst>
-        </pc:spChg>
-        <pc:spChg chg="mod">
-          <ac:chgData name="François Espiasse" userId="c0683628fcfb6d84" providerId="LiveId" clId="{DD509A43-B970-4054-B7AC-6D7EC92A76F8}" dt="2019-04-18T19:50:53.603" v="3043" actId="255"/>
-          <ac:spMkLst>
-            <pc:docMk/>
-            <pc:sldMk cId="628382419" sldId="270"/>
-            <ac:spMk id="6" creationId="{6C596A21-BE42-468F-A91E-70DC7EEF1040}"/>
-          </ac:spMkLst>
-        </pc:spChg>
-        <pc:picChg chg="mod">
-          <ac:chgData name="François Espiasse" userId="c0683628fcfb6d84" providerId="LiveId" clId="{DD509A43-B970-4054-B7AC-6D7EC92A76F8}" dt="2019-04-17T14:46:47.283" v="1080" actId="14100"/>
-          <ac:picMkLst>
-            <pc:docMk/>
-            <pc:sldMk cId="628382419" sldId="270"/>
-            <ac:picMk id="4098" creationId="{000B45C6-3C4A-4485-982F-BF3321AA98B2}"/>
-          </ac:picMkLst>
-        </pc:picChg>
-      </pc:sldChg>
-      <pc:sldChg chg="addSp delSp modSp mod modTransition setBg setClrOvrMap">
-        <pc:chgData name="François Espiasse" userId="c0683628fcfb6d84" providerId="LiveId" clId="{DD509A43-B970-4054-B7AC-6D7EC92A76F8}" dt="2019-04-18T21:00:57.614" v="4656" actId="20577"/>
-        <pc:sldMkLst>
-          <pc:docMk/>
-          <pc:sldMk cId="1537129935" sldId="271"/>
-        </pc:sldMkLst>
-        <pc:spChg chg="mod">
-          <ac:chgData name="François Espiasse" userId="c0683628fcfb6d84" providerId="LiveId" clId="{DD509A43-B970-4054-B7AC-6D7EC92A76F8}" dt="2019-04-16T22:26:44.459" v="539" actId="26606"/>
-          <ac:spMkLst>
-            <pc:docMk/>
-            <pc:sldMk cId="1537129935" sldId="271"/>
-            <ac:spMk id="2" creationId="{9217F341-07CB-4121-943F-8D8F8E22F211}"/>
-          </ac:spMkLst>
-        </pc:spChg>
-        <pc:spChg chg="add del mod">
-          <ac:chgData name="François Espiasse" userId="c0683628fcfb6d84" providerId="LiveId" clId="{DD509A43-B970-4054-B7AC-6D7EC92A76F8}" dt="2019-04-18T21:00:57.614" v="4656" actId="20577"/>
-          <ac:spMkLst>
-            <pc:docMk/>
-            <pc:sldMk cId="1537129935" sldId="271"/>
-            <ac:spMk id="3" creationId="{2ED55F86-98B7-4496-BCEF-A8A40D70AD12}"/>
-          </ac:spMkLst>
-        </pc:spChg>
-        <pc:spChg chg="add del">
-          <ac:chgData name="François Espiasse" userId="c0683628fcfb6d84" providerId="LiveId" clId="{DD509A43-B970-4054-B7AC-6D7EC92A76F8}" dt="2019-04-16T22:26:39.144" v="537" actId="26606"/>
-          <ac:spMkLst>
-            <pc:docMk/>
-            <pc:sldMk cId="1537129935" sldId="271"/>
-            <ac:spMk id="8" creationId="{E9B448F0-DA06-4165-AB5F-4330A20E06D0}"/>
-          </ac:spMkLst>
-        </pc:spChg>
-        <pc:spChg chg="add del">
-          <ac:chgData name="François Espiasse" userId="c0683628fcfb6d84" providerId="LiveId" clId="{DD509A43-B970-4054-B7AC-6D7EC92A76F8}" dt="2019-04-16T22:26:16.012" v="531" actId="26606"/>
-          <ac:spMkLst>
-            <pc:docMk/>
-            <pc:sldMk cId="1537129935" sldId="271"/>
-            <ac:spMk id="10" creationId="{01F67CC9-D773-4B4B-8A55-D5DAEC3414BD}"/>
-          </ac:spMkLst>
-        </pc:spChg>
-        <pc:spChg chg="add del">
-          <ac:chgData name="François Espiasse" userId="c0683628fcfb6d84" providerId="LiveId" clId="{DD509A43-B970-4054-B7AC-6D7EC92A76F8}" dt="2019-04-16T22:26:34.903" v="535" actId="26606"/>
-          <ac:spMkLst>
-            <pc:docMk/>
-            <pc:sldMk cId="1537129935" sldId="271"/>
-            <ac:spMk id="14" creationId="{01F67CC9-D773-4B4B-8A55-D5DAEC3414BD}"/>
-          </ac:spMkLst>
-        </pc:spChg>
-        <pc:spChg chg="add del">
-          <ac:chgData name="François Espiasse" userId="c0683628fcfb6d84" providerId="LiveId" clId="{DD509A43-B970-4054-B7AC-6D7EC92A76F8}" dt="2019-04-16T22:26:39.144" v="537" actId="26606"/>
-          <ac:spMkLst>
-            <pc:docMk/>
-            <pc:sldMk cId="1537129935" sldId="271"/>
-            <ac:spMk id="55" creationId="{2ED55F86-98B7-4496-BCEF-A8A40D70AD12}"/>
-          </ac:spMkLst>
-        </pc:spChg>
-        <pc:spChg chg="add del">
-          <ac:chgData name="François Espiasse" userId="c0683628fcfb6d84" providerId="LiveId" clId="{DD509A43-B970-4054-B7AC-6D7EC92A76F8}" dt="2019-04-16T22:26:44.459" v="539" actId="26606"/>
-          <ac:spMkLst>
-            <pc:docMk/>
-            <pc:sldMk cId="1537129935" sldId="271"/>
-            <ac:spMk id="57" creationId="{E978A47D-4F17-40FE-AB70-7AF78A9575EB}"/>
-          </ac:spMkLst>
-        </pc:spChg>
-        <pc:spChg chg="add del">
-          <ac:chgData name="François Espiasse" userId="c0683628fcfb6d84" providerId="LiveId" clId="{DD509A43-B970-4054-B7AC-6D7EC92A76F8}" dt="2019-04-16T22:26:44.459" v="539" actId="26606"/>
-          <ac:spMkLst>
-            <pc:docMk/>
-            <pc:sldMk cId="1537129935" sldId="271"/>
-            <ac:spMk id="62" creationId="{2ED55F86-98B7-4496-BCEF-A8A40D70AD12}"/>
-          </ac:spMkLst>
-        </pc:spChg>
-        <pc:grpChg chg="add del">
-          <ac:chgData name="François Espiasse" userId="c0683628fcfb6d84" providerId="LiveId" clId="{DD509A43-B970-4054-B7AC-6D7EC92A76F8}" dt="2019-04-16T22:26:39.144" v="537" actId="26606"/>
-          <ac:grpSpMkLst>
-            <pc:docMk/>
-            <pc:sldMk cId="1537129935" sldId="271"/>
-            <ac:grpSpMk id="41" creationId="{8DB4BB99-C854-45F9-BED1-63D15E3A2411}"/>
-          </ac:grpSpMkLst>
-        </pc:grpChg>
-        <pc:grpChg chg="add del">
-          <ac:chgData name="François Espiasse" userId="c0683628fcfb6d84" providerId="LiveId" clId="{DD509A43-B970-4054-B7AC-6D7EC92A76F8}" dt="2019-04-16T22:26:39.144" v="537" actId="26606"/>
-          <ac:grpSpMkLst>
-            <pc:docMk/>
-            <pc:sldMk cId="1537129935" sldId="271"/>
-            <ac:grpSpMk id="52" creationId="{2576BCDF-119F-4EB5-83D7-ED823C93EBBD}"/>
-          </ac:grpSpMkLst>
-        </pc:grpChg>
-        <pc:grpChg chg="add del">
-          <ac:chgData name="François Espiasse" userId="c0683628fcfb6d84" providerId="LiveId" clId="{DD509A43-B970-4054-B7AC-6D7EC92A76F8}" dt="2019-04-16T22:26:44.459" v="539" actId="26606"/>
-          <ac:grpSpMkLst>
-            <pc:docMk/>
-            <pc:sldMk cId="1537129935" sldId="271"/>
-            <ac:grpSpMk id="58" creationId="{85BE3A7E-6A3F-401E-A025-BBB8FDB8DD30}"/>
-          </ac:grpSpMkLst>
-        </pc:grpChg>
-        <pc:grpChg chg="add del">
-          <ac:chgData name="François Espiasse" userId="c0683628fcfb6d84" providerId="LiveId" clId="{DD509A43-B970-4054-B7AC-6D7EC92A76F8}" dt="2019-04-16T22:26:44.459" v="539" actId="26606"/>
-          <ac:grpSpMkLst>
-            <pc:docMk/>
-            <pc:sldMk cId="1537129935" sldId="271"/>
-            <ac:grpSpMk id="63" creationId="{F4E035BE-9FF4-43D3-BC25-CF582D7FF85E}"/>
-          </ac:grpSpMkLst>
-        </pc:grpChg>
-        <pc:graphicFrameChg chg="add del">
-          <ac:chgData name="François Espiasse" userId="c0683628fcfb6d84" providerId="LiveId" clId="{DD509A43-B970-4054-B7AC-6D7EC92A76F8}" dt="2019-04-16T22:26:16.012" v="531" actId="26606"/>
-          <ac:graphicFrameMkLst>
-            <pc:docMk/>
-            <pc:sldMk cId="1537129935" sldId="271"/>
-            <ac:graphicFrameMk id="5" creationId="{696F28EA-47B2-4CEE-A4CD-E207E44815BB}"/>
-          </ac:graphicFrameMkLst>
-        </pc:graphicFrameChg>
-        <pc:graphicFrameChg chg="add del">
-          <ac:chgData name="François Espiasse" userId="c0683628fcfb6d84" providerId="LiveId" clId="{DD509A43-B970-4054-B7AC-6D7EC92A76F8}" dt="2019-04-16T22:26:20.242" v="533" actId="26606"/>
-          <ac:graphicFrameMkLst>
-            <pc:docMk/>
-            <pc:sldMk cId="1537129935" sldId="271"/>
-            <ac:graphicFrameMk id="12" creationId="{F123606E-5184-424F-B39E-755D56470EAF}"/>
-          </ac:graphicFrameMkLst>
-        </pc:graphicFrameChg>
-        <pc:graphicFrameChg chg="add del">
-          <ac:chgData name="François Espiasse" userId="c0683628fcfb6d84" providerId="LiveId" clId="{DD509A43-B970-4054-B7AC-6D7EC92A76F8}" dt="2019-04-16T22:26:34.903" v="535" actId="26606"/>
-          <ac:graphicFrameMkLst>
-            <pc:docMk/>
-            <pc:sldMk cId="1537129935" sldId="271"/>
-            <ac:graphicFrameMk id="15" creationId="{21D509EB-AF99-4F3F-85FA-64A90E0642F1}"/>
-          </ac:graphicFrameMkLst>
-        </pc:graphicFrameChg>
-        <pc:picChg chg="add del">
-          <ac:chgData name="François Espiasse" userId="c0683628fcfb6d84" providerId="LiveId" clId="{DD509A43-B970-4054-B7AC-6D7EC92A76F8}" dt="2019-04-16T22:26:39.144" v="537" actId="26606"/>
-          <ac:picMkLst>
-            <pc:docMk/>
-            <pc:sldMk cId="1537129935" sldId="271"/>
-            <ac:picMk id="40" creationId="{92D83638-A467-411A-9C31-FE9A111CD885}"/>
-          </ac:picMkLst>
-        </pc:picChg>
-        <pc:cxnChg chg="add del">
-          <ac:chgData name="François Espiasse" userId="c0683628fcfb6d84" providerId="LiveId" clId="{DD509A43-B970-4054-B7AC-6D7EC92A76F8}" dt="2019-04-16T22:26:44.459" v="539" actId="26606"/>
-          <ac:cxnSpMkLst>
-            <pc:docMk/>
-            <pc:sldMk cId="1537129935" sldId="271"/>
-            <ac:cxnSpMk id="39" creationId="{085ECEC0-FF5D-4348-92C7-1EA7C61E770C}"/>
-          </ac:cxnSpMkLst>
-        </pc:cxnChg>
-      </pc:sldChg>
-      <pc:sldChg chg="del">
-        <pc:chgData name="François Espiasse" userId="c0683628fcfb6d84" providerId="LiveId" clId="{DD509A43-B970-4054-B7AC-6D7EC92A76F8}" dt="2019-04-17T14:49:47.280" v="1084" actId="2696"/>
-        <pc:sldMkLst>
-          <pc:docMk/>
-          <pc:sldMk cId="99118606" sldId="272"/>
-        </pc:sldMkLst>
-      </pc:sldChg>
-      <pc:sldChg chg="modSp ord modTransition">
-        <pc:chgData name="François Espiasse" userId="c0683628fcfb6d84" providerId="LiveId" clId="{DD509A43-B970-4054-B7AC-6D7EC92A76F8}" dt="2019-04-18T08:04:23.936" v="2495" actId="313"/>
-        <pc:sldMkLst>
-          <pc:docMk/>
-          <pc:sldMk cId="2460408245" sldId="273"/>
-        </pc:sldMkLst>
-        <pc:spChg chg="mod">
-          <ac:chgData name="François Espiasse" userId="c0683628fcfb6d84" providerId="LiveId" clId="{DD509A43-B970-4054-B7AC-6D7EC92A76F8}" dt="2019-04-17T14:51:39.816" v="1136"/>
-          <ac:spMkLst>
-            <pc:docMk/>
-            <pc:sldMk cId="2460408245" sldId="273"/>
-            <ac:spMk id="2" creationId="{9217F341-07CB-4121-943F-8D8F8E22F211}"/>
-          </ac:spMkLst>
-        </pc:spChg>
-        <pc:spChg chg="mod">
-          <ac:chgData name="François Espiasse" userId="c0683628fcfb6d84" providerId="LiveId" clId="{DD509A43-B970-4054-B7AC-6D7EC92A76F8}" dt="2019-04-18T08:04:23.936" v="2495" actId="313"/>
-          <ac:spMkLst>
-            <pc:docMk/>
-            <pc:sldMk cId="2460408245" sldId="273"/>
-            <ac:spMk id="3" creationId="{2ED55F86-98B7-4496-BCEF-A8A40D70AD12}"/>
-          </ac:spMkLst>
-        </pc:spChg>
-      </pc:sldChg>
-      <pc:sldChg chg="addSp delSp modSp mod modTransition setBg delDesignElem">
-        <pc:chgData name="François Espiasse" userId="c0683628fcfb6d84" providerId="LiveId" clId="{DD509A43-B970-4054-B7AC-6D7EC92A76F8}" dt="2019-04-18T20:13:53.250" v="4057" actId="6549"/>
-        <pc:sldMkLst>
-          <pc:docMk/>
-          <pc:sldMk cId="3792283636" sldId="274"/>
-        </pc:sldMkLst>
-        <pc:spChg chg="mod">
-          <ac:chgData name="François Espiasse" userId="c0683628fcfb6d84" providerId="LiveId" clId="{DD509A43-B970-4054-B7AC-6D7EC92A76F8}" dt="2019-04-17T14:57:57.114" v="1210" actId="121"/>
-          <ac:spMkLst>
-            <pc:docMk/>
-            <pc:sldMk cId="3792283636" sldId="274"/>
-            <ac:spMk id="2" creationId="{9217F341-07CB-4121-943F-8D8F8E22F211}"/>
-          </ac:spMkLst>
-        </pc:spChg>
-        <pc:spChg chg="mod">
-          <ac:chgData name="François Espiasse" userId="c0683628fcfb6d84" providerId="LiveId" clId="{DD509A43-B970-4054-B7AC-6D7EC92A76F8}" dt="2019-04-18T20:13:53.250" v="4057" actId="6549"/>
-          <ac:spMkLst>
-            <pc:docMk/>
-            <pc:sldMk cId="3792283636" sldId="274"/>
-            <ac:spMk id="3" creationId="{2ED55F86-98B7-4496-BCEF-A8A40D70AD12}"/>
-          </ac:spMkLst>
-        </pc:spChg>
-        <pc:spChg chg="add del">
-          <ac:chgData name="François Espiasse" userId="c0683628fcfb6d84" providerId="LiveId" clId="{DD509A43-B970-4054-B7AC-6D7EC92A76F8}" dt="2019-04-18T08:12:31.126" v="2606"/>
-          <ac:spMkLst>
-            <pc:docMk/>
-            <pc:sldMk cId="3792283636" sldId="274"/>
-            <ac:spMk id="8" creationId="{6BFC9644-673A-459F-B3C5-9310A4E50E3B}"/>
-          </ac:spMkLst>
-        </pc:spChg>
-        <pc:spChg chg="add del">
-          <ac:chgData name="François Espiasse" userId="c0683628fcfb6d84" providerId="LiveId" clId="{DD509A43-B970-4054-B7AC-6D7EC92A76F8}" dt="2019-04-18T08:12:31.126" v="2606"/>
-          <ac:spMkLst>
-            <pc:docMk/>
-            <pc:sldMk cId="3792283636" sldId="274"/>
-            <ac:spMk id="39" creationId="{7D1C411D-0818-4640-8657-2AF78250C802}"/>
-          </ac:spMkLst>
-        </pc:spChg>
-        <pc:grpChg chg="add del">
-          <ac:chgData name="François Espiasse" userId="c0683628fcfb6d84" providerId="LiveId" clId="{DD509A43-B970-4054-B7AC-6D7EC92A76F8}" dt="2019-04-18T08:12:31.126" v="2606"/>
-          <ac:grpSpMkLst>
-            <pc:docMk/>
-            <pc:sldMk cId="3792283636" sldId="274"/>
-            <ac:grpSpMk id="10" creationId="{4ADB9295-9645-4BF2-ADFD-75800B7FAD06}"/>
-          </ac:grpSpMkLst>
-        </pc:grpChg>
-      </pc:sldChg>
-      <pc:sldChg chg="addSp delSp modSp mod modTransition setBg delDesignElem">
-        <pc:chgData name="François Espiasse" userId="c0683628fcfb6d84" providerId="LiveId" clId="{DD509A43-B970-4054-B7AC-6D7EC92A76F8}" dt="2019-04-18T20:21:59.161" v="4423" actId="27636"/>
-        <pc:sldMkLst>
-          <pc:docMk/>
-          <pc:sldMk cId="4270923103" sldId="275"/>
-        </pc:sldMkLst>
-        <pc:spChg chg="mod">
-          <ac:chgData name="François Espiasse" userId="c0683628fcfb6d84" providerId="LiveId" clId="{DD509A43-B970-4054-B7AC-6D7EC92A76F8}" dt="2019-04-17T14:56:52.604" v="1207" actId="26606"/>
-          <ac:spMkLst>
-            <pc:docMk/>
-            <pc:sldMk cId="4270923103" sldId="275"/>
-            <ac:spMk id="2" creationId="{9217F341-07CB-4121-943F-8D8F8E22F211}"/>
-          </ac:spMkLst>
-        </pc:spChg>
-        <pc:spChg chg="mod">
-          <ac:chgData name="François Espiasse" userId="c0683628fcfb6d84" providerId="LiveId" clId="{DD509A43-B970-4054-B7AC-6D7EC92A76F8}" dt="2019-04-18T20:21:59.161" v="4423" actId="27636"/>
-          <ac:spMkLst>
-            <pc:docMk/>
-            <pc:sldMk cId="4270923103" sldId="275"/>
-            <ac:spMk id="3" creationId="{2ED55F86-98B7-4496-BCEF-A8A40D70AD12}"/>
-          </ac:spMkLst>
-        </pc:spChg>
-        <pc:spChg chg="add del">
-          <ac:chgData name="François Espiasse" userId="c0683628fcfb6d84" providerId="LiveId" clId="{DD509A43-B970-4054-B7AC-6D7EC92A76F8}" dt="2019-04-18T08:12:31.126" v="2606"/>
-          <ac:spMkLst>
-            <pc:docMk/>
-            <pc:sldMk cId="4270923103" sldId="275"/>
-            <ac:spMk id="8" creationId="{E978A47D-4F17-40FE-AB70-7AF78A9575EB}"/>
-          </ac:spMkLst>
-        </pc:spChg>
-        <pc:grpChg chg="add del">
-          <ac:chgData name="François Espiasse" userId="c0683628fcfb6d84" providerId="LiveId" clId="{DD509A43-B970-4054-B7AC-6D7EC92A76F8}" dt="2019-04-18T08:12:31.126" v="2606"/>
-          <ac:grpSpMkLst>
-            <pc:docMk/>
-            <pc:sldMk cId="4270923103" sldId="275"/>
-            <ac:grpSpMk id="10" creationId="{85BE3A7E-6A3F-401E-A025-BBB8FDB8DD30}"/>
-          </ac:grpSpMkLst>
-        </pc:grpChg>
-        <pc:grpChg chg="add del">
-          <ac:chgData name="François Espiasse" userId="c0683628fcfb6d84" providerId="LiveId" clId="{DD509A43-B970-4054-B7AC-6D7EC92A76F8}" dt="2019-04-18T08:12:31.126" v="2606"/>
-          <ac:grpSpMkLst>
-            <pc:docMk/>
-            <pc:sldMk cId="4270923103" sldId="275"/>
-            <ac:grpSpMk id="41" creationId="{F4E035BE-9FF4-43D3-BC25-CF582D7FF85E}"/>
-          </ac:grpSpMkLst>
-        </pc:grpChg>
-        <pc:cxnChg chg="add del">
-          <ac:chgData name="François Espiasse" userId="c0683628fcfb6d84" providerId="LiveId" clId="{DD509A43-B970-4054-B7AC-6D7EC92A76F8}" dt="2019-04-18T08:12:31.126" v="2606"/>
-          <ac:cxnSpMkLst>
-            <pc:docMk/>
-            <pc:sldMk cId="4270923103" sldId="275"/>
-            <ac:cxnSpMk id="39" creationId="{085ECEC0-FF5D-4348-92C7-1EA7C61E770C}"/>
-          </ac:cxnSpMkLst>
-        </pc:cxnChg>
-      </pc:sldChg>
-      <pc:sldChg chg="modSp ord modTransition">
-        <pc:chgData name="François Espiasse" userId="c0683628fcfb6d84" providerId="LiveId" clId="{DD509A43-B970-4054-B7AC-6D7EC92A76F8}" dt="2019-04-18T20:33:58.421" v="4645"/>
-        <pc:sldMkLst>
-          <pc:docMk/>
-          <pc:sldMk cId="1883906600" sldId="276"/>
-        </pc:sldMkLst>
-        <pc:spChg chg="mod">
-          <ac:chgData name="François Espiasse" userId="c0683628fcfb6d84" providerId="LiveId" clId="{DD509A43-B970-4054-B7AC-6D7EC92A76F8}" dt="2019-04-18T20:33:07.707" v="4643" actId="403"/>
-          <ac:spMkLst>
-            <pc:docMk/>
-            <pc:sldMk cId="1883906600" sldId="276"/>
-            <ac:spMk id="2" creationId="{9217F341-07CB-4121-943F-8D8F8E22F211}"/>
-          </ac:spMkLst>
-        </pc:spChg>
-      </pc:sldChg>
-      <pc:sldChg chg="addSp delSp modSp modTransition">
-        <pc:chgData name="François Espiasse" userId="c0683628fcfb6d84" providerId="LiveId" clId="{DD509A43-B970-4054-B7AC-6D7EC92A76F8}" dt="2019-04-18T20:04:03.998" v="3518" actId="5793"/>
-        <pc:sldMkLst>
-          <pc:docMk/>
-          <pc:sldMk cId="943261021" sldId="277"/>
-        </pc:sldMkLst>
-        <pc:spChg chg="mod">
-          <ac:chgData name="François Espiasse" userId="c0683628fcfb6d84" providerId="LiveId" clId="{DD509A43-B970-4054-B7AC-6D7EC92A76F8}" dt="2019-04-18T19:45:44.101" v="2907" actId="20577"/>
-          <ac:spMkLst>
-            <pc:docMk/>
-            <pc:sldMk cId="943261021" sldId="277"/>
-            <ac:spMk id="3" creationId="{2ED55F86-98B7-4496-BCEF-A8A40D70AD12}"/>
-          </ac:spMkLst>
-        </pc:spChg>
-        <pc:spChg chg="add del mod">
-          <ac:chgData name="François Espiasse" userId="c0683628fcfb6d84" providerId="LiveId" clId="{DD509A43-B970-4054-B7AC-6D7EC92A76F8}" dt="2019-04-17T15:24:18.303" v="1497" actId="767"/>
-          <ac:spMkLst>
-            <pc:docMk/>
-            <pc:sldMk cId="943261021" sldId="277"/>
-            <ac:spMk id="4" creationId="{4152CD19-A683-494C-AEAE-8F0AD490687F}"/>
-          </ac:spMkLst>
-        </pc:spChg>
-        <pc:spChg chg="mod">
-          <ac:chgData name="François Espiasse" userId="c0683628fcfb6d84" providerId="LiveId" clId="{DD509A43-B970-4054-B7AC-6D7EC92A76F8}" dt="2019-04-18T20:04:03.998" v="3518" actId="5793"/>
-          <ac:spMkLst>
-            <pc:docMk/>
-            <pc:sldMk cId="943261021" sldId="277"/>
-            <ac:spMk id="8" creationId="{E9EC9BDF-25A5-45FB-B403-DB8553791833}"/>
-          </ac:spMkLst>
-        </pc:spChg>
-      </pc:sldChg>
-      <pc:sldChg chg="addSp delSp modSp mod ord modTransition setBg delDesignElem">
-        <pc:chgData name="François Espiasse" userId="c0683628fcfb6d84" providerId="LiveId" clId="{DD509A43-B970-4054-B7AC-6D7EC92A76F8}" dt="2019-04-17T15:05:27.283" v="1284"/>
-        <pc:sldMkLst>
-          <pc:docMk/>
-          <pc:sldMk cId="983582950" sldId="279"/>
-        </pc:sldMkLst>
-        <pc:spChg chg="mod">
-          <ac:chgData name="François Espiasse" userId="c0683628fcfb6d84" providerId="LiveId" clId="{DD509A43-B970-4054-B7AC-6D7EC92A76F8}" dt="2019-04-17T14:43:20.274" v="1062" actId="20577"/>
-          <ac:spMkLst>
-            <pc:docMk/>
-            <pc:sldMk cId="983582950" sldId="279"/>
-            <ac:spMk id="2" creationId="{00000000-0000-0000-0000-000000000000}"/>
-          </ac:spMkLst>
-        </pc:spChg>
-        <pc:spChg chg="del mod">
-          <ac:chgData name="François Espiasse" userId="c0683628fcfb6d84" providerId="LiveId" clId="{DD509A43-B970-4054-B7AC-6D7EC92A76F8}" dt="2019-04-16T22:03:23.592" v="327" actId="26606"/>
-          <ac:spMkLst>
-            <pc:docMk/>
-            <pc:sldMk cId="983582950" sldId="279"/>
-            <ac:spMk id="3" creationId="{00000000-0000-0000-0000-000000000000}"/>
-          </ac:spMkLst>
-        </pc:spChg>
-        <pc:spChg chg="add del mod">
-          <ac:chgData name="François Espiasse" userId="c0683628fcfb6d84" providerId="LiveId" clId="{DD509A43-B970-4054-B7AC-6D7EC92A76F8}" dt="2019-04-16T22:46:40.638" v="819" actId="26606"/>
-          <ac:spMkLst>
-            <pc:docMk/>
-            <pc:sldMk cId="983582950" sldId="279"/>
-            <ac:spMk id="6" creationId="{28C661D5-F325-402A-B34A-BA01CA61A89A}"/>
-          </ac:spMkLst>
-        </pc:spChg>
-        <pc:spChg chg="add del">
-          <ac:chgData name="François Espiasse" userId="c0683628fcfb6d84" providerId="LiveId" clId="{DD509A43-B970-4054-B7AC-6D7EC92A76F8}" dt="2019-04-16T22:47:55.045" v="822" actId="26606"/>
-          <ac:spMkLst>
-            <pc:docMk/>
-            <pc:sldMk cId="983582950" sldId="279"/>
-            <ac:spMk id="9" creationId="{01F67CC9-D773-4B4B-8A55-D5DAEC3414BD}"/>
-          </ac:spMkLst>
-        </pc:spChg>
-        <pc:spChg chg="add del">
-          <ac:chgData name="François Espiasse" userId="c0683628fcfb6d84" providerId="LiveId" clId="{DD509A43-B970-4054-B7AC-6D7EC92A76F8}" dt="2019-04-16T22:12:22.286" v="432"/>
-          <ac:spMkLst>
-            <pc:docMk/>
-            <pc:sldMk cId="983582950" sldId="279"/>
-            <ac:spMk id="10" creationId="{35E27155-981B-41FD-8670-5A3DAB78E144}"/>
-          </ac:spMkLst>
-        </pc:spChg>
-        <pc:graphicFrameChg chg="add del mod">
-          <ac:chgData name="François Espiasse" userId="c0683628fcfb6d84" providerId="LiveId" clId="{DD509A43-B970-4054-B7AC-6D7EC92A76F8}" dt="2019-04-16T22:43:26.100" v="711" actId="478"/>
-          <ac:graphicFrameMkLst>
-            <pc:docMk/>
-            <pc:sldMk cId="983582950" sldId="279"/>
-            <ac:graphicFrameMk id="5" creationId="{48A4FA99-ACF2-47CC-AD1C-8AD1E2CFDC00}"/>
-          </ac:graphicFrameMkLst>
-        </pc:graphicFrameChg>
-        <pc:graphicFrameChg chg="add del">
-          <ac:chgData name="François Espiasse" userId="c0683628fcfb6d84" providerId="LiveId" clId="{DD509A43-B970-4054-B7AC-6D7EC92A76F8}" dt="2019-04-16T22:44:12.847" v="769" actId="26606"/>
-          <ac:graphicFrameMkLst>
-            <pc:docMk/>
-            <pc:sldMk cId="983582950" sldId="279"/>
-            <ac:graphicFrameMk id="8" creationId="{7272BEB0-1521-44FC-BCFC-86B6C565A308}"/>
-          </ac:graphicFrameMkLst>
-        </pc:graphicFrameChg>
-        <pc:graphicFrameChg chg="add del">
-          <ac:chgData name="François Espiasse" userId="c0683628fcfb6d84" providerId="LiveId" clId="{DD509A43-B970-4054-B7AC-6D7EC92A76F8}" dt="2019-04-16T22:44:13.794" v="771" actId="26606"/>
-          <ac:graphicFrameMkLst>
-            <pc:docMk/>
-            <pc:sldMk cId="983582950" sldId="279"/>
-            <ac:graphicFrameMk id="11" creationId="{96DB6547-DB25-4107-B6A2-B208EF6A0C95}"/>
-          </ac:graphicFrameMkLst>
-        </pc:graphicFrameChg>
-        <pc:graphicFrameChg chg="add mod modGraphic">
-          <ac:chgData name="François Espiasse" userId="c0683628fcfb6d84" providerId="LiveId" clId="{DD509A43-B970-4054-B7AC-6D7EC92A76F8}" dt="2019-04-16T22:47:55.045" v="822" actId="26606"/>
-          <ac:graphicFrameMkLst>
-            <pc:docMk/>
-            <pc:sldMk cId="983582950" sldId="279"/>
-            <ac:graphicFrameMk id="12" creationId="{2373805C-7BB2-4DD3-8ACD-C3241EE1D9B8}"/>
-          </ac:graphicFrameMkLst>
-        </pc:graphicFrameChg>
-        <pc:graphicFrameChg chg="add del">
-          <ac:chgData name="François Espiasse" userId="c0683628fcfb6d84" providerId="LiveId" clId="{DD509A43-B970-4054-B7AC-6D7EC92A76F8}" dt="2019-04-16T22:44:14.599" v="773" actId="26606"/>
-          <ac:graphicFrameMkLst>
-            <pc:docMk/>
-            <pc:sldMk cId="983582950" sldId="279"/>
-            <ac:graphicFrameMk id="13" creationId="{7272BEB0-1521-44FC-BCFC-86B6C565A308}"/>
-          </ac:graphicFrameMkLst>
-        </pc:graphicFrameChg>
-        <pc:graphicFrameChg chg="add del mod">
-          <ac:chgData name="François Espiasse" userId="c0683628fcfb6d84" providerId="LiveId" clId="{DD509A43-B970-4054-B7AC-6D7EC92A76F8}" dt="2019-04-16T22:45:17.386" v="788" actId="26606"/>
-          <ac:graphicFrameMkLst>
-            <pc:docMk/>
-            <pc:sldMk cId="983582950" sldId="279"/>
-            <ac:graphicFrameMk id="15" creationId="{96DB6547-DB25-4107-B6A2-B208EF6A0C95}"/>
-          </ac:graphicFrameMkLst>
-        </pc:graphicFrameChg>
-      </pc:sldChg>
-      <pc:sldChg chg="delSp modTransition delDesignElem">
-        <pc:chgData name="François Espiasse" userId="c0683628fcfb6d84" providerId="LiveId" clId="{DD509A43-B970-4054-B7AC-6D7EC92A76F8}" dt="2019-04-17T15:05:57.619" v="1288"/>
-        <pc:sldMkLst>
-          <pc:docMk/>
-          <pc:sldMk cId="3166182098" sldId="281"/>
-        </pc:sldMkLst>
-        <pc:spChg chg="del">
-          <ac:chgData name="François Espiasse" userId="c0683628fcfb6d84" providerId="LiveId" clId="{DD509A43-B970-4054-B7AC-6D7EC92A76F8}" dt="2019-04-16T22:12:22.286" v="432"/>
-          <ac:spMkLst>
-            <pc:docMk/>
-            <pc:sldMk cId="3166182098" sldId="281"/>
-            <ac:spMk id="10" creationId="{35E27155-981B-41FD-8670-5A3DAB78E144}"/>
-          </ac:spMkLst>
-        </pc:spChg>
-      </pc:sldChg>
-      <pc:sldChg chg="addSp delSp modSp mod modTransition setBg delDesignElem">
-        <pc:chgData name="François Espiasse" userId="c0683628fcfb6d84" providerId="LiveId" clId="{DD509A43-B970-4054-B7AC-6D7EC92A76F8}" dt="2019-04-18T08:15:09.918" v="2630"/>
-        <pc:sldMkLst>
-          <pc:docMk/>
-          <pc:sldMk cId="3656903316" sldId="283"/>
-        </pc:sldMkLst>
-        <pc:spChg chg="mod">
-          <ac:chgData name="François Espiasse" userId="c0683628fcfb6d84" providerId="LiveId" clId="{DD509A43-B970-4054-B7AC-6D7EC92A76F8}" dt="2019-04-16T22:40:34.881" v="699" actId="122"/>
-          <ac:spMkLst>
-            <pc:docMk/>
-            <pc:sldMk cId="3656903316" sldId="283"/>
-            <ac:spMk id="2" creationId="{00000000-0000-0000-0000-000000000000}"/>
-          </ac:spMkLst>
-        </pc:spChg>
-        <pc:spChg chg="del">
-          <ac:chgData name="François Espiasse" userId="c0683628fcfb6d84" providerId="LiveId" clId="{DD509A43-B970-4054-B7AC-6D7EC92A76F8}" dt="2019-04-16T22:05:50.943" v="330" actId="26606"/>
-          <ac:spMkLst>
-            <pc:docMk/>
-            <pc:sldMk cId="3656903316" sldId="283"/>
-            <ac:spMk id="3" creationId="{00000000-0000-0000-0000-000000000000}"/>
-          </ac:spMkLst>
-        </pc:spChg>
-        <pc:spChg chg="add del">
-          <ac:chgData name="François Espiasse" userId="c0683628fcfb6d84" providerId="LiveId" clId="{DD509A43-B970-4054-B7AC-6D7EC92A76F8}" dt="2019-04-16T22:12:22.286" v="432"/>
-          <ac:spMkLst>
-            <pc:docMk/>
-            <pc:sldMk cId="3656903316" sldId="283"/>
-            <ac:spMk id="10" creationId="{1B01FD75-57B4-4FE5-897D-D1E45CCFFC23}"/>
-          </ac:spMkLst>
-        </pc:spChg>
-        <pc:graphicFrameChg chg="add mod">
-          <ac:chgData name="François Espiasse" userId="c0683628fcfb6d84" providerId="LiveId" clId="{DD509A43-B970-4054-B7AC-6D7EC92A76F8}" dt="2019-04-18T08:15:09.918" v="2630"/>
-          <ac:graphicFrameMkLst>
-            <pc:docMk/>
-            <pc:sldMk cId="3656903316" sldId="283"/>
-            <ac:graphicFrameMk id="5" creationId="{5BA8CF53-F7DB-4AF2-9FF7-3C248BC57BA4}"/>
-          </ac:graphicFrameMkLst>
-        </pc:graphicFrameChg>
-      </pc:sldChg>
-      <pc:sldChg chg="addSp delSp modSp mod modTransition setBg delDesignElem">
-        <pc:chgData name="François Espiasse" userId="c0683628fcfb6d84" providerId="LiveId" clId="{DD509A43-B970-4054-B7AC-6D7EC92A76F8}" dt="2019-04-18T08:14:21.515" v="2627"/>
-        <pc:sldMkLst>
-          <pc:docMk/>
-          <pc:sldMk cId="3597866122" sldId="285"/>
-        </pc:sldMkLst>
-        <pc:spChg chg="add del mod">
-          <ac:chgData name="François Espiasse" userId="c0683628fcfb6d84" providerId="LiveId" clId="{DD509A43-B970-4054-B7AC-6D7EC92A76F8}" dt="2019-04-17T15:00:45.711" v="1247" actId="1076"/>
-          <ac:spMkLst>
-            <pc:docMk/>
-            <pc:sldMk cId="3597866122" sldId="285"/>
-            <ac:spMk id="2" creationId="{00000000-0000-0000-0000-000000000000}"/>
-          </ac:spMkLst>
-        </pc:spChg>
-        <pc:spChg chg="add del mod ord">
-          <ac:chgData name="François Espiasse" userId="c0683628fcfb6d84" providerId="LiveId" clId="{DD509A43-B970-4054-B7AC-6D7EC92A76F8}" dt="2019-04-18T08:14:21.515" v="2627"/>
-          <ac:spMkLst>
-            <pc:docMk/>
-            <pc:sldMk cId="3597866122" sldId="285"/>
-            <ac:spMk id="3" creationId="{00000000-0000-0000-0000-000000000000}"/>
-          </ac:spMkLst>
-        </pc:spChg>
-        <pc:spChg chg="add del mod">
-          <ac:chgData name="François Espiasse" userId="c0683628fcfb6d84" providerId="LiveId" clId="{DD509A43-B970-4054-B7AC-6D7EC92A76F8}" dt="2019-04-17T15:00:10.851" v="1241"/>
-          <ac:spMkLst>
-            <pc:docMk/>
-            <pc:sldMk cId="3597866122" sldId="285"/>
-            <ac:spMk id="4" creationId="{4118F404-60E9-4997-8984-99C2418100A7}"/>
-          </ac:spMkLst>
-        </pc:spChg>
-        <pc:spChg chg="add del mod">
-          <ac:chgData name="François Espiasse" userId="c0683628fcfb6d84" providerId="LiveId" clId="{DD509A43-B970-4054-B7AC-6D7EC92A76F8}" dt="2019-04-17T15:00:10.851" v="1241"/>
-          <ac:spMkLst>
-            <pc:docMk/>
-            <pc:sldMk cId="3597866122" sldId="285"/>
-            <ac:spMk id="5" creationId="{0DA2B65C-EC3F-4FEC-A07D-A650AE9F33DD}"/>
-          </ac:spMkLst>
-        </pc:spChg>
-        <pc:spChg chg="add del">
-          <ac:chgData name="François Espiasse" userId="c0683628fcfb6d84" providerId="LiveId" clId="{DD509A43-B970-4054-B7AC-6D7EC92A76F8}" dt="2019-04-16T21:54:54.289" v="186"/>
-          <ac:spMkLst>
-            <pc:docMk/>
-            <pc:sldMk cId="3597866122" sldId="285"/>
-            <ac:spMk id="6" creationId="{5E1D5F0A-E313-4E6D-9656-646F08CAAE71}"/>
-          </ac:spMkLst>
-        </pc:spChg>
-        <pc:spChg chg="add del mod">
-          <ac:chgData name="François Espiasse" userId="c0683628fcfb6d84" providerId="LiveId" clId="{DD509A43-B970-4054-B7AC-6D7EC92A76F8}" dt="2019-04-16T22:13:57.132" v="439"/>
-          <ac:spMkLst>
-            <pc:docMk/>
-            <pc:sldMk cId="3597866122" sldId="285"/>
-            <ac:spMk id="8" creationId="{37CC1EBD-631F-4B80-B353-72E360D10D70}"/>
-          </ac:spMkLst>
-        </pc:spChg>
-        <pc:spChg chg="add del mod">
-          <ac:chgData name="François Espiasse" userId="c0683628fcfb6d84" providerId="LiveId" clId="{DD509A43-B970-4054-B7AC-6D7EC92A76F8}" dt="2019-04-16T22:13:57.132" v="439"/>
-          <ac:spMkLst>
-            <pc:docMk/>
-            <pc:sldMk cId="3597866122" sldId="285"/>
-            <ac:spMk id="9" creationId="{112FF945-8D81-4622-987E-9BA0D8D2BDBE}"/>
-          </ac:spMkLst>
-        </pc:spChg>
-        <pc:spChg chg="add del mod">
-          <ac:chgData name="François Espiasse" userId="c0683628fcfb6d84" providerId="LiveId" clId="{DD509A43-B970-4054-B7AC-6D7EC92A76F8}" dt="2019-04-16T22:20:18.234" v="486" actId="11529"/>
-          <ac:spMkLst>
-            <pc:docMk/>
-            <pc:sldMk cId="3597866122" sldId="285"/>
-            <ac:spMk id="10" creationId="{44BE69F8-58E7-45E6-8C2E-FA0E05A3357F}"/>
-          </ac:spMkLst>
-        </pc:spChg>
-        <pc:spChg chg="add del mod ord">
-          <ac:chgData name="François Espiasse" userId="c0683628fcfb6d84" providerId="LiveId" clId="{DD509A43-B970-4054-B7AC-6D7EC92A76F8}" dt="2019-04-17T15:00:10.851" v="1241"/>
-          <ac:spMkLst>
-            <pc:docMk/>
-            <pc:sldMk cId="3597866122" sldId="285"/>
-            <ac:spMk id="11" creationId="{A1A5F3B8-4BE8-4D3B-9A9F-B3BB204CB27D}"/>
-          </ac:spMkLst>
-        </pc:spChg>
-        <pc:spChg chg="add mod">
-          <ac:chgData name="François Espiasse" userId="c0683628fcfb6d84" providerId="LiveId" clId="{DD509A43-B970-4054-B7AC-6D7EC92A76F8}" dt="2019-04-17T15:00:34.687" v="1245" actId="1076"/>
-          <ac:spMkLst>
-            <pc:docMk/>
-            <pc:sldMk cId="3597866122" sldId="285"/>
-            <ac:spMk id="12" creationId="{5E44EFF7-7605-4074-9A48-6DD4AAD1035E}"/>
-          </ac:spMkLst>
-        </pc:spChg>
-        <pc:spChg chg="add mod">
-          <ac:chgData name="François Espiasse" userId="c0683628fcfb6d84" providerId="LiveId" clId="{DD509A43-B970-4054-B7AC-6D7EC92A76F8}" dt="2019-04-17T15:00:34.687" v="1245" actId="1076"/>
-          <ac:spMkLst>
-            <pc:docMk/>
-            <pc:sldMk cId="3597866122" sldId="285"/>
-            <ac:spMk id="17" creationId="{CC43F560-D939-44E9-B227-DED93A3078B0}"/>
-          </ac:spMkLst>
-        </pc:spChg>
-        <pc:spChg chg="add mod">
-          <ac:chgData name="François Espiasse" userId="c0683628fcfb6d84" providerId="LiveId" clId="{DD509A43-B970-4054-B7AC-6D7EC92A76F8}" dt="2019-04-17T15:00:34.687" v="1245" actId="1076"/>
-          <ac:spMkLst>
-            <pc:docMk/>
-            <pc:sldMk cId="3597866122" sldId="285"/>
-            <ac:spMk id="18" creationId="{DDEB0D34-2F63-4823-BF56-7EA42D52D011}"/>
-          </ac:spMkLst>
-        </pc:spChg>
-        <pc:spChg chg="add del">
-          <ac:chgData name="François Espiasse" userId="c0683628fcfb6d84" providerId="LiveId" clId="{DD509A43-B970-4054-B7AC-6D7EC92A76F8}" dt="2019-04-16T21:56:34.847" v="193" actId="26606"/>
-          <ac:spMkLst>
-            <pc:docMk/>
-            <pc:sldMk cId="3597866122" sldId="285"/>
-            <ac:spMk id="71" creationId="{C4113752-DDE5-42DA-821D-C5CDEB122817}"/>
-          </ac:spMkLst>
-        </pc:spChg>
-        <pc:spChg chg="add del">
-          <ac:chgData name="François Espiasse" userId="c0683628fcfb6d84" providerId="LiveId" clId="{DD509A43-B970-4054-B7AC-6D7EC92A76F8}" dt="2019-04-16T22:13:21.533" v="434" actId="26606"/>
-          <ac:spMkLst>
-            <pc:docMk/>
-            <pc:sldMk cId="3597866122" sldId="285"/>
-            <ac:spMk id="81" creationId="{5404C2E9-A8E4-49F9-8ACD-45F38F77C174}"/>
-          </ac:spMkLst>
-        </pc:spChg>
-        <pc:spChg chg="add del">
-          <ac:chgData name="François Espiasse" userId="c0683628fcfb6d84" providerId="LiveId" clId="{DD509A43-B970-4054-B7AC-6D7EC92A76F8}" dt="2019-04-16T21:56:54.009" v="196" actId="26606"/>
-          <ac:spMkLst>
-            <pc:docMk/>
-            <pc:sldMk cId="3597866122" sldId="285"/>
-            <ac:spMk id="82" creationId="{9F39DD0E-2075-44D3-9738-994F7213FDBB}"/>
-          </ac:spMkLst>
-        </pc:spChg>
-        <pc:spChg chg="add del">
-          <ac:chgData name="François Espiasse" userId="c0683628fcfb6d84" providerId="LiveId" clId="{DD509A43-B970-4054-B7AC-6D7EC92A76F8}" dt="2019-04-16T21:56:54.009" v="196" actId="26606"/>
-          <ac:spMkLst>
-            <pc:docMk/>
-            <pc:sldMk cId="3597866122" sldId="285"/>
-            <ac:spMk id="84" creationId="{EDC98CE5-443C-4D55-A198-23A1A424B582}"/>
-          </ac:spMkLst>
-        </pc:spChg>
-        <pc:spChg chg="add del">
-          <ac:chgData name="François Espiasse" userId="c0683628fcfb6d84" providerId="LiveId" clId="{DD509A43-B970-4054-B7AC-6D7EC92A76F8}" dt="2019-04-16T21:56:54.009" v="196" actId="26606"/>
-          <ac:spMkLst>
-            <pc:docMk/>
-            <pc:sldMk cId="3597866122" sldId="285"/>
-            <ac:spMk id="86" creationId="{C3301589-0EA4-4C1B-9686-D9E9928AAD0F}"/>
-          </ac:spMkLst>
-        </pc:spChg>
-        <pc:spChg chg="add del">
-          <ac:chgData name="François Espiasse" userId="c0683628fcfb6d84" providerId="LiveId" clId="{DD509A43-B970-4054-B7AC-6D7EC92A76F8}" dt="2019-04-16T22:18:54.415" v="481"/>
-          <ac:spMkLst>
-            <pc:docMk/>
-            <pc:sldMk cId="3597866122" sldId="285"/>
-            <ac:spMk id="139" creationId="{0B7C15D4-0972-4DC3-9AD6-FE4015FFF672}"/>
-          </ac:spMkLst>
-        </pc:spChg>
-        <pc:spChg chg="add del">
-          <ac:chgData name="François Espiasse" userId="c0683628fcfb6d84" providerId="LiveId" clId="{DD509A43-B970-4054-B7AC-6D7EC92A76F8}" dt="2019-04-16T22:18:54.415" v="481"/>
-          <ac:spMkLst>
-            <pc:docMk/>
-            <pc:sldMk cId="3597866122" sldId="285"/>
-            <ac:spMk id="141" creationId="{66596F3A-3E9D-4674-BB61-4131E63F0F48}"/>
-          </ac:spMkLst>
-        </pc:spChg>
-        <pc:spChg chg="add del">
-          <ac:chgData name="François Espiasse" userId="c0683628fcfb6d84" providerId="LiveId" clId="{DD509A43-B970-4054-B7AC-6D7EC92A76F8}" dt="2019-04-16T22:18:54.415" v="481"/>
-          <ac:spMkLst>
-            <pc:docMk/>
-            <pc:sldMk cId="3597866122" sldId="285"/>
-            <ac:spMk id="143" creationId="{90C810B5-AB25-4CD0-93C5-13A0BCCCC80E}"/>
-          </ac:spMkLst>
-        </pc:spChg>
-        <pc:spChg chg="add del">
-          <ac:chgData name="François Espiasse" userId="c0683628fcfb6d84" providerId="LiveId" clId="{DD509A43-B970-4054-B7AC-6D7EC92A76F8}" dt="2019-04-16T21:56:54.024" v="197" actId="26606"/>
-          <ac:spMkLst>
-            <pc:docMk/>
-            <pc:sldMk cId="3597866122" sldId="285"/>
-            <ac:spMk id="145" creationId="{A871467B-6E04-402D-A065-2E3349FCC235}"/>
-          </ac:spMkLst>
-        </pc:spChg>
-        <pc:spChg chg="add del">
-          <ac:chgData name="François Espiasse" userId="c0683628fcfb6d84" providerId="LiveId" clId="{DD509A43-B970-4054-B7AC-6D7EC92A76F8}" dt="2019-04-16T22:12:22.286" v="432"/>
-          <ac:spMkLst>
-            <pc:docMk/>
-            <pc:sldMk cId="3597866122" sldId="285"/>
-            <ac:spMk id="4110" creationId="{F5382907-87E1-4261-AF8B-F55C7F8D6E38}"/>
-          </ac:spMkLst>
-        </pc:spChg>
-        <pc:spChg chg="add del">
-          <ac:chgData name="François Espiasse" userId="c0683628fcfb6d84" providerId="LiveId" clId="{DD509A43-B970-4054-B7AC-6D7EC92A76F8}" dt="2019-04-16T22:18:54.415" v="481"/>
-          <ac:spMkLst>
-            <pc:docMk/>
-            <pc:sldMk cId="3597866122" sldId="285"/>
-            <ac:spMk id="4114" creationId="{071BB7B4-87A2-44EC-BA48-00336807518E}"/>
-          </ac:spMkLst>
-        </pc:spChg>
-        <pc:grpChg chg="add del">
-          <ac:chgData name="François Espiasse" userId="c0683628fcfb6d84" providerId="LiveId" clId="{DD509A43-B970-4054-B7AC-6D7EC92A76F8}" dt="2019-04-16T22:18:54.415" v="481"/>
-          <ac:grpSpMkLst>
-            <pc:docMk/>
-            <pc:sldMk cId="3597866122" sldId="285"/>
-            <ac:grpSpMk id="83" creationId="{D8CFE9B4-1CEA-42F0-AF67-4A7E44E2005C}"/>
-          </ac:grpSpMkLst>
-        </pc:grpChg>
-        <pc:picChg chg="add del mod ord">
-          <ac:chgData name="François Espiasse" userId="c0683628fcfb6d84" providerId="LiveId" clId="{DD509A43-B970-4054-B7AC-6D7EC92A76F8}" dt="2019-04-17T15:00:10.851" v="1241"/>
-          <ac:picMkLst>
-            <pc:docMk/>
-            <pc:sldMk cId="3597866122" sldId="285"/>
-            <ac:picMk id="7" creationId="{913CA54C-B5B6-4A27-8233-8E141AEDD234}"/>
-          </ac:picMkLst>
-        </pc:picChg>
-        <pc:picChg chg="add mod">
-          <ac:chgData name="François Espiasse" userId="c0683628fcfb6d84" providerId="LiveId" clId="{DD509A43-B970-4054-B7AC-6D7EC92A76F8}" dt="2019-04-17T15:00:34.687" v="1245" actId="1076"/>
-          <ac:picMkLst>
-            <pc:docMk/>
-            <pc:sldMk cId="3597866122" sldId="285"/>
-            <ac:picMk id="13" creationId="{90DD864D-04E5-416C-994B-905D075775FA}"/>
-          </ac:picMkLst>
-        </pc:picChg>
-        <pc:picChg chg="add mod">
-          <ac:chgData name="François Espiasse" userId="c0683628fcfb6d84" providerId="LiveId" clId="{DD509A43-B970-4054-B7AC-6D7EC92A76F8}" dt="2019-04-17T15:00:34.687" v="1245" actId="1076"/>
-          <ac:picMkLst>
-            <pc:docMk/>
-            <pc:sldMk cId="3597866122" sldId="285"/>
-            <ac:picMk id="14" creationId="{F432AF3F-85C0-469F-872F-890CD88C2296}"/>
-          </ac:picMkLst>
-        </pc:picChg>
-        <pc:picChg chg="add mod">
-          <ac:chgData name="François Espiasse" userId="c0683628fcfb6d84" providerId="LiveId" clId="{DD509A43-B970-4054-B7AC-6D7EC92A76F8}" dt="2019-04-17T15:00:34.687" v="1245" actId="1076"/>
-          <ac:picMkLst>
-            <pc:docMk/>
-            <pc:sldMk cId="3597866122" sldId="285"/>
-            <ac:picMk id="15" creationId="{24AE1315-35A6-4476-BA7A-AFB59698D336}"/>
-          </ac:picMkLst>
-        </pc:picChg>
-        <pc:picChg chg="add mod">
-          <ac:chgData name="François Espiasse" userId="c0683628fcfb6d84" providerId="LiveId" clId="{DD509A43-B970-4054-B7AC-6D7EC92A76F8}" dt="2019-04-17T15:00:34.687" v="1245" actId="1076"/>
-          <ac:picMkLst>
-            <pc:docMk/>
-            <pc:sldMk cId="3597866122" sldId="285"/>
-            <ac:picMk id="16" creationId="{3331291E-8FC4-461D-BA27-66F91C6E9CBD}"/>
-          </ac:picMkLst>
-        </pc:picChg>
-        <pc:picChg chg="add del mod ord">
-          <ac:chgData name="François Espiasse" userId="c0683628fcfb6d84" providerId="LiveId" clId="{DD509A43-B970-4054-B7AC-6D7EC92A76F8}" dt="2019-04-17T15:00:10.851" v="1241"/>
-          <ac:picMkLst>
-            <pc:docMk/>
-            <pc:sldMk cId="3597866122" sldId="285"/>
-            <ac:picMk id="4098" creationId="{A9ABDA90-CD17-4297-9292-394ACA82DEB9}"/>
-          </ac:picMkLst>
-        </pc:picChg>
-        <pc:picChg chg="add del mod ord">
-          <ac:chgData name="François Espiasse" userId="c0683628fcfb6d84" providerId="LiveId" clId="{DD509A43-B970-4054-B7AC-6D7EC92A76F8}" dt="2019-04-17T15:00:10.851" v="1241"/>
-          <ac:picMkLst>
-            <pc:docMk/>
-            <pc:sldMk cId="3597866122" sldId="285"/>
-            <ac:picMk id="4106" creationId="{F0E5FA59-9716-4ADF-9139-6B603C0F56E1}"/>
-          </ac:picMkLst>
-        </pc:picChg>
-        <pc:picChg chg="add del mod ord">
-          <ac:chgData name="François Espiasse" userId="c0683628fcfb6d84" providerId="LiveId" clId="{DD509A43-B970-4054-B7AC-6D7EC92A76F8}" dt="2019-04-17T15:00:10.851" v="1241"/>
-          <ac:picMkLst>
-            <pc:docMk/>
-            <pc:sldMk cId="3597866122" sldId="285"/>
-            <ac:picMk id="4108" creationId="{DC683985-972B-4B71-A87C-F8A37640D981}"/>
-          </ac:picMkLst>
-        </pc:picChg>
-        <pc:picChg chg="add del">
-          <ac:chgData name="François Espiasse" userId="c0683628fcfb6d84" providerId="LiveId" clId="{DD509A43-B970-4054-B7AC-6D7EC92A76F8}" dt="2019-04-16T22:18:54.415" v="481"/>
-          <ac:picMkLst>
-            <pc:docMk/>
-            <pc:sldMk cId="3597866122" sldId="285"/>
-            <ac:picMk id="4111" creationId="{48C316E1-D12D-499B-8EE5-4D812677D696}"/>
-          </ac:picMkLst>
-        </pc:picChg>
-      </pc:sldChg>
-      <pc:sldChg chg="addSp delSp modSp mod modTransition setBg setClrOvrMap delDesignElem">
-        <pc:chgData name="François Espiasse" userId="c0683628fcfb6d84" providerId="LiveId" clId="{DD509A43-B970-4054-B7AC-6D7EC92A76F8}" dt="2019-04-18T08:10:45.343" v="2598" actId="255"/>
-        <pc:sldMkLst>
-          <pc:docMk/>
-          <pc:sldMk cId="1292611340" sldId="287"/>
-        </pc:sldMkLst>
-        <pc:spChg chg="mod">
-          <ac:chgData name="François Espiasse" userId="c0683628fcfb6d84" providerId="LiveId" clId="{DD509A43-B970-4054-B7AC-6D7EC92A76F8}" dt="2019-04-18T08:10:29.477" v="2595" actId="113"/>
-          <ac:spMkLst>
-            <pc:docMk/>
-            <pc:sldMk cId="1292611340" sldId="287"/>
-            <ac:spMk id="2" creationId="{00000000-0000-0000-0000-000000000000}"/>
-          </ac:spMkLst>
-        </pc:spChg>
-        <pc:spChg chg="add del mod">
-          <ac:chgData name="François Espiasse" userId="c0683628fcfb6d84" providerId="LiveId" clId="{DD509A43-B970-4054-B7AC-6D7EC92A76F8}" dt="2019-04-16T22:14:36.668" v="447" actId="26606"/>
-          <ac:spMkLst>
-            <pc:docMk/>
-            <pc:sldMk cId="1292611340" sldId="287"/>
-            <ac:spMk id="3" creationId="{00000000-0000-0000-0000-000000000000}"/>
-          </ac:spMkLst>
-        </pc:spChg>
-        <pc:spChg chg="add del">
-          <ac:chgData name="François Espiasse" userId="c0683628fcfb6d84" providerId="LiveId" clId="{DD509A43-B970-4054-B7AC-6D7EC92A76F8}" dt="2019-04-16T22:14:26.282" v="442" actId="26606"/>
-          <ac:spMkLst>
-            <pc:docMk/>
-            <pc:sldMk cId="1292611340" sldId="287"/>
-            <ac:spMk id="8" creationId="{6BFC9644-673A-459F-B3C5-9310A4E50E3B}"/>
-          </ac:spMkLst>
-        </pc:spChg>
-        <pc:spChg chg="add del">
-          <ac:chgData name="François Espiasse" userId="c0683628fcfb6d84" providerId="LiveId" clId="{DD509A43-B970-4054-B7AC-6D7EC92A76F8}" dt="2019-04-16T22:14:26.282" v="442" actId="26606"/>
-          <ac:spMkLst>
-            <pc:docMk/>
-            <pc:sldMk cId="1292611340" sldId="287"/>
-            <ac:spMk id="39" creationId="{7D1C411D-0818-4640-8657-2AF78250C802}"/>
-          </ac:spMkLst>
-        </pc:spChg>
-        <pc:spChg chg="add del">
-          <ac:chgData name="François Espiasse" userId="c0683628fcfb6d84" providerId="LiveId" clId="{DD509A43-B970-4054-B7AC-6D7EC92A76F8}" dt="2019-04-16T22:14:31.379" v="444" actId="26606"/>
-          <ac:spMkLst>
-            <pc:docMk/>
-            <pc:sldMk cId="1292611340" sldId="287"/>
-            <ac:spMk id="41" creationId="{01F67CC9-D773-4B4B-8A55-D5DAEC3414BD}"/>
-          </ac:spMkLst>
-        </pc:spChg>
-        <pc:spChg chg="add del">
-          <ac:chgData name="François Espiasse" userId="c0683628fcfb6d84" providerId="LiveId" clId="{DD509A43-B970-4054-B7AC-6D7EC92A76F8}" dt="2019-04-16T22:14:36.637" v="446" actId="26606"/>
-          <ac:spMkLst>
-            <pc:docMk/>
-            <pc:sldMk cId="1292611340" sldId="287"/>
-            <ac:spMk id="43" creationId="{01F67CC9-D773-4B4B-8A55-D5DAEC3414BD}"/>
-          </ac:spMkLst>
-        </pc:spChg>
-        <pc:spChg chg="add del">
-          <ac:chgData name="François Espiasse" userId="c0683628fcfb6d84" providerId="LiveId" clId="{DD509A43-B970-4054-B7AC-6D7EC92A76F8}" dt="2019-04-16T22:18:54.415" v="481"/>
-          <ac:spMkLst>
-            <pc:docMk/>
-            <pc:sldMk cId="1292611340" sldId="287"/>
-            <ac:spMk id="46" creationId="{6BFC9644-673A-459F-B3C5-9310A4E50E3B}"/>
-          </ac:spMkLst>
-        </pc:spChg>
-        <pc:spChg chg="add del">
-          <ac:chgData name="François Espiasse" userId="c0683628fcfb6d84" providerId="LiveId" clId="{DD509A43-B970-4054-B7AC-6D7EC92A76F8}" dt="2019-04-16T22:18:54.415" v="481"/>
-          <ac:spMkLst>
-            <pc:docMk/>
-            <pc:sldMk cId="1292611340" sldId="287"/>
-            <ac:spMk id="48" creationId="{7D1C411D-0818-4640-8657-2AF78250C802}"/>
-          </ac:spMkLst>
-        </pc:spChg>
-        <pc:spChg chg="add del mod">
-          <ac:chgData name="François Espiasse" userId="c0683628fcfb6d84" providerId="LiveId" clId="{DD509A43-B970-4054-B7AC-6D7EC92A76F8}" dt="2019-04-18T08:08:10.587" v="2552" actId="26606"/>
-          <ac:spMkLst>
-            <pc:docMk/>
-            <pc:sldMk cId="1292611340" sldId="287"/>
-            <ac:spMk id="49" creationId="{00000000-0000-0000-0000-000000000000}"/>
-          </ac:spMkLst>
-        </pc:spChg>
-        <pc:spChg chg="add del">
-          <ac:chgData name="François Espiasse" userId="c0683628fcfb6d84" providerId="LiveId" clId="{DD509A43-B970-4054-B7AC-6D7EC92A76F8}" dt="2019-04-18T08:08:10.587" v="2552" actId="26606"/>
-          <ac:spMkLst>
-            <pc:docMk/>
-            <pc:sldMk cId="1292611340" sldId="287"/>
-            <ac:spMk id="54" creationId="{6BFC9644-673A-459F-B3C5-9310A4E50E3B}"/>
-          </ac:spMkLst>
-        </pc:spChg>
-        <pc:spChg chg="add del">
-          <ac:chgData name="François Espiasse" userId="c0683628fcfb6d84" providerId="LiveId" clId="{DD509A43-B970-4054-B7AC-6D7EC92A76F8}" dt="2019-04-18T08:08:10.587" v="2552" actId="26606"/>
-          <ac:spMkLst>
-            <pc:docMk/>
-            <pc:sldMk cId="1292611340" sldId="287"/>
-            <ac:spMk id="85" creationId="{7D1C411D-0818-4640-8657-2AF78250C802}"/>
-          </ac:spMkLst>
-        </pc:spChg>
-        <pc:spChg chg="add del">
-          <ac:chgData name="François Espiasse" userId="c0683628fcfb6d84" providerId="LiveId" clId="{DD509A43-B970-4054-B7AC-6D7EC92A76F8}" dt="2019-04-18T08:07:47.868" v="2543" actId="26606"/>
-          <ac:spMkLst>
-            <pc:docMk/>
-            <pc:sldMk cId="1292611340" sldId="287"/>
-            <ac:spMk id="92" creationId="{4E5D51F4-4B2C-4E92-AD42-C0F8079BD222}"/>
-          </ac:spMkLst>
-        </pc:spChg>
-        <pc:spChg chg="add del">
-          <ac:chgData name="François Espiasse" userId="c0683628fcfb6d84" providerId="LiveId" clId="{DD509A43-B970-4054-B7AC-6D7EC92A76F8}" dt="2019-04-18T08:07:47.868" v="2543" actId="26606"/>
-          <ac:spMkLst>
-            <pc:docMk/>
-            <pc:sldMk cId="1292611340" sldId="287"/>
-            <ac:spMk id="125" creationId="{4C3D77CC-6916-4BF8-8CDF-71E4BF2E662F}"/>
-          </ac:spMkLst>
-        </pc:spChg>
-        <pc:spChg chg="add del">
-          <ac:chgData name="François Espiasse" userId="c0683628fcfb6d84" providerId="LiveId" clId="{DD509A43-B970-4054-B7AC-6D7EC92A76F8}" dt="2019-04-18T08:07:50.626" v="2545" actId="26606"/>
-          <ac:spMkLst>
-            <pc:docMk/>
-            <pc:sldMk cId="1292611340" sldId="287"/>
-            <ac:spMk id="158" creationId="{4E5D51F4-4B2C-4E92-AD42-C0F8079BD222}"/>
-          </ac:spMkLst>
-        </pc:spChg>
-        <pc:spChg chg="add del">
-          <ac:chgData name="François Espiasse" userId="c0683628fcfb6d84" providerId="LiveId" clId="{DD509A43-B970-4054-B7AC-6D7EC92A76F8}" dt="2019-04-18T08:07:50.626" v="2545" actId="26606"/>
-          <ac:spMkLst>
-            <pc:docMk/>
-            <pc:sldMk cId="1292611340" sldId="287"/>
-            <ac:spMk id="161" creationId="{4C3D77CC-6916-4BF8-8CDF-71E4BF2E662F}"/>
-          </ac:spMkLst>
-        </pc:spChg>
-        <pc:spChg chg="add del">
-          <ac:chgData name="François Espiasse" userId="c0683628fcfb6d84" providerId="LiveId" clId="{DD509A43-B970-4054-B7AC-6D7EC92A76F8}" dt="2019-04-18T08:08:06.069" v="2549" actId="26606"/>
-          <ac:spMkLst>
-            <pc:docMk/>
-            <pc:sldMk cId="1292611340" sldId="287"/>
-            <ac:spMk id="168" creationId="{4E5D51F4-4B2C-4E92-AD42-C0F8079BD222}"/>
-          </ac:spMkLst>
-        </pc:spChg>
-        <pc:spChg chg="add del">
-          <ac:chgData name="François Espiasse" userId="c0683628fcfb6d84" providerId="LiveId" clId="{DD509A43-B970-4054-B7AC-6D7EC92A76F8}" dt="2019-04-18T08:08:06.069" v="2549" actId="26606"/>
-          <ac:spMkLst>
-            <pc:docMk/>
-            <pc:sldMk cId="1292611340" sldId="287"/>
-            <ac:spMk id="171" creationId="{4C3D77CC-6916-4BF8-8CDF-71E4BF2E662F}"/>
-          </ac:spMkLst>
-        </pc:spChg>
-        <pc:spChg chg="add del">
-          <ac:chgData name="François Espiasse" userId="c0683628fcfb6d84" providerId="LiveId" clId="{DD509A43-B970-4054-B7AC-6D7EC92A76F8}" dt="2019-04-18T08:08:10.503" v="2551" actId="26606"/>
-          <ac:spMkLst>
-            <pc:docMk/>
-            <pc:sldMk cId="1292611340" sldId="287"/>
-            <ac:spMk id="176" creationId="{4E5D51F4-4B2C-4E92-AD42-C0F8079BD222}"/>
-          </ac:spMkLst>
-        </pc:spChg>
-        <pc:spChg chg="add del">
-          <ac:chgData name="François Espiasse" userId="c0683628fcfb6d84" providerId="LiveId" clId="{DD509A43-B970-4054-B7AC-6D7EC92A76F8}" dt="2019-04-18T08:08:10.503" v="2551" actId="26606"/>
-          <ac:spMkLst>
-            <pc:docMk/>
-            <pc:sldMk cId="1292611340" sldId="287"/>
-            <ac:spMk id="179" creationId="{4C3D77CC-6916-4BF8-8CDF-71E4BF2E662F}"/>
-          </ac:spMkLst>
-        </pc:spChg>
-        <pc:spChg chg="add del">
-          <ac:chgData name="François Espiasse" userId="c0683628fcfb6d84" providerId="LiveId" clId="{DD509A43-B970-4054-B7AC-6D7EC92A76F8}" dt="2019-04-18T08:09:06.591" v="2573" actId="26606"/>
-          <ac:spMkLst>
-            <pc:docMk/>
-            <pc:sldMk cId="1292611340" sldId="287"/>
-            <ac:spMk id="184" creationId="{4E5D51F4-4B2C-4E92-AD42-C0F8079BD222}"/>
-          </ac:spMkLst>
-        </pc:spChg>
-        <pc:spChg chg="add del">
-          <ac:chgData name="François Espiasse" userId="c0683628fcfb6d84" providerId="LiveId" clId="{DD509A43-B970-4054-B7AC-6D7EC92A76F8}" dt="2019-04-18T08:09:06.591" v="2573" actId="26606"/>
-          <ac:spMkLst>
-            <pc:docMk/>
-            <pc:sldMk cId="1292611340" sldId="287"/>
-            <ac:spMk id="187" creationId="{4C3D77CC-6916-4BF8-8CDF-71E4BF2E662F}"/>
-          </ac:spMkLst>
-        </pc:spChg>
-        <pc:spChg chg="add del">
-          <ac:chgData name="François Espiasse" userId="c0683628fcfb6d84" providerId="LiveId" clId="{DD509A43-B970-4054-B7AC-6D7EC92A76F8}" dt="2019-04-18T08:09:02.289" v="2568" actId="26606"/>
-          <ac:spMkLst>
-            <pc:docMk/>
-            <pc:sldMk cId="1292611340" sldId="287"/>
-            <ac:spMk id="192" creationId="{DD276684-B387-4740-B467-9F85F45A3C86}"/>
-          </ac:spMkLst>
-        </pc:spChg>
-        <pc:spChg chg="add del">
-          <ac:chgData name="François Espiasse" userId="c0683628fcfb6d84" providerId="LiveId" clId="{DD509A43-B970-4054-B7AC-6D7EC92A76F8}" dt="2019-04-18T08:09:04.118" v="2570" actId="26606"/>
-          <ac:spMkLst>
-            <pc:docMk/>
-            <pc:sldMk cId="1292611340" sldId="287"/>
-            <ac:spMk id="194" creationId="{01E1061D-CC6F-495F-9D7B-6D4E897C6E5C}"/>
-          </ac:spMkLst>
-        </pc:spChg>
-        <pc:spChg chg="add del">
-          <ac:chgData name="François Espiasse" userId="c0683628fcfb6d84" providerId="LiveId" clId="{DD509A43-B970-4054-B7AC-6D7EC92A76F8}" dt="2019-04-18T08:08:48.130" v="2560" actId="26606"/>
-          <ac:spMkLst>
-            <pc:docMk/>
-            <pc:sldMk cId="1292611340" sldId="287"/>
-            <ac:spMk id="195" creationId="{4E5D51F4-4B2C-4E92-AD42-C0F8079BD222}"/>
-          </ac:spMkLst>
-        </pc:spChg>
-        <pc:spChg chg="add del">
-          <ac:chgData name="François Espiasse" userId="c0683628fcfb6d84" providerId="LiveId" clId="{DD509A43-B970-4054-B7AC-6D7EC92A76F8}" dt="2019-04-18T08:08:48.130" v="2560" actId="26606"/>
-          <ac:spMkLst>
-            <pc:docMk/>
-            <pc:sldMk cId="1292611340" sldId="287"/>
-            <ac:spMk id="228" creationId="{4C3D77CC-6916-4BF8-8CDF-71E4BF2E662F}"/>
-          </ac:spMkLst>
-        </pc:spChg>
-        <pc:spChg chg="add del">
-          <ac:chgData name="François Espiasse" userId="c0683628fcfb6d84" providerId="LiveId" clId="{DD509A43-B970-4054-B7AC-6D7EC92A76F8}" dt="2019-04-18T08:09:04.118" v="2570" actId="26606"/>
-          <ac:spMkLst>
-            <pc:docMk/>
-            <pc:sldMk cId="1292611340" sldId="287"/>
-            <ac:spMk id="240" creationId="{CD05A4A5-93FA-4AD3-8DAD-DC6476F46C28}"/>
-          </ac:spMkLst>
-        </pc:spChg>
-        <pc:grpChg chg="add del">
-          <ac:chgData name="François Espiasse" userId="c0683628fcfb6d84" providerId="LiveId" clId="{DD509A43-B970-4054-B7AC-6D7EC92A76F8}" dt="2019-04-16T22:14:26.282" v="442" actId="26606"/>
-          <ac:grpSpMkLst>
-            <pc:docMk/>
-            <pc:sldMk cId="1292611340" sldId="287"/>
-            <ac:grpSpMk id="10" creationId="{4ADB9295-9645-4BF2-ADFD-75800B7FAD06}"/>
-          </ac:grpSpMkLst>
-        </pc:grpChg>
-        <pc:grpChg chg="add del">
-          <ac:chgData name="François Espiasse" userId="c0683628fcfb6d84" providerId="LiveId" clId="{DD509A43-B970-4054-B7AC-6D7EC92A76F8}" dt="2019-04-16T22:18:54.415" v="481"/>
-          <ac:grpSpMkLst>
-            <pc:docMk/>
-            <pc:sldMk cId="1292611340" sldId="287"/>
-            <ac:grpSpMk id="47" creationId="{4ADB9295-9645-4BF2-ADFD-75800B7FAD06}"/>
-          </ac:grpSpMkLst>
-        </pc:grpChg>
-        <pc:grpChg chg="add del">
-          <ac:chgData name="François Espiasse" userId="c0683628fcfb6d84" providerId="LiveId" clId="{DD509A43-B970-4054-B7AC-6D7EC92A76F8}" dt="2019-04-18T08:08:10.587" v="2552" actId="26606"/>
-          <ac:grpSpMkLst>
-            <pc:docMk/>
-            <pc:sldMk cId="1292611340" sldId="287"/>
-            <ac:grpSpMk id="56" creationId="{4ADB9295-9645-4BF2-ADFD-75800B7FAD06}"/>
-          </ac:grpSpMkLst>
-        </pc:grpChg>
-        <pc:grpChg chg="add del">
-          <ac:chgData name="François Espiasse" userId="c0683628fcfb6d84" providerId="LiveId" clId="{DD509A43-B970-4054-B7AC-6D7EC92A76F8}" dt="2019-04-18T08:07:47.868" v="2543" actId="26606"/>
-          <ac:grpSpMkLst>
-            <pc:docMk/>
-            <pc:sldMk cId="1292611340" sldId="287"/>
-            <ac:grpSpMk id="94" creationId="{B90ADF90-29DF-49C2-92C5-E75C306EDEB6}"/>
-          </ac:grpSpMkLst>
-        </pc:grpChg>
-        <pc:grpChg chg="add del">
-          <ac:chgData name="François Espiasse" userId="c0683628fcfb6d84" providerId="LiveId" clId="{DD509A43-B970-4054-B7AC-6D7EC92A76F8}" dt="2019-04-18T08:07:47.868" v="2543" actId="26606"/>
-          <ac:grpSpMkLst>
-            <pc:docMk/>
-            <pc:sldMk cId="1292611340" sldId="287"/>
-            <ac:grpSpMk id="127" creationId="{96E8897B-113F-4BE0-A8B0-6467E5A2E03E}"/>
-          </ac:grpSpMkLst>
-        </pc:grpChg>
-        <pc:grpChg chg="add del">
-          <ac:chgData name="François Espiasse" userId="c0683628fcfb6d84" providerId="LiveId" clId="{DD509A43-B970-4054-B7AC-6D7EC92A76F8}" dt="2019-04-18T08:07:50.626" v="2545" actId="26606"/>
-          <ac:grpSpMkLst>
-            <pc:docMk/>
-            <pc:sldMk cId="1292611340" sldId="287"/>
-            <ac:grpSpMk id="159" creationId="{B90ADF90-29DF-49C2-92C5-E75C306EDEB6}"/>
-          </ac:grpSpMkLst>
-        </pc:grpChg>
-        <pc:grpChg chg="add del">
-          <ac:chgData name="François Espiasse" userId="c0683628fcfb6d84" providerId="LiveId" clId="{DD509A43-B970-4054-B7AC-6D7EC92A76F8}" dt="2019-04-18T08:07:50.626" v="2545" actId="26606"/>
-          <ac:grpSpMkLst>
-            <pc:docMk/>
-            <pc:sldMk cId="1292611340" sldId="287"/>
-            <ac:grpSpMk id="162" creationId="{96E8897B-113F-4BE0-A8B0-6467E5A2E03E}"/>
-          </ac:grpSpMkLst>
-        </pc:grpChg>
-        <pc:grpChg chg="add del">
-          <ac:chgData name="François Espiasse" userId="c0683628fcfb6d84" providerId="LiveId" clId="{DD509A43-B970-4054-B7AC-6D7EC92A76F8}" dt="2019-04-18T08:08:06.069" v="2549" actId="26606"/>
-          <ac:grpSpMkLst>
-            <pc:docMk/>
-            <pc:sldMk cId="1292611340" sldId="287"/>
-            <ac:grpSpMk id="169" creationId="{B90ADF90-29DF-49C2-92C5-E75C306EDEB6}"/>
-          </ac:grpSpMkLst>
-        </pc:grpChg>
-        <pc:grpChg chg="add del">
-          <ac:chgData name="François Espiasse" userId="c0683628fcfb6d84" providerId="LiveId" clId="{DD509A43-B970-4054-B7AC-6D7EC92A76F8}" dt="2019-04-18T08:08:06.069" v="2549" actId="26606"/>
-          <ac:grpSpMkLst>
-            <pc:docMk/>
-            <pc:sldMk cId="1292611340" sldId="287"/>
-            <ac:grpSpMk id="172" creationId="{96E8897B-113F-4BE0-A8B0-6467E5A2E03E}"/>
-          </ac:grpSpMkLst>
-        </pc:grpChg>
-        <pc:grpChg chg="add del">
-          <ac:chgData name="François Espiasse" userId="c0683628fcfb6d84" providerId="LiveId" clId="{DD509A43-B970-4054-B7AC-6D7EC92A76F8}" dt="2019-04-18T08:08:10.503" v="2551" actId="26606"/>
-          <ac:grpSpMkLst>
-            <pc:docMk/>
-            <pc:sldMk cId="1292611340" sldId="287"/>
-            <ac:grpSpMk id="177" creationId="{B90ADF90-29DF-49C2-92C5-E75C306EDEB6}"/>
-          </ac:grpSpMkLst>
-        </pc:grpChg>
-        <pc:grpChg chg="add del">
-          <ac:chgData name="François Espiasse" userId="c0683628fcfb6d84" providerId="LiveId" clId="{DD509A43-B970-4054-B7AC-6D7EC92A76F8}" dt="2019-04-18T08:08:10.503" v="2551" actId="26606"/>
-          <ac:grpSpMkLst>
-            <pc:docMk/>
-            <pc:sldMk cId="1292611340" sldId="287"/>
-            <ac:grpSpMk id="180" creationId="{96E8897B-113F-4BE0-A8B0-6467E5A2E03E}"/>
-          </ac:grpSpMkLst>
-        </pc:grpChg>
-        <pc:grpChg chg="add del">
-          <ac:chgData name="François Espiasse" userId="c0683628fcfb6d84" providerId="LiveId" clId="{DD509A43-B970-4054-B7AC-6D7EC92A76F8}" dt="2019-04-18T08:09:06.591" v="2573" actId="26606"/>
-          <ac:grpSpMkLst>
-            <pc:docMk/>
-            <pc:sldMk cId="1292611340" sldId="287"/>
-            <ac:grpSpMk id="185" creationId="{B90ADF90-29DF-49C2-92C5-E75C306EDEB6}"/>
-          </ac:grpSpMkLst>
-        </pc:grpChg>
-        <pc:grpChg chg="add del">
-          <ac:chgData name="François Espiasse" userId="c0683628fcfb6d84" providerId="LiveId" clId="{DD509A43-B970-4054-B7AC-6D7EC92A76F8}" dt="2019-04-18T08:09:06.591" v="2573" actId="26606"/>
-          <ac:grpSpMkLst>
-            <pc:docMk/>
-            <pc:sldMk cId="1292611340" sldId="287"/>
-            <ac:grpSpMk id="188" creationId="{96E8897B-113F-4BE0-A8B0-6467E5A2E03E}"/>
-          </ac:grpSpMkLst>
-        </pc:grpChg>
-        <pc:grpChg chg="add del">
-          <ac:chgData name="François Espiasse" userId="c0683628fcfb6d84" providerId="LiveId" clId="{DD509A43-B970-4054-B7AC-6D7EC92A76F8}" dt="2019-04-18T08:08:48.130" v="2560" actId="26606"/>
-          <ac:grpSpMkLst>
-            <pc:docMk/>
-            <pc:sldMk cId="1292611340" sldId="287"/>
-            <ac:grpSpMk id="197" creationId="{B90ADF90-29DF-49C2-92C5-E75C306EDEB6}"/>
-          </ac:grpSpMkLst>
-        </pc:grpChg>
-        <pc:grpChg chg="add del">
-          <ac:chgData name="François Espiasse" userId="c0683628fcfb6d84" providerId="LiveId" clId="{DD509A43-B970-4054-B7AC-6D7EC92A76F8}" dt="2019-04-18T08:09:04.118" v="2570" actId="26606"/>
-          <ac:grpSpMkLst>
-            <pc:docMk/>
-            <pc:sldMk cId="1292611340" sldId="287"/>
-            <ac:grpSpMk id="199" creationId="{F3D379C9-8183-4DA2-AE45-12185D8ED9BE}"/>
-          </ac:grpSpMkLst>
-        </pc:grpChg>
-        <pc:grpChg chg="add del">
-          <ac:chgData name="François Espiasse" userId="c0683628fcfb6d84" providerId="LiveId" clId="{DD509A43-B970-4054-B7AC-6D7EC92A76F8}" dt="2019-04-18T08:08:48.130" v="2560" actId="26606"/>
-          <ac:grpSpMkLst>
-            <pc:docMk/>
-            <pc:sldMk cId="1292611340" sldId="287"/>
-            <ac:grpSpMk id="230" creationId="{96E8897B-113F-4BE0-A8B0-6467E5A2E03E}"/>
-          </ac:grpSpMkLst>
-        </pc:grpChg>
-        <pc:graphicFrameChg chg="add del">
-          <ac:chgData name="François Espiasse" userId="c0683628fcfb6d84" providerId="LiveId" clId="{DD509A43-B970-4054-B7AC-6D7EC92A76F8}" dt="2019-04-16T22:14:31.379" v="444" actId="26606"/>
-          <ac:graphicFrameMkLst>
-            <pc:docMk/>
-            <pc:sldMk cId="1292611340" sldId="287"/>
-            <ac:graphicFrameMk id="5" creationId="{5E59C08B-095D-4CC7-841B-D0B26B634BBD}"/>
-          </ac:graphicFrameMkLst>
-        </pc:graphicFrameChg>
-        <pc:graphicFrameChg chg="add del">
-          <ac:chgData name="François Espiasse" userId="c0683628fcfb6d84" providerId="LiveId" clId="{DD509A43-B970-4054-B7AC-6D7EC92A76F8}" dt="2019-04-16T22:14:36.637" v="446" actId="26606"/>
-          <ac:graphicFrameMkLst>
-            <pc:docMk/>
-            <pc:sldMk cId="1292611340" sldId="287"/>
-            <ac:graphicFrameMk id="44" creationId="{FFBB815F-C55E-43EC-A7EA-56A291C8BDF4}"/>
-          </ac:graphicFrameMkLst>
-        </pc:graphicFrameChg>
-        <pc:graphicFrameChg chg="add del">
-          <ac:chgData name="François Espiasse" userId="c0683628fcfb6d84" providerId="LiveId" clId="{DD509A43-B970-4054-B7AC-6D7EC92A76F8}" dt="2019-04-18T08:07:47.868" v="2543" actId="26606"/>
-          <ac:graphicFrameMkLst>
-            <pc:docMk/>
-            <pc:sldMk cId="1292611340" sldId="287"/>
-            <ac:graphicFrameMk id="87" creationId="{AAEDF9D6-550C-4875-AD1C-992B8CC33390}"/>
-          </ac:graphicFrameMkLst>
-        </pc:graphicFrameChg>
-        <pc:graphicFrameChg chg="add del">
-          <ac:chgData name="François Espiasse" userId="c0683628fcfb6d84" providerId="LiveId" clId="{DD509A43-B970-4054-B7AC-6D7EC92A76F8}" dt="2019-04-18T08:07:50.626" v="2545" actId="26606"/>
-          <ac:graphicFrameMkLst>
-            <pc:docMk/>
-            <pc:sldMk cId="1292611340" sldId="287"/>
-            <ac:graphicFrameMk id="164" creationId="{9C56C474-B6D0-485A-906A-F0B9737467C9}"/>
-          </ac:graphicFrameMkLst>
-        </pc:graphicFrameChg>
-        <pc:graphicFrameChg chg="add del">
-          <ac:chgData name="François Espiasse" userId="c0683628fcfb6d84" providerId="LiveId" clId="{DD509A43-B970-4054-B7AC-6D7EC92A76F8}" dt="2019-04-18T08:08:03.189" v="2547" actId="26606"/>
-          <ac:graphicFrameMkLst>
-            <pc:docMk/>
-            <pc:sldMk cId="1292611340" sldId="287"/>
-            <ac:graphicFrameMk id="166" creationId="{918D4AAB-BEDD-4439-8143-AE14625B548A}"/>
-          </ac:graphicFrameMkLst>
-        </pc:graphicFrameChg>
-        <pc:graphicFrameChg chg="add del">
-          <ac:chgData name="François Espiasse" userId="c0683628fcfb6d84" providerId="LiveId" clId="{DD509A43-B970-4054-B7AC-6D7EC92A76F8}" dt="2019-04-18T08:08:06.069" v="2549" actId="26606"/>
-          <ac:graphicFrameMkLst>
-            <pc:docMk/>
-            <pc:sldMk cId="1292611340" sldId="287"/>
-            <ac:graphicFrameMk id="174" creationId="{AAEDF9D6-550C-4875-AD1C-992B8CC33390}"/>
-          </ac:graphicFrameMkLst>
-        </pc:graphicFrameChg>
-        <pc:graphicFrameChg chg="add del">
-          <ac:chgData name="François Espiasse" userId="c0683628fcfb6d84" providerId="LiveId" clId="{DD509A43-B970-4054-B7AC-6D7EC92A76F8}" dt="2019-04-18T08:08:10.503" v="2551" actId="26606"/>
-          <ac:graphicFrameMkLst>
-            <pc:docMk/>
-            <pc:sldMk cId="1292611340" sldId="287"/>
-            <ac:graphicFrameMk id="182" creationId="{9C56C474-B6D0-485A-906A-F0B9737467C9}"/>
-          </ac:graphicFrameMkLst>
-        </pc:graphicFrameChg>
-        <pc:graphicFrameChg chg="add mod modGraphic">
-          <ac:chgData name="François Espiasse" userId="c0683628fcfb6d84" providerId="LiveId" clId="{DD509A43-B970-4054-B7AC-6D7EC92A76F8}" dt="2019-04-18T08:10:45.343" v="2598" actId="255"/>
-          <ac:graphicFrameMkLst>
-            <pc:docMk/>
-            <pc:sldMk cId="1292611340" sldId="287"/>
-            <ac:graphicFrameMk id="190" creationId="{AAEDF9D6-550C-4875-AD1C-992B8CC33390}"/>
-          </ac:graphicFrameMkLst>
-        </pc:graphicFrameChg>
-        <pc:picChg chg="add del">
-          <ac:chgData name="François Espiasse" userId="c0683628fcfb6d84" providerId="LiveId" clId="{DD509A43-B970-4054-B7AC-6D7EC92A76F8}" dt="2019-04-18T08:07:47.868" v="2543" actId="26606"/>
-          <ac:picMkLst>
-            <pc:docMk/>
-            <pc:sldMk cId="1292611340" sldId="287"/>
-            <ac:picMk id="123" creationId="{E642A42B-C95B-433E-9A81-2174F72875CE}"/>
-          </ac:picMkLst>
-        </pc:picChg>
-        <pc:picChg chg="add del">
-          <ac:chgData name="François Espiasse" userId="c0683628fcfb6d84" providerId="LiveId" clId="{DD509A43-B970-4054-B7AC-6D7EC92A76F8}" dt="2019-04-18T08:07:47.868" v="2543" actId="26606"/>
-          <ac:picMkLst>
-            <pc:docMk/>
-            <pc:sldMk cId="1292611340" sldId="287"/>
-            <ac:picMk id="156" creationId="{B9535DE4-FAFA-446C-A46C-F06D18D30564}"/>
-          </ac:picMkLst>
-        </pc:picChg>
-        <pc:picChg chg="add del">
-          <ac:chgData name="François Espiasse" userId="c0683628fcfb6d84" providerId="LiveId" clId="{DD509A43-B970-4054-B7AC-6D7EC92A76F8}" dt="2019-04-18T08:07:50.626" v="2545" actId="26606"/>
-          <ac:picMkLst>
-            <pc:docMk/>
-            <pc:sldMk cId="1292611340" sldId="287"/>
-            <ac:picMk id="160" creationId="{E642A42B-C95B-433E-9A81-2174F72875CE}"/>
-          </ac:picMkLst>
-        </pc:picChg>
-        <pc:picChg chg="add del">
-          <ac:chgData name="François Espiasse" userId="c0683628fcfb6d84" providerId="LiveId" clId="{DD509A43-B970-4054-B7AC-6D7EC92A76F8}" dt="2019-04-18T08:07:50.626" v="2545" actId="26606"/>
-          <ac:picMkLst>
-            <pc:docMk/>
-            <pc:sldMk cId="1292611340" sldId="287"/>
-            <ac:picMk id="163" creationId="{B9535DE4-FAFA-446C-A46C-F06D18D30564}"/>
-          </ac:picMkLst>
-        </pc:picChg>
-        <pc:picChg chg="add del">
-          <ac:chgData name="François Espiasse" userId="c0683628fcfb6d84" providerId="LiveId" clId="{DD509A43-B970-4054-B7AC-6D7EC92A76F8}" dt="2019-04-18T08:08:06.069" v="2549" actId="26606"/>
-          <ac:picMkLst>
-            <pc:docMk/>
-            <pc:sldMk cId="1292611340" sldId="287"/>
-            <ac:picMk id="170" creationId="{E642A42B-C95B-433E-9A81-2174F72875CE}"/>
-          </ac:picMkLst>
-        </pc:picChg>
-        <pc:picChg chg="add del">
-          <ac:chgData name="François Espiasse" userId="c0683628fcfb6d84" providerId="LiveId" clId="{DD509A43-B970-4054-B7AC-6D7EC92A76F8}" dt="2019-04-18T08:08:06.069" v="2549" actId="26606"/>
-          <ac:picMkLst>
-            <pc:docMk/>
-            <pc:sldMk cId="1292611340" sldId="287"/>
-            <ac:picMk id="173" creationId="{B9535DE4-FAFA-446C-A46C-F06D18D30564}"/>
-          </ac:picMkLst>
-        </pc:picChg>
-        <pc:picChg chg="add del">
-          <ac:chgData name="François Espiasse" userId="c0683628fcfb6d84" providerId="LiveId" clId="{DD509A43-B970-4054-B7AC-6D7EC92A76F8}" dt="2019-04-18T08:08:10.503" v="2551" actId="26606"/>
-          <ac:picMkLst>
-            <pc:docMk/>
-            <pc:sldMk cId="1292611340" sldId="287"/>
-            <ac:picMk id="178" creationId="{E642A42B-C95B-433E-9A81-2174F72875CE}"/>
-          </ac:picMkLst>
-        </pc:picChg>
-        <pc:picChg chg="add del">
-          <ac:chgData name="François Espiasse" userId="c0683628fcfb6d84" providerId="LiveId" clId="{DD509A43-B970-4054-B7AC-6D7EC92A76F8}" dt="2019-04-18T08:08:10.503" v="2551" actId="26606"/>
-          <ac:picMkLst>
-            <pc:docMk/>
-            <pc:sldMk cId="1292611340" sldId="287"/>
-            <ac:picMk id="181" creationId="{B9535DE4-FAFA-446C-A46C-F06D18D30564}"/>
-          </ac:picMkLst>
-        </pc:picChg>
-        <pc:picChg chg="add del">
-          <ac:chgData name="François Espiasse" userId="c0683628fcfb6d84" providerId="LiveId" clId="{DD509A43-B970-4054-B7AC-6D7EC92A76F8}" dt="2019-04-18T08:09:06.591" v="2573" actId="26606"/>
-          <ac:picMkLst>
-            <pc:docMk/>
-            <pc:sldMk cId="1292611340" sldId="287"/>
-            <ac:picMk id="186" creationId="{E642A42B-C95B-433E-9A81-2174F72875CE}"/>
-          </ac:picMkLst>
-        </pc:picChg>
-        <pc:picChg chg="add del">
-          <ac:chgData name="François Espiasse" userId="c0683628fcfb6d84" providerId="LiveId" clId="{DD509A43-B970-4054-B7AC-6D7EC92A76F8}" dt="2019-04-18T08:09:06.591" v="2573" actId="26606"/>
-          <ac:picMkLst>
-            <pc:docMk/>
-            <pc:sldMk cId="1292611340" sldId="287"/>
-            <ac:picMk id="189" creationId="{B9535DE4-FAFA-446C-A46C-F06D18D30564}"/>
-          </ac:picMkLst>
-        </pc:picChg>
-        <pc:picChg chg="add del">
-          <ac:chgData name="François Espiasse" userId="c0683628fcfb6d84" providerId="LiveId" clId="{DD509A43-B970-4054-B7AC-6D7EC92A76F8}" dt="2019-04-18T08:09:04.118" v="2570" actId="26606"/>
-          <ac:picMkLst>
-            <pc:docMk/>
-            <pc:sldMk cId="1292611340" sldId="287"/>
-            <ac:picMk id="196" creationId="{05326ABA-F626-421D-B384-949D90E8FDDD}"/>
-          </ac:picMkLst>
-        </pc:picChg>
-        <pc:picChg chg="add del">
-          <ac:chgData name="François Espiasse" userId="c0683628fcfb6d84" providerId="LiveId" clId="{DD509A43-B970-4054-B7AC-6D7EC92A76F8}" dt="2019-04-18T08:08:48.130" v="2560" actId="26606"/>
-          <ac:picMkLst>
-            <pc:docMk/>
-            <pc:sldMk cId="1292611340" sldId="287"/>
-            <ac:picMk id="226" creationId="{E642A42B-C95B-433E-9A81-2174F72875CE}"/>
-          </ac:picMkLst>
-        </pc:picChg>
-        <pc:picChg chg="add del">
-          <ac:chgData name="François Espiasse" userId="c0683628fcfb6d84" providerId="LiveId" clId="{DD509A43-B970-4054-B7AC-6D7EC92A76F8}" dt="2019-04-18T08:09:04.118" v="2570" actId="26606"/>
-          <ac:picMkLst>
-            <pc:docMk/>
-            <pc:sldMk cId="1292611340" sldId="287"/>
-            <ac:picMk id="242" creationId="{F9E51962-2913-4526-AF80-C3CF79A9A048}"/>
-          </ac:picMkLst>
-        </pc:picChg>
-        <pc:picChg chg="add del">
-          <ac:chgData name="François Espiasse" userId="c0683628fcfb6d84" providerId="LiveId" clId="{DD509A43-B970-4054-B7AC-6D7EC92A76F8}" dt="2019-04-18T08:08:48.130" v="2560" actId="26606"/>
-          <ac:picMkLst>
-            <pc:docMk/>
-            <pc:sldMk cId="1292611340" sldId="287"/>
-            <ac:picMk id="259" creationId="{B9535DE4-FAFA-446C-A46C-F06D18D30564}"/>
-          </ac:picMkLst>
-        </pc:picChg>
-      </pc:sldChg>
-      <pc:sldChg chg="addSp modSp modTransition">
-        <pc:chgData name="François Espiasse" userId="c0683628fcfb6d84" providerId="LiveId" clId="{DD509A43-B970-4054-B7AC-6D7EC92A76F8}" dt="2019-04-18T08:14:26.019" v="2629"/>
-        <pc:sldMkLst>
-          <pc:docMk/>
-          <pc:sldMk cId="2194487378" sldId="289"/>
-        </pc:sldMkLst>
-        <pc:spChg chg="add mod">
-          <ac:chgData name="François Espiasse" userId="c0683628fcfb6d84" providerId="LiveId" clId="{DD509A43-B970-4054-B7AC-6D7EC92A76F8}" dt="2019-04-17T14:35:25.194" v="1032" actId="20577"/>
-          <ac:spMkLst>
-            <pc:docMk/>
-            <pc:sldMk cId="2194487378" sldId="289"/>
-            <ac:spMk id="3" creationId="{195A7C33-2D09-42FB-9072-B514E0B513E6}"/>
-          </ac:spMkLst>
-        </pc:spChg>
-        <pc:spChg chg="mod">
-          <ac:chgData name="François Espiasse" userId="c0683628fcfb6d84" providerId="LiveId" clId="{DD509A43-B970-4054-B7AC-6D7EC92A76F8}" dt="2019-04-18T08:14:26.019" v="2629"/>
-          <ac:spMkLst>
-            <pc:docMk/>
-            <pc:sldMk cId="2194487378" sldId="289"/>
-            <ac:spMk id="5" creationId="{97AD35FF-474D-4C12-A13F-FE49A36BCBCD}"/>
-          </ac:spMkLst>
-        </pc:spChg>
-      </pc:sldChg>
-      <pc:sldChg chg="modSp modTransition">
-        <pc:chgData name="François Espiasse" userId="c0683628fcfb6d84" providerId="LiveId" clId="{DD509A43-B970-4054-B7AC-6D7EC92A76F8}" dt="2019-04-18T20:59:47.698" v="4653" actId="20577"/>
-        <pc:sldMkLst>
-          <pc:docMk/>
-          <pc:sldMk cId="2160970389" sldId="290"/>
-        </pc:sldMkLst>
-        <pc:spChg chg="mod">
-          <ac:chgData name="François Espiasse" userId="c0683628fcfb6d84" providerId="LiveId" clId="{DD509A43-B970-4054-B7AC-6D7EC92A76F8}" dt="2019-04-18T20:59:47.698" v="4653" actId="20577"/>
-          <ac:spMkLst>
-            <pc:docMk/>
-            <pc:sldMk cId="2160970389" sldId="290"/>
-            <ac:spMk id="5" creationId="{97AD35FF-474D-4C12-A13F-FE49A36BCBCD}"/>
-          </ac:spMkLst>
-        </pc:spChg>
-      </pc:sldChg>
-      <pc:sldChg chg="modSp modTransition">
-        <pc:chgData name="François Espiasse" userId="c0683628fcfb6d84" providerId="LiveId" clId="{DD509A43-B970-4054-B7AC-6D7EC92A76F8}" dt="2019-04-18T20:26:54.686" v="4599" actId="20577"/>
-        <pc:sldMkLst>
-          <pc:docMk/>
-          <pc:sldMk cId="590038255" sldId="291"/>
-        </pc:sldMkLst>
-        <pc:spChg chg="mod">
-          <ac:chgData name="François Espiasse" userId="c0683628fcfb6d84" providerId="LiveId" clId="{DD509A43-B970-4054-B7AC-6D7EC92A76F8}" dt="2019-04-18T20:26:54.686" v="4599" actId="20577"/>
-          <ac:spMkLst>
-            <pc:docMk/>
-            <pc:sldMk cId="590038255" sldId="291"/>
-            <ac:spMk id="3" creationId="{493F11BA-F9F5-4522-9FDC-00096238AC4B}"/>
-          </ac:spMkLst>
-        </pc:spChg>
-        <pc:picChg chg="mod">
-          <ac:chgData name="François Espiasse" userId="c0683628fcfb6d84" providerId="LiveId" clId="{DD509A43-B970-4054-B7AC-6D7EC92A76F8}" dt="2019-04-17T14:41:58.208" v="1050" actId="1440"/>
-          <ac:picMkLst>
-            <pc:docMk/>
-            <pc:sldMk cId="590038255" sldId="291"/>
-            <ac:picMk id="1026" creationId="{2031B4D6-1400-490F-8BC0-6498DA780FC4}"/>
-          </ac:picMkLst>
-        </pc:picChg>
-      </pc:sldChg>
-      <pc:sldChg chg="add modTransition">
-        <pc:chgData name="François Espiasse" userId="c0683628fcfb6d84" providerId="LiveId" clId="{DD509A43-B970-4054-B7AC-6D7EC92A76F8}" dt="2019-04-17T15:05:44.647" v="1286"/>
-        <pc:sldMkLst>
-          <pc:docMk/>
-          <pc:sldMk cId="3843486506" sldId="292"/>
-        </pc:sldMkLst>
-      </pc:sldChg>
-      <pc:sldChg chg="modSp add">
-        <pc:chgData name="François Espiasse" userId="c0683628fcfb6d84" providerId="LiveId" clId="{DD509A43-B970-4054-B7AC-6D7EC92A76F8}" dt="2019-04-17T15:27:21.972" v="1531" actId="255"/>
-        <pc:sldMkLst>
-          <pc:docMk/>
-          <pc:sldMk cId="1773115131" sldId="293"/>
-        </pc:sldMkLst>
-        <pc:spChg chg="mod">
-          <ac:chgData name="François Espiasse" userId="c0683628fcfb6d84" providerId="LiveId" clId="{DD509A43-B970-4054-B7AC-6D7EC92A76F8}" dt="2019-04-17T15:27:21.972" v="1531" actId="255"/>
-          <ac:spMkLst>
-            <pc:docMk/>
-            <pc:sldMk cId="1773115131" sldId="293"/>
-            <ac:spMk id="3" creationId="{2ED55F86-98B7-4496-BCEF-A8A40D70AD12}"/>
-          </ac:spMkLst>
-        </pc:spChg>
-        <pc:spChg chg="mod">
-          <ac:chgData name="François Espiasse" userId="c0683628fcfb6d84" providerId="LiveId" clId="{DD509A43-B970-4054-B7AC-6D7EC92A76F8}" dt="2019-04-17T15:27:01.377" v="1527" actId="20577"/>
-          <ac:spMkLst>
-            <pc:docMk/>
-            <pc:sldMk cId="1773115131" sldId="293"/>
-            <ac:spMk id="8" creationId="{E9EC9BDF-25A5-45FB-B403-DB8553791833}"/>
-          </ac:spMkLst>
-        </pc:spChg>
-      </pc:sldChg>
-      <pc:sldChg chg="delSp modSp add delDesignElem">
-        <pc:chgData name="François Espiasse" userId="c0683628fcfb6d84" providerId="LiveId" clId="{DD509A43-B970-4054-B7AC-6D7EC92A76F8}" dt="2019-04-18T20:31:39.811" v="4637" actId="1076"/>
-        <pc:sldMkLst>
-          <pc:docMk/>
-          <pc:sldMk cId="3794330325" sldId="294"/>
-        </pc:sldMkLst>
-        <pc:spChg chg="mod">
-          <ac:chgData name="François Espiasse" userId="c0683628fcfb6d84" providerId="LiveId" clId="{DD509A43-B970-4054-B7AC-6D7EC92A76F8}" dt="2019-04-18T07:33:35.008" v="1975"/>
-          <ac:spMkLst>
-            <pc:docMk/>
-            <pc:sldMk cId="3794330325" sldId="294"/>
-            <ac:spMk id="2" creationId="{37E78542-7C8C-4FB1-854D-BF0ECC432EA5}"/>
-          </ac:spMkLst>
-        </pc:spChg>
-        <pc:spChg chg="mod">
-          <ac:chgData name="François Espiasse" userId="c0683628fcfb6d84" providerId="LiveId" clId="{DD509A43-B970-4054-B7AC-6D7EC92A76F8}" dt="2019-04-18T20:31:39.811" v="4637" actId="1076"/>
-          <ac:spMkLst>
-            <pc:docMk/>
-            <pc:sldMk cId="3794330325" sldId="294"/>
-            <ac:spMk id="56" creationId="{493F11BA-F9F5-4522-9FDC-00096238AC4B}"/>
-          </ac:spMkLst>
-        </pc:spChg>
-        <pc:spChg chg="del">
-          <ac:chgData name="François Espiasse" userId="c0683628fcfb6d84" providerId="LiveId" clId="{DD509A43-B970-4054-B7AC-6D7EC92A76F8}" dt="2019-04-18T08:12:31.126" v="2606"/>
-          <ac:spMkLst>
-            <pc:docMk/>
-            <pc:sldMk cId="3794330325" sldId="294"/>
-            <ac:spMk id="62" creationId="{6BFC9644-673A-459F-B3C5-9310A4E50E3B}"/>
-          </ac:spMkLst>
-        </pc:spChg>
-        <pc:spChg chg="del">
-          <ac:chgData name="François Espiasse" userId="c0683628fcfb6d84" providerId="LiveId" clId="{DD509A43-B970-4054-B7AC-6D7EC92A76F8}" dt="2019-04-18T08:12:31.126" v="2606"/>
-          <ac:spMkLst>
-            <pc:docMk/>
-            <pc:sldMk cId="3794330325" sldId="294"/>
-            <ac:spMk id="93" creationId="{7D1C411D-0818-4640-8657-2AF78250C802}"/>
-          </ac:spMkLst>
-        </pc:spChg>
-        <pc:grpChg chg="del">
-          <ac:chgData name="François Espiasse" userId="c0683628fcfb6d84" providerId="LiveId" clId="{DD509A43-B970-4054-B7AC-6D7EC92A76F8}" dt="2019-04-18T08:12:31.126" v="2606"/>
-          <ac:grpSpMkLst>
-            <pc:docMk/>
-            <pc:sldMk cId="3794330325" sldId="294"/>
-            <ac:grpSpMk id="91" creationId="{4ADB9295-9645-4BF2-ADFD-75800B7FAD06}"/>
-          </ac:grpSpMkLst>
-        </pc:grpChg>
-      </pc:sldChg>
-      <pc:sldChg chg="addSp delSp modSp add del">
-        <pc:chgData name="François Espiasse" userId="c0683628fcfb6d84" providerId="LiveId" clId="{DD509A43-B970-4054-B7AC-6D7EC92A76F8}" dt="2019-04-18T07:44:56.567" v="2005" actId="2696"/>
-        <pc:sldMkLst>
-          <pc:docMk/>
-          <pc:sldMk cId="1011666680" sldId="295"/>
-        </pc:sldMkLst>
-        <pc:spChg chg="mod">
-          <ac:chgData name="François Espiasse" userId="c0683628fcfb6d84" providerId="LiveId" clId="{DD509A43-B970-4054-B7AC-6D7EC92A76F8}" dt="2019-04-18T07:44:53.730" v="2004" actId="6549"/>
-          <ac:spMkLst>
-            <pc:docMk/>
-            <pc:sldMk cId="1011666680" sldId="295"/>
-            <ac:spMk id="2" creationId="{37E78542-7C8C-4FB1-854D-BF0ECC432EA5}"/>
-          </ac:spMkLst>
-        </pc:spChg>
-        <pc:spChg chg="del">
-          <ac:chgData name="François Espiasse" userId="c0683628fcfb6d84" providerId="LiveId" clId="{DD509A43-B970-4054-B7AC-6D7EC92A76F8}" dt="2019-04-18T07:41:47.116" v="1983" actId="478"/>
-          <ac:spMkLst>
-            <pc:docMk/>
-            <pc:sldMk cId="1011666680" sldId="295"/>
-            <ac:spMk id="4" creationId="{3042AD0C-5982-4846-8DC9-AC786DE620EB}"/>
-          </ac:spMkLst>
-        </pc:spChg>
-        <pc:spChg chg="del">
-          <ac:chgData name="François Espiasse" userId="c0683628fcfb6d84" providerId="LiveId" clId="{DD509A43-B970-4054-B7AC-6D7EC92A76F8}" dt="2019-04-18T07:41:44.820" v="1982" actId="478"/>
-          <ac:spMkLst>
-            <pc:docMk/>
-            <pc:sldMk cId="1011666680" sldId="295"/>
-            <ac:spMk id="5" creationId="{4D240630-B5B9-45DA-8407-4049A9C80335}"/>
-          </ac:spMkLst>
-        </pc:spChg>
-        <pc:spChg chg="add mod">
-          <ac:chgData name="François Espiasse" userId="c0683628fcfb6d84" providerId="LiveId" clId="{DD509A43-B970-4054-B7AC-6D7EC92A76F8}" dt="2019-04-18T07:41:47.116" v="1983" actId="478"/>
-          <ac:spMkLst>
-            <pc:docMk/>
-            <pc:sldMk cId="1011666680" sldId="295"/>
-            <ac:spMk id="6" creationId="{999FFF26-154E-4663-B1A5-A7C9447CEFE1}"/>
-          </ac:spMkLst>
-        </pc:spChg>
-        <pc:spChg chg="add del">
-          <ac:chgData name="François Espiasse" userId="c0683628fcfb6d84" providerId="LiveId" clId="{DD509A43-B970-4054-B7AC-6D7EC92A76F8}" dt="2019-04-18T07:44:21.726" v="1995"/>
-          <ac:spMkLst>
-            <pc:docMk/>
-            <pc:sldMk cId="1011666680" sldId="295"/>
-            <ac:spMk id="7" creationId="{86A4B9E6-D531-49C4-80EF-EB59F7631C59}"/>
-          </ac:spMkLst>
-        </pc:spChg>
-        <pc:spChg chg="mod">
-          <ac:chgData name="François Espiasse" userId="c0683628fcfb6d84" providerId="LiveId" clId="{DD509A43-B970-4054-B7AC-6D7EC92A76F8}" dt="2019-04-18T07:41:43.342" v="1981" actId="6549"/>
-          <ac:spMkLst>
-            <pc:docMk/>
-            <pc:sldMk cId="1011666680" sldId="295"/>
-            <ac:spMk id="11" creationId="{82082EE0-AD49-4ACA-A6E3-8E6B3CEFB1D7}"/>
-          </ac:spMkLst>
-        </pc:spChg>
-        <pc:picChg chg="del">
-          <ac:chgData name="François Espiasse" userId="c0683628fcfb6d84" providerId="LiveId" clId="{DD509A43-B970-4054-B7AC-6D7EC92A76F8}" dt="2019-04-18T07:41:28.717" v="1977" actId="478"/>
-          <ac:picMkLst>
-            <pc:docMk/>
-            <pc:sldMk cId="1011666680" sldId="295"/>
-            <ac:picMk id="2050" creationId="{5E809315-E7A0-411C-AC1C-422F9CAC6708}"/>
-          </ac:picMkLst>
-        </pc:picChg>
-        <pc:picChg chg="add del mod">
-          <ac:chgData name="François Espiasse" userId="c0683628fcfb6d84" providerId="LiveId" clId="{DD509A43-B970-4054-B7AC-6D7EC92A76F8}" dt="2019-04-18T07:44:19.700" v="1993" actId="478"/>
-          <ac:picMkLst>
-            <pc:docMk/>
-            <pc:sldMk cId="1011666680" sldId="295"/>
-            <ac:picMk id="3074" creationId="{E33E12AA-0CCA-4616-B639-FB9DF08352FF}"/>
-          </ac:picMkLst>
-        </pc:picChg>
-        <pc:picChg chg="add mod">
-          <ac:chgData name="François Espiasse" userId="c0683628fcfb6d84" providerId="LiveId" clId="{DD509A43-B970-4054-B7AC-6D7EC92A76F8}" dt="2019-04-18T07:44:49.552" v="2003" actId="1076"/>
-          <ac:picMkLst>
-            <pc:docMk/>
-            <pc:sldMk cId="1011666680" sldId="295"/>
-            <ac:picMk id="3076" creationId="{033CFDE4-997C-4F9E-9E4E-C32370117519}"/>
-          </ac:picMkLst>
-        </pc:picChg>
-      </pc:sldChg>
-      <pc:sldChg chg="addSp delSp modSp add mod modTransition setBg delDesignElem">
-        <pc:chgData name="François Espiasse" userId="c0683628fcfb6d84" providerId="LiveId" clId="{DD509A43-B970-4054-B7AC-6D7EC92A76F8}" dt="2019-04-18T08:29:30.794" v="2783" actId="1440"/>
-        <pc:sldMkLst>
-          <pc:docMk/>
-          <pc:sldMk cId="1058267896" sldId="295"/>
-        </pc:sldMkLst>
-        <pc:spChg chg="del mod">
-          <ac:chgData name="François Espiasse" userId="c0683628fcfb6d84" providerId="LiveId" clId="{DD509A43-B970-4054-B7AC-6D7EC92A76F8}" dt="2019-04-18T08:02:13.703" v="2404" actId="478"/>
-          <ac:spMkLst>
-            <pc:docMk/>
-            <pc:sldMk cId="1058267896" sldId="295"/>
-            <ac:spMk id="2" creationId="{433C5B92-C167-4D2F-886C-170AE55E2281}"/>
-          </ac:spMkLst>
-        </pc:spChg>
-        <pc:spChg chg="del">
-          <ac:chgData name="François Espiasse" userId="c0683628fcfb6d84" providerId="LiveId" clId="{DD509A43-B970-4054-B7AC-6D7EC92A76F8}" dt="2019-04-18T07:45:01.375" v="2007"/>
-          <ac:spMkLst>
-            <pc:docMk/>
-            <pc:sldMk cId="1058267896" sldId="295"/>
-            <ac:spMk id="3" creationId="{E52FEF62-311F-45DD-B0F2-F176BCB1672A}"/>
-          </ac:spMkLst>
-        </pc:spChg>
-        <pc:spChg chg="add mod">
-          <ac:chgData name="François Espiasse" userId="c0683628fcfb6d84" providerId="LiveId" clId="{DD509A43-B970-4054-B7AC-6D7EC92A76F8}" dt="2019-04-18T07:50:26.539" v="2037" actId="1076"/>
-          <ac:spMkLst>
-            <pc:docMk/>
-            <pc:sldMk cId="1058267896" sldId="295"/>
-            <ac:spMk id="5" creationId="{9F2C2FAE-B9F7-4267-8CC6-39C87EBC86FD}"/>
-          </ac:spMkLst>
-        </pc:spChg>
-        <pc:spChg chg="add mod">
-          <ac:chgData name="François Espiasse" userId="c0683628fcfb6d84" providerId="LiveId" clId="{DD509A43-B970-4054-B7AC-6D7EC92A76F8}" dt="2019-04-18T07:52:32.700" v="2110" actId="1076"/>
-          <ac:spMkLst>
-            <pc:docMk/>
-            <pc:sldMk cId="1058267896" sldId="295"/>
-            <ac:spMk id="6" creationId="{C4B2C0C2-F59A-4B87-A36D-7E4EF6CF2C3B}"/>
-          </ac:spMkLst>
-        </pc:spChg>
-        <pc:spChg chg="add del">
-          <ac:chgData name="François Espiasse" userId="c0683628fcfb6d84" providerId="LiveId" clId="{DD509A43-B970-4054-B7AC-6D7EC92A76F8}" dt="2019-04-18T08:01:26.993" v="2392"/>
-          <ac:spMkLst>
-            <pc:docMk/>
-            <pc:sldMk cId="1058267896" sldId="295"/>
-            <ac:spMk id="7" creationId="{48173D31-2554-4C79-A81D-2EB9F638FB59}"/>
-          </ac:spMkLst>
-        </pc:spChg>
-        <pc:spChg chg="add del mod">
-          <ac:chgData name="François Espiasse" userId="c0683628fcfb6d84" providerId="LiveId" clId="{DD509A43-B970-4054-B7AC-6D7EC92A76F8}" dt="2019-04-18T08:02:17.273" v="2405" actId="478"/>
-          <ac:spMkLst>
-            <pc:docMk/>
-            <pc:sldMk cId="1058267896" sldId="295"/>
-            <ac:spMk id="9" creationId="{9BD31D75-8395-4C84-8732-58F0AC042A75}"/>
-          </ac:spMkLst>
-        </pc:spChg>
-        <pc:spChg chg="add mod">
-          <ac:chgData name="François Espiasse" userId="c0683628fcfb6d84" providerId="LiveId" clId="{DD509A43-B970-4054-B7AC-6D7EC92A76F8}" dt="2019-04-18T08:14:26.019" v="2629"/>
-          <ac:spMkLst>
-            <pc:docMk/>
-            <pc:sldMk cId="1058267896" sldId="295"/>
-            <ac:spMk id="16" creationId="{C658BE3B-6A97-4F9B-A85A-1904389F1512}"/>
-          </ac:spMkLst>
-        </pc:spChg>
-        <pc:spChg chg="add del">
-          <ac:chgData name="François Espiasse" userId="c0683628fcfb6d84" providerId="LiveId" clId="{DD509A43-B970-4054-B7AC-6D7EC92A76F8}" dt="2019-04-18T07:46:17.730" v="2011" actId="26606"/>
-          <ac:spMkLst>
-            <pc:docMk/>
-            <pc:sldMk cId="1058267896" sldId="295"/>
-            <ac:spMk id="74" creationId="{E4B7B3E3-827A-48BE-AD67-A57C45AA6949}"/>
-          </ac:spMkLst>
-        </pc:spChg>
-        <pc:spChg chg="add del">
-          <ac:chgData name="François Espiasse" userId="c0683628fcfb6d84" providerId="LiveId" clId="{DD509A43-B970-4054-B7AC-6D7EC92A76F8}" dt="2019-04-18T08:12:31.126" v="2606"/>
-          <ac:spMkLst>
-            <pc:docMk/>
-            <pc:sldMk cId="1058267896" sldId="295"/>
-            <ac:spMk id="77" creationId="{E4B7B3E3-827A-48BE-AD67-A57C45AA6949}"/>
-          </ac:spMkLst>
-        </pc:spChg>
-        <pc:spChg chg="add del">
-          <ac:chgData name="François Espiasse" userId="c0683628fcfb6d84" providerId="LiveId" clId="{DD509A43-B970-4054-B7AC-6D7EC92A76F8}" dt="2019-04-18T07:46:37.795" v="2016" actId="26606"/>
-          <ac:spMkLst>
-            <pc:docMk/>
-            <pc:sldMk cId="1058267896" sldId="295"/>
-            <ac:spMk id="140" creationId="{E4B7B3E3-827A-48BE-AD67-A57C45AA6949}"/>
-          </ac:spMkLst>
-        </pc:spChg>
-        <pc:spChg chg="add mod ord">
-          <ac:chgData name="François Espiasse" userId="c0683628fcfb6d84" providerId="LiveId" clId="{DD509A43-B970-4054-B7AC-6D7EC92A76F8}" dt="2019-04-18T08:02:29.085" v="2407" actId="1076"/>
-          <ac:spMkLst>
-            <pc:docMk/>
-            <pc:sldMk cId="1058267896" sldId="295"/>
-            <ac:spMk id="4103" creationId="{7B80A19B-0EFA-48F5-8A05-1D5A5000803F}"/>
-          </ac:spMkLst>
-        </pc:spChg>
-        <pc:picChg chg="add mod">
-          <ac:chgData name="François Espiasse" userId="c0683628fcfb6d84" providerId="LiveId" clId="{DD509A43-B970-4054-B7AC-6D7EC92A76F8}" dt="2019-04-18T08:29:30.794" v="2783" actId="1440"/>
-          <ac:picMkLst>
-            <pc:docMk/>
-            <pc:sldMk cId="1058267896" sldId="295"/>
-            <ac:picMk id="4" creationId="{CFFC2E94-CC03-4F1B-AC3E-23E798424299}"/>
-          </ac:picMkLst>
-        </pc:picChg>
-        <pc:picChg chg="add del">
-          <ac:chgData name="François Espiasse" userId="c0683628fcfb6d84" providerId="LiveId" clId="{DD509A43-B970-4054-B7AC-6D7EC92A76F8}" dt="2019-04-18T07:45:04.272" v="2008" actId="26606"/>
-          <ac:picMkLst>
-            <pc:docMk/>
-            <pc:sldMk cId="1058267896" sldId="295"/>
-            <ac:picMk id="4098" creationId="{E5CD6109-D5A5-4ED1-B8BA-EFFA5F070464}"/>
-          </ac:picMkLst>
-        </pc:picChg>
-        <pc:picChg chg="add del">
-          <ac:chgData name="François Espiasse" userId="c0683628fcfb6d84" providerId="LiveId" clId="{DD509A43-B970-4054-B7AC-6D7EC92A76F8}" dt="2019-04-18T07:46:13.852" v="2009" actId="478"/>
-          <ac:picMkLst>
-            <pc:docMk/>
-            <pc:sldMk cId="1058267896" sldId="295"/>
-            <ac:picMk id="4101" creationId="{E5CD6109-D5A5-4ED1-B8BA-EFFA5F070464}"/>
-          </ac:picMkLst>
-        </pc:picChg>
-      </pc:sldChg>
-      <pc:sldChg chg="addSp delSp modSp add">
-        <pc:chgData name="François Espiasse" userId="c0683628fcfb6d84" providerId="LiveId" clId="{DD509A43-B970-4054-B7AC-6D7EC92A76F8}" dt="2019-04-18T19:39:43.766" v="2902" actId="1076"/>
-        <pc:sldMkLst>
-          <pc:docMk/>
-          <pc:sldMk cId="881511915" sldId="296"/>
-        </pc:sldMkLst>
-        <pc:spChg chg="del mod">
-          <ac:chgData name="François Espiasse" userId="c0683628fcfb6d84" providerId="LiveId" clId="{DD509A43-B970-4054-B7AC-6D7EC92A76F8}" dt="2019-04-18T19:34:04.751" v="2792"/>
-          <ac:spMkLst>
-            <pc:docMk/>
-            <pc:sldMk cId="881511915" sldId="296"/>
-            <ac:spMk id="3" creationId="{2ED55F86-98B7-4496-BCEF-A8A40D70AD12}"/>
-          </ac:spMkLst>
-        </pc:spChg>
-        <pc:spChg chg="add del mod">
-          <ac:chgData name="François Espiasse" userId="c0683628fcfb6d84" providerId="LiveId" clId="{DD509A43-B970-4054-B7AC-6D7EC92A76F8}" dt="2019-04-18T19:38:52.941" v="2889" actId="1076"/>
-          <ac:spMkLst>
-            <pc:docMk/>
-            <pc:sldMk cId="881511915" sldId="296"/>
-            <ac:spMk id="4" creationId="{9B73E8B2-8B88-4862-B73E-639B410B5009}"/>
-          </ac:spMkLst>
-        </pc:spChg>
-        <pc:spChg chg="add mod">
-          <ac:chgData name="François Espiasse" userId="c0683628fcfb6d84" providerId="LiveId" clId="{DD509A43-B970-4054-B7AC-6D7EC92A76F8}" dt="2019-04-18T19:39:02.930" v="2891" actId="1076"/>
-          <ac:spMkLst>
-            <pc:docMk/>
-            <pc:sldMk cId="881511915" sldId="296"/>
-            <ac:spMk id="5" creationId="{1636DB2E-E097-4728-9DD2-1CFB11806EF8}"/>
-          </ac:spMkLst>
-        </pc:spChg>
-        <pc:picChg chg="add del">
-          <ac:chgData name="François Espiasse" userId="c0683628fcfb6d84" providerId="LiveId" clId="{DD509A43-B970-4054-B7AC-6D7EC92A76F8}" dt="2019-04-18T19:38:44.577" v="2886"/>
-          <ac:picMkLst>
-            <pc:docMk/>
-            <pc:sldMk cId="881511915" sldId="296"/>
-            <ac:picMk id="12" creationId="{40BE5CC9-4788-4594-86C7-9DE029F11589}"/>
-          </ac:picMkLst>
-        </pc:picChg>
-        <pc:picChg chg="add del">
-          <ac:chgData name="François Espiasse" userId="c0683628fcfb6d84" providerId="LiveId" clId="{DD509A43-B970-4054-B7AC-6D7EC92A76F8}" dt="2019-04-18T19:38:44.577" v="2886"/>
-          <ac:picMkLst>
-            <pc:docMk/>
-            <pc:sldMk cId="881511915" sldId="296"/>
-            <ac:picMk id="13" creationId="{201ED159-863B-4766-88AF-0EB1F2307390}"/>
-          </ac:picMkLst>
-        </pc:picChg>
-        <pc:picChg chg="add del">
-          <ac:chgData name="François Espiasse" userId="c0683628fcfb6d84" providerId="LiveId" clId="{DD509A43-B970-4054-B7AC-6D7EC92A76F8}" dt="2019-04-18T19:38:44.577" v="2886"/>
-          <ac:picMkLst>
-            <pc:docMk/>
-            <pc:sldMk cId="881511915" sldId="296"/>
-            <ac:picMk id="14" creationId="{9371ABFD-ECA2-4953-8B72-FABDEDCF92D2}"/>
-          </ac:picMkLst>
-        </pc:picChg>
-        <pc:picChg chg="add del">
-          <ac:chgData name="François Espiasse" userId="c0683628fcfb6d84" providerId="LiveId" clId="{DD509A43-B970-4054-B7AC-6D7EC92A76F8}" dt="2019-04-18T19:38:44.577" v="2886"/>
-          <ac:picMkLst>
-            <pc:docMk/>
-            <pc:sldMk cId="881511915" sldId="296"/>
-            <ac:picMk id="15" creationId="{B9077327-0F9D-41C7-A629-4C7410E457D4}"/>
-          </ac:picMkLst>
-        </pc:picChg>
-        <pc:picChg chg="add del">
-          <ac:chgData name="François Espiasse" userId="c0683628fcfb6d84" providerId="LiveId" clId="{DD509A43-B970-4054-B7AC-6D7EC92A76F8}" dt="2019-04-18T19:38:44.577" v="2886"/>
-          <ac:picMkLst>
-            <pc:docMk/>
-            <pc:sldMk cId="881511915" sldId="296"/>
-            <ac:picMk id="16" creationId="{8E897CDA-3967-4C7F-99F7-5A8BCB123150}"/>
-          </ac:picMkLst>
-        </pc:picChg>
-        <pc:picChg chg="add del">
-          <ac:chgData name="François Espiasse" userId="c0683628fcfb6d84" providerId="LiveId" clId="{DD509A43-B970-4054-B7AC-6D7EC92A76F8}" dt="2019-04-18T19:38:44.577" v="2886"/>
-          <ac:picMkLst>
-            <pc:docMk/>
-            <pc:sldMk cId="881511915" sldId="296"/>
-            <ac:picMk id="17" creationId="{B35D8546-C445-48D0-B3ED-A1DD972AF565}"/>
-          </ac:picMkLst>
-        </pc:picChg>
-        <pc:picChg chg="add mod">
-          <ac:chgData name="François Espiasse" userId="c0683628fcfb6d84" providerId="LiveId" clId="{DD509A43-B970-4054-B7AC-6D7EC92A76F8}" dt="2019-04-18T19:39:40.759" v="2901" actId="1076"/>
-          <ac:picMkLst>
-            <pc:docMk/>
-            <pc:sldMk cId="881511915" sldId="296"/>
-            <ac:picMk id="18" creationId="{C54BE79B-0CE7-42C4-9DC2-293C7D165946}"/>
-          </ac:picMkLst>
-        </pc:picChg>
-        <pc:picChg chg="add mod">
-          <ac:chgData name="François Espiasse" userId="c0683628fcfb6d84" providerId="LiveId" clId="{DD509A43-B970-4054-B7AC-6D7EC92A76F8}" dt="2019-04-18T19:39:29.743" v="2898" actId="1076"/>
-          <ac:picMkLst>
-            <pc:docMk/>
-            <pc:sldMk cId="881511915" sldId="296"/>
-            <ac:picMk id="19" creationId="{EF319FC1-7664-4E97-B4F3-596AEC4F7702}"/>
-          </ac:picMkLst>
-        </pc:picChg>
-        <pc:picChg chg="add mod">
-          <ac:chgData name="François Espiasse" userId="c0683628fcfb6d84" providerId="LiveId" clId="{DD509A43-B970-4054-B7AC-6D7EC92A76F8}" dt="2019-04-18T19:39:37.380" v="2900" actId="1076"/>
-          <ac:picMkLst>
-            <pc:docMk/>
-            <pc:sldMk cId="881511915" sldId="296"/>
-            <ac:picMk id="20" creationId="{ADBCE91D-AC7F-4701-B0BA-7BDE4A1B36DC}"/>
-          </ac:picMkLst>
-        </pc:picChg>
-        <pc:picChg chg="add mod">
-          <ac:chgData name="François Espiasse" userId="c0683628fcfb6d84" providerId="LiveId" clId="{DD509A43-B970-4054-B7AC-6D7EC92A76F8}" dt="2019-04-18T19:39:31.846" v="2899" actId="1076"/>
-          <ac:picMkLst>
-            <pc:docMk/>
-            <pc:sldMk cId="881511915" sldId="296"/>
-            <ac:picMk id="21" creationId="{8BFB539A-63B9-4431-A6EE-BEBC5850FFF8}"/>
-          </ac:picMkLst>
-        </pc:picChg>
-        <pc:picChg chg="add mod">
-          <ac:chgData name="François Espiasse" userId="c0683628fcfb6d84" providerId="LiveId" clId="{DD509A43-B970-4054-B7AC-6D7EC92A76F8}" dt="2019-04-18T19:39:21.306" v="2895" actId="1076"/>
-          <ac:picMkLst>
-            <pc:docMk/>
-            <pc:sldMk cId="881511915" sldId="296"/>
-            <ac:picMk id="22" creationId="{0E56F9EF-AE95-4B5D-AAD4-37C247E39CE1}"/>
-          </ac:picMkLst>
-        </pc:picChg>
-        <pc:picChg chg="add mod">
-          <ac:chgData name="François Espiasse" userId="c0683628fcfb6d84" providerId="LiveId" clId="{DD509A43-B970-4054-B7AC-6D7EC92A76F8}" dt="2019-04-18T19:39:43.766" v="2902" actId="1076"/>
-          <ac:picMkLst>
-            <pc:docMk/>
-            <pc:sldMk cId="881511915" sldId="296"/>
-            <ac:picMk id="23" creationId="{7A247B6B-B63F-47E8-B1D5-DC89FC9D3A3D}"/>
-          </ac:picMkLst>
-        </pc:picChg>
-        <pc:picChg chg="add del mod">
-          <ac:chgData name="François Espiasse" userId="c0683628fcfb6d84" providerId="LiveId" clId="{DD509A43-B970-4054-B7AC-6D7EC92A76F8}" dt="2019-04-18T19:37:17.292" v="2813"/>
-          <ac:picMkLst>
-            <pc:docMk/>
-            <pc:sldMk cId="881511915" sldId="296"/>
-            <ac:picMk id="6146" creationId="{88FBBDBB-A281-443D-8142-9490E5EE558E}"/>
-          </ac:picMkLst>
-        </pc:picChg>
-        <pc:picChg chg="add del mod">
-          <ac:chgData name="François Espiasse" userId="c0683628fcfb6d84" providerId="LiveId" clId="{DD509A43-B970-4054-B7AC-6D7EC92A76F8}" dt="2019-04-18T19:37:17.292" v="2813"/>
-          <ac:picMkLst>
-            <pc:docMk/>
-            <pc:sldMk cId="881511915" sldId="296"/>
-            <ac:picMk id="6148" creationId="{A67E6C55-9795-4F14-A73C-0253476AAB66}"/>
-          </ac:picMkLst>
-        </pc:picChg>
-        <pc:picChg chg="add del mod">
-          <ac:chgData name="François Espiasse" userId="c0683628fcfb6d84" providerId="LiveId" clId="{DD509A43-B970-4054-B7AC-6D7EC92A76F8}" dt="2019-04-18T19:37:17.292" v="2813"/>
-          <ac:picMkLst>
-            <pc:docMk/>
-            <pc:sldMk cId="881511915" sldId="296"/>
-            <ac:picMk id="6150" creationId="{5709A8D6-B99C-4F97-A09B-9260ADA8C99C}"/>
-          </ac:picMkLst>
-        </pc:picChg>
-        <pc:picChg chg="add del mod">
-          <ac:chgData name="François Espiasse" userId="c0683628fcfb6d84" providerId="LiveId" clId="{DD509A43-B970-4054-B7AC-6D7EC92A76F8}" dt="2019-04-18T19:37:17.292" v="2813"/>
-          <ac:picMkLst>
-            <pc:docMk/>
-            <pc:sldMk cId="881511915" sldId="296"/>
-            <ac:picMk id="6152" creationId="{D44B77E5-277C-434E-BF21-ACC60C6E69BB}"/>
-          </ac:picMkLst>
-        </pc:picChg>
-        <pc:picChg chg="add del mod">
-          <ac:chgData name="François Espiasse" userId="c0683628fcfb6d84" providerId="LiveId" clId="{DD509A43-B970-4054-B7AC-6D7EC92A76F8}" dt="2019-04-18T19:37:17.292" v="2813"/>
-          <ac:picMkLst>
-            <pc:docMk/>
-            <pc:sldMk cId="881511915" sldId="296"/>
-            <ac:picMk id="6154" creationId="{7236AD3E-0DEB-4CEF-8020-C9FE261928D2}"/>
-          </ac:picMkLst>
-        </pc:picChg>
-        <pc:picChg chg="add del mod">
-          <ac:chgData name="François Espiasse" userId="c0683628fcfb6d84" providerId="LiveId" clId="{DD509A43-B970-4054-B7AC-6D7EC92A76F8}" dt="2019-04-18T19:37:17.292" v="2813"/>
-          <ac:picMkLst>
-            <pc:docMk/>
-            <pc:sldMk cId="881511915" sldId="296"/>
-            <ac:picMk id="6156" creationId="{5EE199F5-1600-4D5D-A7FD-204972FA803A}"/>
-          </ac:picMkLst>
-        </pc:picChg>
-      </pc:sldChg>
-      <pc:sldChg chg="modSp add ord">
-        <pc:chgData name="François Espiasse" userId="c0683628fcfb6d84" providerId="LiveId" clId="{DD509A43-B970-4054-B7AC-6D7EC92A76F8}" dt="2019-04-18T20:08:19.921" v="3725" actId="20577"/>
-        <pc:sldMkLst>
-          <pc:docMk/>
-          <pc:sldMk cId="2856616955" sldId="297"/>
-        </pc:sldMkLst>
-        <pc:spChg chg="mod">
-          <ac:chgData name="François Espiasse" userId="c0683628fcfb6d84" providerId="LiveId" clId="{DD509A43-B970-4054-B7AC-6D7EC92A76F8}" dt="2019-04-18T19:58:23.073" v="3157"/>
-          <ac:spMkLst>
-            <pc:docMk/>
-            <pc:sldMk cId="2856616955" sldId="297"/>
-            <ac:spMk id="2" creationId="{37E78542-7C8C-4FB1-854D-BF0ECC432EA5}"/>
-          </ac:spMkLst>
-        </pc:spChg>
-        <pc:spChg chg="mod">
-          <ac:chgData name="François Espiasse" userId="c0683628fcfb6d84" providerId="LiveId" clId="{DD509A43-B970-4054-B7AC-6D7EC92A76F8}" dt="2019-04-18T20:08:19.921" v="3725" actId="20577"/>
-          <ac:spMkLst>
-            <pc:docMk/>
-            <pc:sldMk cId="2856616955" sldId="297"/>
-            <ac:spMk id="3" creationId="{493F11BA-F9F5-4522-9FDC-00096238AC4B}"/>
-          </ac:spMkLst>
-        </pc:spChg>
-      </pc:sldChg>
-      <pc:sldChg chg="addSp delSp modSp add mod ord modTransition setBg">
-        <pc:chgData name="François Espiasse" userId="c0683628fcfb6d84" providerId="LiveId" clId="{DD509A43-B970-4054-B7AC-6D7EC92A76F8}" dt="2019-04-18T20:33:41.610" v="4644"/>
-        <pc:sldMkLst>
-          <pc:docMk/>
-          <pc:sldMk cId="68027691" sldId="298"/>
-        </pc:sldMkLst>
-        <pc:spChg chg="mod">
-          <ac:chgData name="François Espiasse" userId="c0683628fcfb6d84" providerId="LiveId" clId="{DD509A43-B970-4054-B7AC-6D7EC92A76F8}" dt="2019-04-18T20:29:15.323" v="4610" actId="26606"/>
-          <ac:spMkLst>
-            <pc:docMk/>
-            <pc:sldMk cId="68027691" sldId="298"/>
-            <ac:spMk id="2" creationId="{6B45980F-8181-46D5-AA5D-E3DE111C568D}"/>
-          </ac:spMkLst>
-        </pc:spChg>
-        <pc:spChg chg="mod ord">
-          <ac:chgData name="François Espiasse" userId="c0683628fcfb6d84" providerId="LiveId" clId="{DD509A43-B970-4054-B7AC-6D7EC92A76F8}" dt="2019-04-18T20:31:09.120" v="4632" actId="1076"/>
-          <ac:spMkLst>
-            <pc:docMk/>
-            <pc:sldMk cId="68027691" sldId="298"/>
-            <ac:spMk id="3" creationId="{22490130-137A-4A82-904D-782BA4A84076}"/>
-          </ac:spMkLst>
-        </pc:spChg>
-        <pc:spChg chg="add del">
-          <ac:chgData name="François Espiasse" userId="c0683628fcfb6d84" providerId="LiveId" clId="{DD509A43-B970-4054-B7AC-6D7EC92A76F8}" dt="2019-04-18T20:29:10.933" v="4607" actId="26606"/>
-          <ac:spMkLst>
-            <pc:docMk/>
-            <pc:sldMk cId="68027691" sldId="298"/>
-            <ac:spMk id="71" creationId="{E4B7B3E3-827A-48BE-AD67-A57C45AA6949}"/>
-          </ac:spMkLst>
-        </pc:spChg>
-        <pc:spChg chg="add del">
-          <ac:chgData name="François Espiasse" userId="c0683628fcfb6d84" providerId="LiveId" clId="{DD509A43-B970-4054-B7AC-6D7EC92A76F8}" dt="2019-04-18T20:29:15.323" v="4609" actId="26606"/>
-          <ac:spMkLst>
-            <pc:docMk/>
-            <pc:sldMk cId="68027691" sldId="298"/>
-            <ac:spMk id="7172" creationId="{14436AD2-BD0F-4545-B2E9-06007B35B8A7}"/>
-          </ac:spMkLst>
-        </pc:spChg>
-        <pc:picChg chg="add mod">
-          <ac:chgData name="François Espiasse" userId="c0683628fcfb6d84" providerId="LiveId" clId="{DD509A43-B970-4054-B7AC-6D7EC92A76F8}" dt="2019-04-18T20:32:07.541" v="4641" actId="14100"/>
-          <ac:picMkLst>
-            <pc:docMk/>
-            <pc:sldMk cId="68027691" sldId="298"/>
-            <ac:picMk id="4" creationId="{4F1FED42-1FB7-455E-B991-1561567CDC2C}"/>
-          </ac:picMkLst>
-        </pc:picChg>
-        <pc:picChg chg="add del mod">
-          <ac:chgData name="François Espiasse" userId="c0683628fcfb6d84" providerId="LiveId" clId="{DD509A43-B970-4054-B7AC-6D7EC92A76F8}" dt="2019-04-18T20:29:18.700" v="4611" actId="478"/>
-          <ac:picMkLst>
-            <pc:docMk/>
-            <pc:sldMk cId="68027691" sldId="298"/>
-            <ac:picMk id="7170" creationId="{76ECE481-239A-439D-8233-0BABCF21A9A3}"/>
-          </ac:picMkLst>
-        </pc:picChg>
-      </pc:sldChg>
-    </pc:docChg>
-  </pc:docChgLst>
-</pc:chgInfo>
 </file>
 
 <file path=ppt/diagrams/colors1.xml><?xml version="1.0" encoding="utf-8"?>
@@ -19970,7 +17334,7 @@
           <a:noFill/>
           <a:extLst>
             <a:ext uri="{909E8E84-426E-40dd-AFC4-6F175D3DCCD1}">
-              <a14:hiddenFill xmlns="" xmlns:a14="http://schemas.microsoft.com/office/drawing/2010/main">
+              <a14:hiddenFill xmlns:a14="http://schemas.microsoft.com/office/drawing/2010/main" xmlns="">
                 <a:solidFill>
                   <a:srgbClr val="FFFFFF"/>
                 </a:solidFill>
@@ -20029,7 +17393,7 @@
             </a:ln>
             <a:extLst>
               <a:ext uri="{91240B29-F687-4f45-9708-019B960494DF}">
-                <a14:hiddenLine xmlns="" xmlns:a14="http://schemas.microsoft.com/office/drawing/2010/main" w="9525">
+                <a14:hiddenLine xmlns:a14="http://schemas.microsoft.com/office/drawing/2010/main" xmlns="" w="9525">
                   <a:solidFill>
                     <a:srgbClr val="000000"/>
                   </a:solidFill>
@@ -20119,7 +17483,7 @@
             </a:ln>
             <a:extLst>
               <a:ext uri="{91240B29-F687-4f45-9708-019B960494DF}">
-                <a14:hiddenLine xmlns="" xmlns:a14="http://schemas.microsoft.com/office/drawing/2010/main" w="9525">
+                <a14:hiddenLine xmlns:a14="http://schemas.microsoft.com/office/drawing/2010/main" xmlns="" w="9525">
                   <a:solidFill>
                     <a:srgbClr val="000000"/>
                   </a:solidFill>
@@ -20209,7 +17573,7 @@
             </a:ln>
             <a:extLst>
               <a:ext uri="{91240B29-F687-4f45-9708-019B960494DF}">
-                <a14:hiddenLine xmlns="" xmlns:a14="http://schemas.microsoft.com/office/drawing/2010/main" w="9525">
+                <a14:hiddenLine xmlns:a14="http://schemas.microsoft.com/office/drawing/2010/main" xmlns="" w="9525">
                   <a:solidFill>
                     <a:srgbClr val="000000"/>
                   </a:solidFill>
@@ -20243,7 +17607,7 @@
             </a:ln>
             <a:extLst>
               <a:ext uri="{91240B29-F687-4f45-9708-019B960494DF}">
-                <a14:hiddenLine xmlns="" xmlns:a14="http://schemas.microsoft.com/office/drawing/2010/main" w="9525">
+                <a14:hiddenLine xmlns:a14="http://schemas.microsoft.com/office/drawing/2010/main" xmlns="" w="9525">
                   <a:solidFill>
                     <a:srgbClr val="000000"/>
                   </a:solidFill>
@@ -20333,7 +17697,7 @@
             </a:ln>
             <a:extLst>
               <a:ext uri="{91240B29-F687-4f45-9708-019B960494DF}">
-                <a14:hiddenLine xmlns="" xmlns:a14="http://schemas.microsoft.com/office/drawing/2010/main" w="9525">
+                <a14:hiddenLine xmlns:a14="http://schemas.microsoft.com/office/drawing/2010/main" xmlns="" w="9525">
                   <a:solidFill>
                     <a:srgbClr val="000000"/>
                   </a:solidFill>
@@ -20395,7 +17759,7 @@
             </a:ln>
             <a:extLst>
               <a:ext uri="{91240B29-F687-4f45-9708-019B960494DF}">
-                <a14:hiddenLine xmlns="" xmlns:a14="http://schemas.microsoft.com/office/drawing/2010/main" w="9525">
+                <a14:hiddenLine xmlns:a14="http://schemas.microsoft.com/office/drawing/2010/main" xmlns="" w="9525">
                   <a:solidFill>
                     <a:srgbClr val="000000"/>
                   </a:solidFill>
@@ -20457,7 +17821,7 @@
             </a:ln>
             <a:extLst>
               <a:ext uri="{91240B29-F687-4f45-9708-019B960494DF}">
-                <a14:hiddenLine xmlns="" xmlns:a14="http://schemas.microsoft.com/office/drawing/2010/main" w="9525">
+                <a14:hiddenLine xmlns:a14="http://schemas.microsoft.com/office/drawing/2010/main" xmlns="" w="9525">
                   <a:solidFill>
                     <a:srgbClr val="000000"/>
                   </a:solidFill>
@@ -20547,7 +17911,7 @@
             </a:ln>
             <a:extLst>
               <a:ext uri="{91240B29-F687-4f45-9708-019B960494DF}">
-                <a14:hiddenLine xmlns="" xmlns:a14="http://schemas.microsoft.com/office/drawing/2010/main" w="9525">
+                <a14:hiddenLine xmlns:a14="http://schemas.microsoft.com/office/drawing/2010/main" xmlns="" w="9525">
                   <a:solidFill>
                     <a:srgbClr val="000000"/>
                   </a:solidFill>
@@ -20609,7 +17973,7 @@
             </a:ln>
             <a:extLst>
               <a:ext uri="{91240B29-F687-4f45-9708-019B960494DF}">
-                <a14:hiddenLine xmlns="" xmlns:a14="http://schemas.microsoft.com/office/drawing/2010/main" w="9525">
+                <a14:hiddenLine xmlns:a14="http://schemas.microsoft.com/office/drawing/2010/main" xmlns="" w="9525">
                   <a:solidFill>
                     <a:srgbClr val="000000"/>
                   </a:solidFill>
@@ -20671,7 +18035,7 @@
             </a:ln>
             <a:extLst>
               <a:ext uri="{91240B29-F687-4f45-9708-019B960494DF}">
-                <a14:hiddenLine xmlns="" xmlns:a14="http://schemas.microsoft.com/office/drawing/2010/main" w="9525">
+                <a14:hiddenLine xmlns:a14="http://schemas.microsoft.com/office/drawing/2010/main" xmlns="" w="9525">
                   <a:solidFill>
                     <a:srgbClr val="000000"/>
                   </a:solidFill>
@@ -20761,7 +18125,7 @@
             </a:ln>
             <a:extLst>
               <a:ext uri="{91240B29-F687-4f45-9708-019B960494DF}">
-                <a14:hiddenLine xmlns="" xmlns:a14="http://schemas.microsoft.com/office/drawing/2010/main" w="9525">
+                <a14:hiddenLine xmlns:a14="http://schemas.microsoft.com/office/drawing/2010/main" xmlns="" w="9525">
                   <a:solidFill>
                     <a:srgbClr val="000000"/>
                   </a:solidFill>
@@ -20851,7 +18215,7 @@
             </a:ln>
             <a:extLst>
               <a:ext uri="{91240B29-F687-4f45-9708-019B960494DF}">
-                <a14:hiddenLine xmlns="" xmlns:a14="http://schemas.microsoft.com/office/drawing/2010/main" w="9525">
+                <a14:hiddenLine xmlns:a14="http://schemas.microsoft.com/office/drawing/2010/main" xmlns="" w="9525">
                   <a:solidFill>
                     <a:srgbClr val="000000"/>
                   </a:solidFill>
@@ -20913,7 +18277,7 @@
             </a:ln>
             <a:extLst>
               <a:ext uri="{91240B29-F687-4f45-9708-019B960494DF}">
-                <a14:hiddenLine xmlns="" xmlns:a14="http://schemas.microsoft.com/office/drawing/2010/main" w="9525">
+                <a14:hiddenLine xmlns:a14="http://schemas.microsoft.com/office/drawing/2010/main" xmlns="" w="9525">
                   <a:solidFill>
                     <a:srgbClr val="000000"/>
                   </a:solidFill>
@@ -21023,7 +18387,7 @@
             </a:ln>
             <a:extLst>
               <a:ext uri="{91240B29-F687-4f45-9708-019B960494DF}">
-                <a14:hiddenLine xmlns="" xmlns:a14="http://schemas.microsoft.com/office/drawing/2010/main" w="9525">
+                <a14:hiddenLine xmlns:a14="http://schemas.microsoft.com/office/drawing/2010/main" xmlns="" w="9525">
                   <a:solidFill>
                     <a:srgbClr val="000000"/>
                   </a:solidFill>
@@ -21085,7 +18449,7 @@
             </a:ln>
             <a:extLst>
               <a:ext uri="{91240B29-F687-4f45-9708-019B960494DF}">
-                <a14:hiddenLine xmlns="" xmlns:a14="http://schemas.microsoft.com/office/drawing/2010/main" w="9525">
+                <a14:hiddenLine xmlns:a14="http://schemas.microsoft.com/office/drawing/2010/main" xmlns="" w="9525">
                   <a:solidFill>
                     <a:srgbClr val="000000"/>
                   </a:solidFill>
@@ -21175,7 +18539,7 @@
             </a:ln>
             <a:extLst>
               <a:ext uri="{91240B29-F687-4f45-9708-019B960494DF}">
-                <a14:hiddenLine xmlns="" xmlns:a14="http://schemas.microsoft.com/office/drawing/2010/main" w="9525">
+                <a14:hiddenLine xmlns:a14="http://schemas.microsoft.com/office/drawing/2010/main" xmlns="" w="9525">
                   <a:solidFill>
                     <a:srgbClr val="000000"/>
                   </a:solidFill>
@@ -21265,7 +18629,7 @@
             </a:ln>
             <a:extLst>
               <a:ext uri="{91240B29-F687-4f45-9708-019B960494DF}">
-                <a14:hiddenLine xmlns="" xmlns:a14="http://schemas.microsoft.com/office/drawing/2010/main" w="9525">
+                <a14:hiddenLine xmlns:a14="http://schemas.microsoft.com/office/drawing/2010/main" xmlns="" w="9525">
                   <a:solidFill>
                     <a:srgbClr val="000000"/>
                   </a:solidFill>
@@ -21327,7 +18691,7 @@
             </a:ln>
             <a:extLst>
               <a:ext uri="{91240B29-F687-4f45-9708-019B960494DF}">
-                <a14:hiddenLine xmlns="" xmlns:a14="http://schemas.microsoft.com/office/drawing/2010/main" w="9525">
+                <a14:hiddenLine xmlns:a14="http://schemas.microsoft.com/office/drawing/2010/main" xmlns="" w="9525">
                   <a:solidFill>
                     <a:srgbClr val="000000"/>
                   </a:solidFill>
@@ -21417,7 +18781,7 @@
             </a:ln>
             <a:extLst>
               <a:ext uri="{91240B29-F687-4f45-9708-019B960494DF}">
-                <a14:hiddenLine xmlns="" xmlns:a14="http://schemas.microsoft.com/office/drawing/2010/main" w="9525">
+                <a14:hiddenLine xmlns:a14="http://schemas.microsoft.com/office/drawing/2010/main" xmlns="" w="9525">
                   <a:solidFill>
                     <a:srgbClr val="000000"/>
                   </a:solidFill>
@@ -21507,7 +18871,7 @@
             </a:ln>
             <a:extLst>
               <a:ext uri="{91240B29-F687-4f45-9708-019B960494DF}">
-                <a14:hiddenLine xmlns="" xmlns:a14="http://schemas.microsoft.com/office/drawing/2010/main" w="9525">
+                <a14:hiddenLine xmlns:a14="http://schemas.microsoft.com/office/drawing/2010/main" xmlns="" w="9525">
                   <a:solidFill>
                     <a:srgbClr val="000000"/>
                   </a:solidFill>
@@ -21563,7 +18927,7 @@
             </a:ln>
             <a:extLst>
               <a:ext uri="{91240B29-F687-4f45-9708-019B960494DF}">
-                <a14:hiddenLine xmlns="" xmlns:a14="http://schemas.microsoft.com/office/drawing/2010/main" w="9525">
+                <a14:hiddenLine xmlns:a14="http://schemas.microsoft.com/office/drawing/2010/main" xmlns="" w="9525">
                   <a:solidFill>
                     <a:srgbClr val="000000"/>
                   </a:solidFill>
@@ -21653,7 +19017,7 @@
             </a:ln>
             <a:extLst>
               <a:ext uri="{91240B29-F687-4f45-9708-019B960494DF}">
-                <a14:hiddenLine xmlns="" xmlns:a14="http://schemas.microsoft.com/office/drawing/2010/main" w="9525">
+                <a14:hiddenLine xmlns:a14="http://schemas.microsoft.com/office/drawing/2010/main" xmlns="" w="9525">
                   <a:solidFill>
                     <a:srgbClr val="000000"/>
                   </a:solidFill>
@@ -21709,7 +19073,7 @@
             </a:ln>
             <a:extLst>
               <a:ext uri="{91240B29-F687-4f45-9708-019B960494DF}">
-                <a14:hiddenLine xmlns="" xmlns:a14="http://schemas.microsoft.com/office/drawing/2010/main" w="9525">
+                <a14:hiddenLine xmlns:a14="http://schemas.microsoft.com/office/drawing/2010/main" xmlns="" w="9525">
                   <a:solidFill>
                     <a:srgbClr val="000000"/>
                   </a:solidFill>
@@ -21799,7 +19163,7 @@
             </a:ln>
             <a:extLst>
               <a:ext uri="{91240B29-F687-4f45-9708-019B960494DF}">
-                <a14:hiddenLine xmlns="" xmlns:a14="http://schemas.microsoft.com/office/drawing/2010/main" w="9525">
+                <a14:hiddenLine xmlns:a14="http://schemas.microsoft.com/office/drawing/2010/main" xmlns="" w="9525">
                   <a:solidFill>
                     <a:srgbClr val="000000"/>
                   </a:solidFill>
@@ -21867,7 +19231,7 @@
             </a:ln>
             <a:extLst>
               <a:ext uri="{91240B29-F687-4f45-9708-019B960494DF}">
-                <a14:hiddenLine xmlns="" xmlns:a14="http://schemas.microsoft.com/office/drawing/2010/main" w="9525">
+                <a14:hiddenLine xmlns:a14="http://schemas.microsoft.com/office/drawing/2010/main" xmlns="" w="9525">
                   <a:solidFill>
                     <a:srgbClr val="000000"/>
                   </a:solidFill>
@@ -21957,7 +19321,7 @@
             </a:ln>
             <a:extLst>
               <a:ext uri="{91240B29-F687-4f45-9708-019B960494DF}">
-                <a14:hiddenLine xmlns="" xmlns:a14="http://schemas.microsoft.com/office/drawing/2010/main" w="9525">
+                <a14:hiddenLine xmlns:a14="http://schemas.microsoft.com/office/drawing/2010/main" xmlns="" w="9525">
                   <a:solidFill>
                     <a:srgbClr val="000000"/>
                   </a:solidFill>
@@ -22025,7 +19389,7 @@
             </a:ln>
             <a:extLst>
               <a:ext uri="{91240B29-F687-4f45-9708-019B960494DF}">
-                <a14:hiddenLine xmlns="" xmlns:a14="http://schemas.microsoft.com/office/drawing/2010/main" w="9525">
+                <a14:hiddenLine xmlns:a14="http://schemas.microsoft.com/office/drawing/2010/main" xmlns="" w="9525">
                   <a:solidFill>
                     <a:srgbClr val="000000"/>
                   </a:solidFill>
@@ -22115,7 +19479,7 @@
             </a:ln>
             <a:extLst>
               <a:ext uri="{91240B29-F687-4f45-9708-019B960494DF}">
-                <a14:hiddenLine xmlns="" xmlns:a14="http://schemas.microsoft.com/office/drawing/2010/main" w="9525">
+                <a14:hiddenLine xmlns:a14="http://schemas.microsoft.com/office/drawing/2010/main" xmlns="" w="9525">
                   <a:solidFill>
                     <a:srgbClr val="000000"/>
                   </a:solidFill>
@@ -22149,7 +19513,7 @@
             </a:ln>
             <a:extLst>
               <a:ext uri="{91240B29-F687-4f45-9708-019B960494DF}">
-                <a14:hiddenLine xmlns="" xmlns:a14="http://schemas.microsoft.com/office/drawing/2010/main" w="9525">
+                <a14:hiddenLine xmlns:a14="http://schemas.microsoft.com/office/drawing/2010/main" xmlns="" w="9525">
                   <a:solidFill>
                     <a:srgbClr val="000000"/>
                   </a:solidFill>
@@ -22239,7 +19603,7 @@
             </a:ln>
             <a:extLst>
               <a:ext uri="{91240B29-F687-4f45-9708-019B960494DF}">
-                <a14:hiddenLine xmlns="" xmlns:a14="http://schemas.microsoft.com/office/drawing/2010/main" w="9525">
+                <a14:hiddenLine xmlns:a14="http://schemas.microsoft.com/office/drawing/2010/main" xmlns="" w="9525">
                   <a:solidFill>
                     <a:srgbClr val="000000"/>
                   </a:solidFill>
@@ -22301,7 +19665,7 @@
             </a:ln>
             <a:extLst>
               <a:ext uri="{91240B29-F687-4f45-9708-019B960494DF}">
-                <a14:hiddenLine xmlns="" xmlns:a14="http://schemas.microsoft.com/office/drawing/2010/main" w="9525">
+                <a14:hiddenLine xmlns:a14="http://schemas.microsoft.com/office/drawing/2010/main" xmlns="" w="9525">
                   <a:solidFill>
                     <a:srgbClr val="000000"/>
                   </a:solidFill>
@@ -22363,7 +19727,7 @@
             </a:ln>
             <a:extLst>
               <a:ext uri="{91240B29-F687-4f45-9708-019B960494DF}">
-                <a14:hiddenLine xmlns="" xmlns:a14="http://schemas.microsoft.com/office/drawing/2010/main" w="9525">
+                <a14:hiddenLine xmlns:a14="http://schemas.microsoft.com/office/drawing/2010/main" xmlns="" w="9525">
                   <a:solidFill>
                     <a:srgbClr val="000000"/>
                   </a:solidFill>
@@ -22453,7 +19817,7 @@
             </a:ln>
             <a:extLst>
               <a:ext uri="{91240B29-F687-4f45-9708-019B960494DF}">
-                <a14:hiddenLine xmlns="" xmlns:a14="http://schemas.microsoft.com/office/drawing/2010/main" w="9525">
+                <a14:hiddenLine xmlns:a14="http://schemas.microsoft.com/office/drawing/2010/main" xmlns="" w="9525">
                   <a:solidFill>
                     <a:srgbClr val="000000"/>
                   </a:solidFill>
@@ -22521,7 +19885,7 @@
             </a:ln>
             <a:extLst>
               <a:ext uri="{91240B29-F687-4f45-9708-019B960494DF}">
-                <a14:hiddenLine xmlns="" xmlns:a14="http://schemas.microsoft.com/office/drawing/2010/main" w="9525">
+                <a14:hiddenLine xmlns:a14="http://schemas.microsoft.com/office/drawing/2010/main" xmlns="" w="9525">
                   <a:solidFill>
                     <a:srgbClr val="000000"/>
                   </a:solidFill>
@@ -22583,7 +19947,7 @@
             </a:ln>
             <a:extLst>
               <a:ext uri="{91240B29-F687-4f45-9708-019B960494DF}">
-                <a14:hiddenLine xmlns="" xmlns:a14="http://schemas.microsoft.com/office/drawing/2010/main" w="9525">
+                <a14:hiddenLine xmlns:a14="http://schemas.microsoft.com/office/drawing/2010/main" xmlns="" w="9525">
                   <a:solidFill>
                     <a:srgbClr val="000000"/>
                   </a:solidFill>
@@ -22673,7 +20037,7 @@
             </a:ln>
             <a:extLst>
               <a:ext uri="{91240B29-F687-4f45-9708-019B960494DF}">
-                <a14:hiddenLine xmlns="" xmlns:a14="http://schemas.microsoft.com/office/drawing/2010/main" w="9525">
+                <a14:hiddenLine xmlns:a14="http://schemas.microsoft.com/office/drawing/2010/main" xmlns="" w="9525">
                   <a:solidFill>
                     <a:srgbClr val="000000"/>
                   </a:solidFill>
@@ -22735,7 +20099,7 @@
             </a:ln>
             <a:extLst>
               <a:ext uri="{91240B29-F687-4f45-9708-019B960494DF}">
-                <a14:hiddenLine xmlns="" xmlns:a14="http://schemas.microsoft.com/office/drawing/2010/main" w="9525">
+                <a14:hiddenLine xmlns:a14="http://schemas.microsoft.com/office/drawing/2010/main" xmlns="" w="9525">
                   <a:solidFill>
                     <a:srgbClr val="000000"/>
                   </a:solidFill>
@@ -22825,7 +20189,7 @@
             </a:ln>
             <a:extLst>
               <a:ext uri="{91240B29-F687-4f45-9708-019B960494DF}">
-                <a14:hiddenLine xmlns="" xmlns:a14="http://schemas.microsoft.com/office/drawing/2010/main" w="9525">
+                <a14:hiddenLine xmlns:a14="http://schemas.microsoft.com/office/drawing/2010/main" xmlns="" w="9525">
                   <a:solidFill>
                     <a:srgbClr val="000000"/>
                   </a:solidFill>
@@ -22887,7 +20251,7 @@
             </a:ln>
             <a:extLst>
               <a:ext uri="{91240B29-F687-4f45-9708-019B960494DF}">
-                <a14:hiddenLine xmlns="" xmlns:a14="http://schemas.microsoft.com/office/drawing/2010/main" w="9525">
+                <a14:hiddenLine xmlns:a14="http://schemas.microsoft.com/office/drawing/2010/main" xmlns="" w="9525">
                   <a:solidFill>
                     <a:srgbClr val="000000"/>
                   </a:solidFill>
@@ -22977,7 +20341,7 @@
             </a:ln>
             <a:extLst>
               <a:ext uri="{91240B29-F687-4f45-9708-019B960494DF}">
-                <a14:hiddenLine xmlns="" xmlns:a14="http://schemas.microsoft.com/office/drawing/2010/main" w="9525">
+                <a14:hiddenLine xmlns:a14="http://schemas.microsoft.com/office/drawing/2010/main" xmlns="" w="9525">
                   <a:solidFill>
                     <a:srgbClr val="000000"/>
                   </a:solidFill>
@@ -23011,7 +20375,7 @@
             </a:ln>
             <a:extLst>
               <a:ext uri="{91240B29-F687-4f45-9708-019B960494DF}">
-                <a14:hiddenLine xmlns="" xmlns:a14="http://schemas.microsoft.com/office/drawing/2010/main" w="9525">
+                <a14:hiddenLine xmlns:a14="http://schemas.microsoft.com/office/drawing/2010/main" xmlns="" w="9525">
                   <a:solidFill>
                     <a:srgbClr val="000000"/>
                   </a:solidFill>
@@ -23076,7 +20440,7 @@
             </a:ln>
             <a:extLst>
               <a:ext uri="{91240B29-F687-4f45-9708-019B960494DF}">
-                <a14:hiddenLine xmlns="" xmlns:a14="http://schemas.microsoft.com/office/drawing/2010/main" w="9525">
+                <a14:hiddenLine xmlns:a14="http://schemas.microsoft.com/office/drawing/2010/main" xmlns="" w="9525">
                   <a:solidFill>
                     <a:srgbClr val="000000"/>
                   </a:solidFill>
@@ -23166,7 +20530,7 @@
             </a:ln>
             <a:extLst>
               <a:ext uri="{91240B29-F687-4f45-9708-019B960494DF}">
-                <a14:hiddenLine xmlns="" xmlns:a14="http://schemas.microsoft.com/office/drawing/2010/main" w="9525">
+                <a14:hiddenLine xmlns:a14="http://schemas.microsoft.com/office/drawing/2010/main" xmlns="" w="9525">
                   <a:solidFill>
                     <a:srgbClr val="000000"/>
                   </a:solidFill>
@@ -23228,7 +20592,7 @@
             </a:ln>
             <a:extLst>
               <a:ext uri="{91240B29-F687-4f45-9708-019B960494DF}">
-                <a14:hiddenLine xmlns="" xmlns:a14="http://schemas.microsoft.com/office/drawing/2010/main" w="9525">
+                <a14:hiddenLine xmlns:a14="http://schemas.microsoft.com/office/drawing/2010/main" xmlns="" w="9525">
                   <a:solidFill>
                     <a:srgbClr val="000000"/>
                   </a:solidFill>
@@ -23318,7 +20682,7 @@
             </a:ln>
             <a:extLst>
               <a:ext uri="{91240B29-F687-4f45-9708-019B960494DF}">
-                <a14:hiddenLine xmlns="" xmlns:a14="http://schemas.microsoft.com/office/drawing/2010/main" w="9525">
+                <a14:hiddenLine xmlns:a14="http://schemas.microsoft.com/office/drawing/2010/main" xmlns="" w="9525">
                   <a:solidFill>
                     <a:srgbClr val="000000"/>
                   </a:solidFill>
@@ -23408,7 +20772,7 @@
             </a:ln>
             <a:extLst>
               <a:ext uri="{91240B29-F687-4f45-9708-019B960494DF}">
-                <a14:hiddenLine xmlns="" xmlns:a14="http://schemas.microsoft.com/office/drawing/2010/main" w="9525">
+                <a14:hiddenLine xmlns:a14="http://schemas.microsoft.com/office/drawing/2010/main" xmlns="" w="9525">
                   <a:solidFill>
                     <a:srgbClr val="000000"/>
                   </a:solidFill>
@@ -23473,7 +20837,7 @@
             </a:ln>
             <a:extLst>
               <a:ext uri="{91240B29-F687-4f45-9708-019B960494DF}">
-                <a14:hiddenLine xmlns="" xmlns:a14="http://schemas.microsoft.com/office/drawing/2010/main" w="9525">
+                <a14:hiddenLine xmlns:a14="http://schemas.microsoft.com/office/drawing/2010/main" xmlns="" w="9525">
                   <a:solidFill>
                     <a:srgbClr val="000000"/>
                   </a:solidFill>
@@ -23535,7 +20899,7 @@
             </a:ln>
             <a:extLst>
               <a:ext uri="{91240B29-F687-4f45-9708-019B960494DF}">
-                <a14:hiddenLine xmlns="" xmlns:a14="http://schemas.microsoft.com/office/drawing/2010/main" w="9525">
+                <a14:hiddenLine xmlns:a14="http://schemas.microsoft.com/office/drawing/2010/main" xmlns="" w="9525">
                   <a:solidFill>
                     <a:srgbClr val="000000"/>
                   </a:solidFill>
@@ -23625,7 +20989,7 @@
             </a:ln>
             <a:extLst>
               <a:ext uri="{91240B29-F687-4f45-9708-019B960494DF}">
-                <a14:hiddenLine xmlns="" xmlns:a14="http://schemas.microsoft.com/office/drawing/2010/main" w="9525">
+                <a14:hiddenLine xmlns:a14="http://schemas.microsoft.com/office/drawing/2010/main" xmlns="" w="9525">
                   <a:solidFill>
                     <a:srgbClr val="000000"/>
                   </a:solidFill>
@@ -23715,7 +21079,7 @@
             </a:ln>
             <a:extLst>
               <a:ext uri="{91240B29-F687-4f45-9708-019B960494DF}">
-                <a14:hiddenLine xmlns="" xmlns:a14="http://schemas.microsoft.com/office/drawing/2010/main" w="9525">
+                <a14:hiddenLine xmlns:a14="http://schemas.microsoft.com/office/drawing/2010/main" xmlns="" w="9525">
                   <a:solidFill>
                     <a:srgbClr val="000000"/>
                   </a:solidFill>
@@ -23777,7 +21141,7 @@
             </a:ln>
             <a:extLst>
               <a:ext uri="{91240B29-F687-4f45-9708-019B960494DF}">
-                <a14:hiddenLine xmlns="" xmlns:a14="http://schemas.microsoft.com/office/drawing/2010/main" w="9525">
+                <a14:hiddenLine xmlns:a14="http://schemas.microsoft.com/office/drawing/2010/main" xmlns="" w="9525">
                   <a:solidFill>
                     <a:srgbClr val="000000"/>
                   </a:solidFill>
@@ -23897,7 +21261,7 @@
             </a:ln>
             <a:extLst>
               <a:ext uri="{91240B29-F687-4f45-9708-019B960494DF}">
-                <a14:hiddenLine xmlns="" xmlns:a14="http://schemas.microsoft.com/office/drawing/2010/main" w="9525">
+                <a14:hiddenLine xmlns:a14="http://schemas.microsoft.com/office/drawing/2010/main" xmlns="" w="9525">
                   <a:solidFill>
                     <a:srgbClr val="000000"/>
                   </a:solidFill>
@@ -23965,7 +21329,7 @@
             </a:ln>
             <a:extLst>
               <a:ext uri="{91240B29-F687-4f45-9708-019B960494DF}">
-                <a14:hiddenLine xmlns="" xmlns:a14="http://schemas.microsoft.com/office/drawing/2010/main" w="9525">
+                <a14:hiddenLine xmlns:a14="http://schemas.microsoft.com/office/drawing/2010/main" xmlns="" w="9525">
                   <a:solidFill>
                     <a:srgbClr val="000000"/>
                   </a:solidFill>
@@ -24055,7 +21419,7 @@
             </a:ln>
             <a:extLst>
               <a:ext uri="{91240B29-F687-4f45-9708-019B960494DF}">
-                <a14:hiddenLine xmlns="" xmlns:a14="http://schemas.microsoft.com/office/drawing/2010/main" w="9525">
+                <a14:hiddenLine xmlns:a14="http://schemas.microsoft.com/office/drawing/2010/main" xmlns="" w="9525">
                   <a:solidFill>
                     <a:srgbClr val="000000"/>
                   </a:solidFill>
@@ -24195,7 +21559,7 @@
           <a:p>
             <a:fld id="{48A87A34-81AB-432B-8DAE-1953F412C126}" type="datetimeFigureOut">
               <a:rPr lang="en-US" smtClean="0"/>
-              <a:t>4/17/2019</a:t>
+              <a:t>4/19/2019</a:t>
             </a:fld>
             <a:endParaRPr lang="en-US" dirty="0"/>
           </a:p>
@@ -24462,7 +21826,7 @@
           <a:p>
             <a:fld id="{48A87A34-81AB-432B-8DAE-1953F412C126}" type="datetimeFigureOut">
               <a:rPr lang="en-US" smtClean="0"/>
-              <a:t>4/17/2019</a:t>
+              <a:t>4/19/2019</a:t>
             </a:fld>
             <a:endParaRPr lang="en-US" dirty="0"/>
           </a:p>
@@ -24658,7 +22022,7 @@
           <a:p>
             <a:fld id="{48A87A34-81AB-432B-8DAE-1953F412C126}" type="datetimeFigureOut">
               <a:rPr lang="en-US" smtClean="0"/>
-              <a:t>4/17/2019</a:t>
+              <a:t>4/19/2019</a:t>
             </a:fld>
             <a:endParaRPr lang="en-US" dirty="0"/>
           </a:p>
@@ -24921,7 +22285,7 @@
           <a:p>
             <a:fld id="{48A87A34-81AB-432B-8DAE-1953F412C126}" type="datetimeFigureOut">
               <a:rPr lang="en-US" smtClean="0"/>
-              <a:t>4/17/2019</a:t>
+              <a:t>4/19/2019</a:t>
             </a:fld>
             <a:endParaRPr lang="en-US" dirty="0"/>
           </a:p>
@@ -25355,7 +22719,7 @@
           <a:p>
             <a:fld id="{48A87A34-81AB-432B-8DAE-1953F412C126}" type="datetimeFigureOut">
               <a:rPr lang="en-US" smtClean="0"/>
-              <a:t>4/17/2019</a:t>
+              <a:t>4/19/2019</a:t>
             </a:fld>
             <a:endParaRPr lang="en-US" dirty="0"/>
           </a:p>
@@ -25901,7 +23265,7 @@
           <a:p>
             <a:fld id="{48A87A34-81AB-432B-8DAE-1953F412C126}" type="datetimeFigureOut">
               <a:rPr lang="en-US" smtClean="0"/>
-              <a:t>4/17/2019</a:t>
+              <a:t>4/19/2019</a:t>
             </a:fld>
             <a:endParaRPr lang="en-US" dirty="0"/>
           </a:p>
@@ -26621,7 +23985,7 @@
           <a:p>
             <a:fld id="{48A87A34-81AB-432B-8DAE-1953F412C126}" type="datetimeFigureOut">
               <a:rPr lang="en-US" smtClean="0"/>
-              <a:t>4/17/2019</a:t>
+              <a:t>4/19/2019</a:t>
             </a:fld>
             <a:endParaRPr lang="en-US" dirty="0"/>
           </a:p>
@@ -26791,7 +24155,7 @@
           <a:p>
             <a:fld id="{48A87A34-81AB-432B-8DAE-1953F412C126}" type="datetimeFigureOut">
               <a:rPr lang="en-US" smtClean="0"/>
-              <a:t>4/17/2019</a:t>
+              <a:t>4/19/2019</a:t>
             </a:fld>
             <a:endParaRPr lang="en-US" dirty="0"/>
           </a:p>
@@ -26971,7 +24335,7 @@
           <a:p>
             <a:fld id="{48A87A34-81AB-432B-8DAE-1953F412C126}" type="datetimeFigureOut">
               <a:rPr lang="en-US" smtClean="0"/>
-              <a:t>4/17/2019</a:t>
+              <a:t>4/19/2019</a:t>
             </a:fld>
             <a:endParaRPr lang="en-US" dirty="0"/>
           </a:p>
@@ -27141,7 +24505,7 @@
           <a:p>
             <a:fld id="{48A87A34-81AB-432B-8DAE-1953F412C126}" type="datetimeFigureOut">
               <a:rPr lang="en-US" smtClean="0"/>
-              <a:t>4/17/2019</a:t>
+              <a:t>4/19/2019</a:t>
             </a:fld>
             <a:endParaRPr lang="en-US" dirty="0"/>
           </a:p>
@@ -27391,7 +24755,7 @@
           <a:p>
             <a:fld id="{48A87A34-81AB-432B-8DAE-1953F412C126}" type="datetimeFigureOut">
               <a:rPr lang="en-US" smtClean="0"/>
-              <a:t>4/17/2019</a:t>
+              <a:t>4/19/2019</a:t>
             </a:fld>
             <a:endParaRPr lang="en-US" dirty="0"/>
           </a:p>
@@ -27623,7 +24987,7 @@
           <a:p>
             <a:fld id="{48A87A34-81AB-432B-8DAE-1953F412C126}" type="datetimeFigureOut">
               <a:rPr lang="en-US" smtClean="0"/>
-              <a:t>4/17/2019</a:t>
+              <a:t>4/19/2019</a:t>
             </a:fld>
             <a:endParaRPr lang="en-US" dirty="0"/>
           </a:p>
@@ -28004,7 +25368,7 @@
           <a:p>
             <a:fld id="{48A87A34-81AB-432B-8DAE-1953F412C126}" type="datetimeFigureOut">
               <a:rPr lang="en-US" smtClean="0"/>
-              <a:t>4/17/2019</a:t>
+              <a:t>4/19/2019</a:t>
             </a:fld>
             <a:endParaRPr lang="en-US" dirty="0"/>
           </a:p>
@@ -28122,7 +25486,7 @@
           <a:p>
             <a:fld id="{48A87A34-81AB-432B-8DAE-1953F412C126}" type="datetimeFigureOut">
               <a:rPr lang="en-US" smtClean="0"/>
-              <a:t>4/17/2019</a:t>
+              <a:t>4/19/2019</a:t>
             </a:fld>
             <a:endParaRPr lang="en-US" dirty="0"/>
           </a:p>
@@ -28217,7 +25581,7 @@
           <a:p>
             <a:fld id="{48A87A34-81AB-432B-8DAE-1953F412C126}" type="datetimeFigureOut">
               <a:rPr lang="en-US" smtClean="0"/>
-              <a:t>4/17/2019</a:t>
+              <a:t>4/19/2019</a:t>
             </a:fld>
             <a:endParaRPr lang="en-US" dirty="0"/>
           </a:p>
@@ -28466,7 +25830,7 @@
           <a:p>
             <a:fld id="{48A87A34-81AB-432B-8DAE-1953F412C126}" type="datetimeFigureOut">
               <a:rPr lang="en-US" smtClean="0"/>
-              <a:t>4/17/2019</a:t>
+              <a:t>4/19/2019</a:t>
             </a:fld>
             <a:endParaRPr lang="en-US" dirty="0"/>
           </a:p>
@@ -28746,7 +26110,7 @@
           <a:p>
             <a:fld id="{48A87A34-81AB-432B-8DAE-1953F412C126}" type="datetimeFigureOut">
               <a:rPr lang="en-US" smtClean="0"/>
-              <a:t>4/17/2019</a:t>
+              <a:t>4/19/2019</a:t>
             </a:fld>
             <a:endParaRPr lang="en-US" dirty="0"/>
           </a:p>
@@ -28869,7 +26233,7 @@
           <a:noFill/>
           <a:extLst>
             <a:ext uri="{909E8E84-426E-40dd-AFC4-6F175D3DCCD1}">
-              <a14:hiddenFill xmlns="" xmlns:a14="http://schemas.microsoft.com/office/drawing/2010/main">
+              <a14:hiddenFill xmlns:a14="http://schemas.microsoft.com/office/drawing/2010/main" xmlns="">
                 <a:solidFill>
                   <a:srgbClr val="FFFFFF"/>
                 </a:solidFill>
@@ -28943,7 +26307,7 @@
               </a:ln>
               <a:extLst>
                 <a:ext uri="{91240B29-F687-4f45-9708-019B960494DF}">
-                  <a14:hiddenLine xmlns="" xmlns:a14="http://schemas.microsoft.com/office/drawing/2010/main" w="9525">
+                  <a14:hiddenLine xmlns:a14="http://schemas.microsoft.com/office/drawing/2010/main" xmlns="" w="9525">
                     <a:solidFill>
                       <a:srgbClr val="000000"/>
                     </a:solidFill>
@@ -29033,7 +26397,7 @@
               </a:ln>
               <a:extLst>
                 <a:ext uri="{91240B29-F687-4f45-9708-019B960494DF}">
-                  <a14:hiddenLine xmlns="" xmlns:a14="http://schemas.microsoft.com/office/drawing/2010/main" w="9525">
+                  <a14:hiddenLine xmlns:a14="http://schemas.microsoft.com/office/drawing/2010/main" xmlns="" w="9525">
                     <a:solidFill>
                       <a:srgbClr val="000000"/>
                     </a:solidFill>
@@ -29123,7 +26487,7 @@
               </a:ln>
               <a:extLst>
                 <a:ext uri="{91240B29-F687-4f45-9708-019B960494DF}">
-                  <a14:hiddenLine xmlns="" xmlns:a14="http://schemas.microsoft.com/office/drawing/2010/main" w="9525">
+                  <a14:hiddenLine xmlns:a14="http://schemas.microsoft.com/office/drawing/2010/main" xmlns="" w="9525">
                     <a:solidFill>
                       <a:srgbClr val="000000"/>
                     </a:solidFill>
@@ -29185,7 +26549,7 @@
               </a:ln>
               <a:extLst>
                 <a:ext uri="{91240B29-F687-4f45-9708-019B960494DF}">
-                  <a14:hiddenLine xmlns="" xmlns:a14="http://schemas.microsoft.com/office/drawing/2010/main" w="9525">
+                  <a14:hiddenLine xmlns:a14="http://schemas.microsoft.com/office/drawing/2010/main" xmlns="" w="9525">
                     <a:solidFill>
                       <a:srgbClr val="000000"/>
                     </a:solidFill>
@@ -29275,7 +26639,7 @@
               </a:ln>
               <a:extLst>
                 <a:ext uri="{91240B29-F687-4f45-9708-019B960494DF}">
-                  <a14:hiddenLine xmlns="" xmlns:a14="http://schemas.microsoft.com/office/drawing/2010/main" w="9525">
+                  <a14:hiddenLine xmlns:a14="http://schemas.microsoft.com/office/drawing/2010/main" xmlns="" w="9525">
                     <a:solidFill>
                       <a:srgbClr val="000000"/>
                     </a:solidFill>
@@ -29337,7 +26701,7 @@
               </a:ln>
               <a:extLst>
                 <a:ext uri="{91240B29-F687-4f45-9708-019B960494DF}">
-                  <a14:hiddenLine xmlns="" xmlns:a14="http://schemas.microsoft.com/office/drawing/2010/main" w="9525">
+                  <a14:hiddenLine xmlns:a14="http://schemas.microsoft.com/office/drawing/2010/main" xmlns="" w="9525">
                     <a:solidFill>
                       <a:srgbClr val="000000"/>
                     </a:solidFill>
@@ -29399,7 +26763,7 @@
               </a:ln>
               <a:extLst>
                 <a:ext uri="{91240B29-F687-4f45-9708-019B960494DF}">
-                  <a14:hiddenLine xmlns="" xmlns:a14="http://schemas.microsoft.com/office/drawing/2010/main" w="9525">
+                  <a14:hiddenLine xmlns:a14="http://schemas.microsoft.com/office/drawing/2010/main" xmlns="" w="9525">
                     <a:solidFill>
                       <a:srgbClr val="000000"/>
                     </a:solidFill>
@@ -29489,7 +26853,7 @@
               </a:ln>
               <a:extLst>
                 <a:ext uri="{91240B29-F687-4f45-9708-019B960494DF}">
-                  <a14:hiddenLine xmlns="" xmlns:a14="http://schemas.microsoft.com/office/drawing/2010/main" w="9525">
+                  <a14:hiddenLine xmlns:a14="http://schemas.microsoft.com/office/drawing/2010/main" xmlns="" w="9525">
                     <a:solidFill>
                       <a:srgbClr val="000000"/>
                     </a:solidFill>
@@ -29579,7 +26943,7 @@
               </a:ln>
               <a:extLst>
                 <a:ext uri="{91240B29-F687-4f45-9708-019B960494DF}">
-                  <a14:hiddenLine xmlns="" xmlns:a14="http://schemas.microsoft.com/office/drawing/2010/main" w="9525">
+                  <a14:hiddenLine xmlns:a14="http://schemas.microsoft.com/office/drawing/2010/main" xmlns="" w="9525">
                     <a:solidFill>
                       <a:srgbClr val="000000"/>
                     </a:solidFill>
@@ -29641,7 +27005,7 @@
               </a:ln>
               <a:extLst>
                 <a:ext uri="{91240B29-F687-4f45-9708-019B960494DF}">
-                  <a14:hiddenLine xmlns="" xmlns:a14="http://schemas.microsoft.com/office/drawing/2010/main" w="9525">
+                  <a14:hiddenLine xmlns:a14="http://schemas.microsoft.com/office/drawing/2010/main" xmlns="" w="9525">
                     <a:solidFill>
                       <a:srgbClr val="000000"/>
                     </a:solidFill>
@@ -29751,7 +27115,7 @@
               </a:ln>
               <a:extLst>
                 <a:ext uri="{91240B29-F687-4f45-9708-019B960494DF}">
-                  <a14:hiddenLine xmlns="" xmlns:a14="http://schemas.microsoft.com/office/drawing/2010/main" w="9525">
+                  <a14:hiddenLine xmlns:a14="http://schemas.microsoft.com/office/drawing/2010/main" xmlns="" w="9525">
                     <a:solidFill>
                       <a:srgbClr val="000000"/>
                     </a:solidFill>
@@ -29835,7 +27199,7 @@
               </a:ln>
               <a:extLst>
                 <a:ext uri="{91240B29-F687-4f45-9708-019B960494DF}">
-                  <a14:hiddenLine xmlns="" xmlns:a14="http://schemas.microsoft.com/office/drawing/2010/main" w="9525">
+                  <a14:hiddenLine xmlns:a14="http://schemas.microsoft.com/office/drawing/2010/main" xmlns="" w="9525">
                     <a:solidFill>
                       <a:srgbClr val="000000"/>
                     </a:solidFill>
@@ -29897,7 +27261,7 @@
               </a:ln>
               <a:extLst>
                 <a:ext uri="{91240B29-F687-4f45-9708-019B960494DF}">
-                  <a14:hiddenLine xmlns="" xmlns:a14="http://schemas.microsoft.com/office/drawing/2010/main" w="9525">
+                  <a14:hiddenLine xmlns:a14="http://schemas.microsoft.com/office/drawing/2010/main" xmlns="" w="9525">
                     <a:solidFill>
                       <a:srgbClr val="000000"/>
                     </a:solidFill>
@@ -29959,7 +27323,7 @@
               </a:ln>
               <a:extLst>
                 <a:ext uri="{91240B29-F687-4f45-9708-019B960494DF}">
-                  <a14:hiddenLine xmlns="" xmlns:a14="http://schemas.microsoft.com/office/drawing/2010/main" w="9525">
+                  <a14:hiddenLine xmlns:a14="http://schemas.microsoft.com/office/drawing/2010/main" xmlns="" w="9525">
                     <a:solidFill>
                       <a:srgbClr val="000000"/>
                     </a:solidFill>
@@ -30049,7 +27413,7 @@
               </a:ln>
               <a:extLst>
                 <a:ext uri="{91240B29-F687-4f45-9708-019B960494DF}">
-                  <a14:hiddenLine xmlns="" xmlns:a14="http://schemas.microsoft.com/office/drawing/2010/main" w="9525">
+                  <a14:hiddenLine xmlns:a14="http://schemas.microsoft.com/office/drawing/2010/main" xmlns="" w="9525">
                     <a:solidFill>
                       <a:srgbClr val="000000"/>
                     </a:solidFill>
@@ -30083,7 +27447,7 @@
               </a:ln>
               <a:extLst>
                 <a:ext uri="{91240B29-F687-4f45-9708-019B960494DF}">
-                  <a14:hiddenLine xmlns="" xmlns:a14="http://schemas.microsoft.com/office/drawing/2010/main" w="9525">
+                  <a14:hiddenLine xmlns:a14="http://schemas.microsoft.com/office/drawing/2010/main" xmlns="" w="9525">
                     <a:solidFill>
                       <a:srgbClr val="000000"/>
                     </a:solidFill>
@@ -30148,7 +27512,7 @@
               </a:ln>
               <a:extLst>
                 <a:ext uri="{91240B29-F687-4f45-9708-019B960494DF}">
-                  <a14:hiddenLine xmlns="" xmlns:a14="http://schemas.microsoft.com/office/drawing/2010/main" w="9525">
+                  <a14:hiddenLine xmlns:a14="http://schemas.microsoft.com/office/drawing/2010/main" xmlns="" w="9525">
                     <a:solidFill>
                       <a:srgbClr val="000000"/>
                     </a:solidFill>
@@ -30238,7 +27602,7 @@
               </a:ln>
               <a:extLst>
                 <a:ext uri="{91240B29-F687-4f45-9708-019B960494DF}">
-                  <a14:hiddenLine xmlns="" xmlns:a14="http://schemas.microsoft.com/office/drawing/2010/main" w="9525">
+                  <a14:hiddenLine xmlns:a14="http://schemas.microsoft.com/office/drawing/2010/main" xmlns="" w="9525">
                     <a:solidFill>
                       <a:srgbClr val="000000"/>
                     </a:solidFill>
@@ -30300,7 +27664,7 @@
               </a:ln>
               <a:extLst>
                 <a:ext uri="{91240B29-F687-4f45-9708-019B960494DF}">
-                  <a14:hiddenLine xmlns="" xmlns:a14="http://schemas.microsoft.com/office/drawing/2010/main" w="9525">
+                  <a14:hiddenLine xmlns:a14="http://schemas.microsoft.com/office/drawing/2010/main" xmlns="" w="9525">
                     <a:solidFill>
                       <a:srgbClr val="000000"/>
                     </a:solidFill>
@@ -30390,7 +27754,7 @@
               </a:ln>
               <a:extLst>
                 <a:ext uri="{91240B29-F687-4f45-9708-019B960494DF}">
-                  <a14:hiddenLine xmlns="" xmlns:a14="http://schemas.microsoft.com/office/drawing/2010/main" w="9525">
+                  <a14:hiddenLine xmlns:a14="http://schemas.microsoft.com/office/drawing/2010/main" xmlns="" w="9525">
                     <a:solidFill>
                       <a:srgbClr val="000000"/>
                     </a:solidFill>
@@ -30455,7 +27819,7 @@
               </a:ln>
               <a:extLst>
                 <a:ext uri="{91240B29-F687-4f45-9708-019B960494DF}">
-                  <a14:hiddenLine xmlns="" xmlns:a14="http://schemas.microsoft.com/office/drawing/2010/main" w="9525">
+                  <a14:hiddenLine xmlns:a14="http://schemas.microsoft.com/office/drawing/2010/main" xmlns="" w="9525">
                     <a:solidFill>
                       <a:srgbClr val="000000"/>
                     </a:solidFill>
@@ -30517,7 +27881,7 @@
               </a:ln>
               <a:extLst>
                 <a:ext uri="{91240B29-F687-4f45-9708-019B960494DF}">
-                  <a14:hiddenLine xmlns="" xmlns:a14="http://schemas.microsoft.com/office/drawing/2010/main" w="9525">
+                  <a14:hiddenLine xmlns:a14="http://schemas.microsoft.com/office/drawing/2010/main" xmlns="" w="9525">
                     <a:solidFill>
                       <a:srgbClr val="000000"/>
                     </a:solidFill>
@@ -30607,7 +27971,7 @@
               </a:ln>
               <a:extLst>
                 <a:ext uri="{91240B29-F687-4f45-9708-019B960494DF}">
-                  <a14:hiddenLine xmlns="" xmlns:a14="http://schemas.microsoft.com/office/drawing/2010/main" w="9525">
+                  <a14:hiddenLine xmlns:a14="http://schemas.microsoft.com/office/drawing/2010/main" xmlns="" w="9525">
                     <a:solidFill>
                       <a:srgbClr val="000000"/>
                     </a:solidFill>
@@ -30697,7 +28061,7 @@
               </a:ln>
               <a:extLst>
                 <a:ext uri="{91240B29-F687-4f45-9708-019B960494DF}">
-                  <a14:hiddenLine xmlns="" xmlns:a14="http://schemas.microsoft.com/office/drawing/2010/main" w="9525">
+                  <a14:hiddenLine xmlns:a14="http://schemas.microsoft.com/office/drawing/2010/main" xmlns="" w="9525">
                     <a:solidFill>
                       <a:srgbClr val="000000"/>
                     </a:solidFill>
@@ -30762,7 +28126,7 @@
               </a:ln>
               <a:extLst>
                 <a:ext uri="{91240B29-F687-4f45-9708-019B960494DF}">
-                  <a14:hiddenLine xmlns="" xmlns:a14="http://schemas.microsoft.com/office/drawing/2010/main" w="9525">
+                  <a14:hiddenLine xmlns:a14="http://schemas.microsoft.com/office/drawing/2010/main" xmlns="" w="9525">
                     <a:solidFill>
                       <a:srgbClr val="000000"/>
                     </a:solidFill>
@@ -30882,7 +28246,7 @@
               </a:ln>
               <a:extLst>
                 <a:ext uri="{91240B29-F687-4f45-9708-019B960494DF}">
-                  <a14:hiddenLine xmlns="" xmlns:a14="http://schemas.microsoft.com/office/drawing/2010/main" w="9525">
+                  <a14:hiddenLine xmlns:a14="http://schemas.microsoft.com/office/drawing/2010/main" xmlns="" w="9525">
                     <a:solidFill>
                       <a:srgbClr val="000000"/>
                     </a:solidFill>
@@ -30963,7 +28327,7 @@
               </a:ln>
               <a:extLst>
                 <a:ext uri="{91240B29-F687-4f45-9708-019B960494DF}">
-                  <a14:hiddenLine xmlns="" xmlns:a14="http://schemas.microsoft.com/office/drawing/2010/main" w="9525">
+                  <a14:hiddenLine xmlns:a14="http://schemas.microsoft.com/office/drawing/2010/main" xmlns="" w="9525">
                     <a:solidFill>
                       <a:srgbClr val="000000"/>
                     </a:solidFill>
@@ -31078,7 +28442,7 @@
               </a:ln>
               <a:extLst>
                 <a:ext uri="{91240B29-F687-4f45-9708-019B960494DF}">
-                  <a14:hiddenLine xmlns="" xmlns:a14="http://schemas.microsoft.com/office/drawing/2010/main" w="9525">
+                  <a14:hiddenLine xmlns:a14="http://schemas.microsoft.com/office/drawing/2010/main" xmlns="" w="9525">
                     <a:solidFill>
                       <a:srgbClr val="000000"/>
                     </a:solidFill>
@@ -31168,7 +28532,7 @@
               </a:ln>
               <a:extLst>
                 <a:ext uri="{91240B29-F687-4f45-9708-019B960494DF}">
-                  <a14:hiddenLine xmlns="" xmlns:a14="http://schemas.microsoft.com/office/drawing/2010/main" w="9525">
+                  <a14:hiddenLine xmlns:a14="http://schemas.microsoft.com/office/drawing/2010/main" xmlns="" w="9525">
                     <a:solidFill>
                       <a:srgbClr val="000000"/>
                     </a:solidFill>
@@ -31233,7 +28597,7 @@
               </a:ln>
               <a:extLst>
                 <a:ext uri="{91240B29-F687-4f45-9708-019B960494DF}">
-                  <a14:hiddenLine xmlns="" xmlns:a14="http://schemas.microsoft.com/office/drawing/2010/main" w="9525">
+                  <a14:hiddenLine xmlns:a14="http://schemas.microsoft.com/office/drawing/2010/main" xmlns="" w="9525">
                     <a:solidFill>
                       <a:srgbClr val="000000"/>
                     </a:solidFill>
@@ -31323,7 +28687,7 @@
               </a:ln>
               <a:extLst>
                 <a:ext uri="{91240B29-F687-4f45-9708-019B960494DF}">
-                  <a14:hiddenLine xmlns="" xmlns:a14="http://schemas.microsoft.com/office/drawing/2010/main" w="9525">
+                  <a14:hiddenLine xmlns:a14="http://schemas.microsoft.com/office/drawing/2010/main" xmlns="" w="9525">
                     <a:solidFill>
                       <a:srgbClr val="000000"/>
                     </a:solidFill>
@@ -31391,7 +28755,7 @@
               </a:ln>
               <a:extLst>
                 <a:ext uri="{91240B29-F687-4f45-9708-019B960494DF}">
-                  <a14:hiddenLine xmlns="" xmlns:a14="http://schemas.microsoft.com/office/drawing/2010/main" w="9525">
+                  <a14:hiddenLine xmlns:a14="http://schemas.microsoft.com/office/drawing/2010/main" xmlns="" w="9525">
                     <a:solidFill>
                       <a:srgbClr val="000000"/>
                     </a:solidFill>
@@ -31481,7 +28845,7 @@
               </a:ln>
               <a:extLst>
                 <a:ext uri="{91240B29-F687-4f45-9708-019B960494DF}">
-                  <a14:hiddenLine xmlns="" xmlns:a14="http://schemas.microsoft.com/office/drawing/2010/main" w="9525">
+                  <a14:hiddenLine xmlns:a14="http://schemas.microsoft.com/office/drawing/2010/main" xmlns="" w="9525">
                     <a:solidFill>
                       <a:srgbClr val="000000"/>
                     </a:solidFill>
@@ -31549,7 +28913,7 @@
               </a:ln>
               <a:extLst>
                 <a:ext uri="{91240B29-F687-4f45-9708-019B960494DF}">
-                  <a14:hiddenLine xmlns="" xmlns:a14="http://schemas.microsoft.com/office/drawing/2010/main" w="9525">
+                  <a14:hiddenLine xmlns:a14="http://schemas.microsoft.com/office/drawing/2010/main" xmlns="" w="9525">
                     <a:solidFill>
                       <a:srgbClr val="000000"/>
                     </a:solidFill>
@@ -31639,7 +29003,7 @@
               </a:ln>
               <a:extLst>
                 <a:ext uri="{91240B29-F687-4f45-9708-019B960494DF}">
-                  <a14:hiddenLine xmlns="" xmlns:a14="http://schemas.microsoft.com/office/drawing/2010/main" w="9525">
+                  <a14:hiddenLine xmlns:a14="http://schemas.microsoft.com/office/drawing/2010/main" xmlns="" w="9525">
                     <a:solidFill>
                       <a:srgbClr val="000000"/>
                     </a:solidFill>
@@ -31673,7 +29037,7 @@
               </a:ln>
               <a:extLst>
                 <a:ext uri="{91240B29-F687-4f45-9708-019B960494DF}">
-                  <a14:hiddenLine xmlns="" xmlns:a14="http://schemas.microsoft.com/office/drawing/2010/main" w="9525">
+                  <a14:hiddenLine xmlns:a14="http://schemas.microsoft.com/office/drawing/2010/main" xmlns="" w="9525">
                     <a:solidFill>
                       <a:srgbClr val="000000"/>
                     </a:solidFill>
@@ -31814,7 +29178,7 @@
             <a:fld id="{48A87A34-81AB-432B-8DAE-1953F412C126}" type="datetimeFigureOut">
               <a:rPr lang="en-US" smtClean="0"/>
               <a:pPr/>
-              <a:t>4/17/2019</a:t>
+              <a:t>4/19/2019</a:t>
             </a:fld>
             <a:endParaRPr lang="en-US" dirty="0"/>
           </a:p>
@@ -32430,15 +29794,6 @@
           <a:effectLst>
             <a:reflection blurRad="12700" stA="38000" endPos="28000" dist="5000" dir="5400000" sy="-100000" algn="bl" rotWithShape="0"/>
           </a:effectLst>
-          <a:extLst>
-            <a:ext uri="{909E8E84-426E-40DD-AFC4-6F175D3DCCD1}">
-              <a14:hiddenFill xmlns:a14="http://schemas.microsoft.com/office/drawing/2010/main">
-                <a:solidFill>
-                  <a:srgbClr val="FFFFFF"/>
-                </a:solidFill>
-              </a14:hiddenFill>
-            </a:ext>
-          </a:extLst>
         </p:spPr>
       </p:pic>
     </p:spTree>
@@ -32475,7 +29830,6 @@
                 <a:lumMod val="150000"/>
               </a:schemeClr>
             </a:duotone>
-            <a:extLst/>
           </a:blip>
           <a:stretch/>
         </a:blipFill>
@@ -32535,7 +29889,6 @@
           </p:cNvGraphicFramePr>
           <p:nvPr>
             <p:ph idx="1"/>
-            <p:extLst/>
           </p:nvPr>
         </p:nvGraphicFramePr>
         <p:xfrm>
@@ -32558,13 +29911,13 @@
   <p:clrMapOvr>
     <a:masterClrMapping/>
   </p:clrMapOvr>
-  <mc:AlternateContent xmlns:mc="http://schemas.openxmlformats.org/markup-compatibility/2006">
-    <mc:Choice xmlns:p14="http://schemas.microsoft.com/office/powerpoint/2010/main" Requires="p14">
+  <mc:AlternateContent xmlns:mc="http://schemas.openxmlformats.org/markup-compatibility/2006" xmlns:p14="http://schemas.microsoft.com/office/powerpoint/2010/main">
+    <mc:Choice Requires="p14">
       <p:transition spd="med" p14:dur="700">
         <p:fade/>
       </p:transition>
     </mc:Choice>
-    <mc:Fallback>
+    <mc:Fallback xmlns="">
       <p:transition spd="med">
         <p:fade/>
       </p:transition>
@@ -32594,7 +29947,6 @@
                 <a:lumMod val="150000"/>
               </a:schemeClr>
             </a:duotone>
-            <a:extLst/>
           </a:blip>
           <a:stretch/>
         </a:blipFill>
@@ -32779,15 +30131,6 @@
               <a:srgbClr val="C0C0C0"/>
             </a:contourClr>
           </a:sp3d>
-          <a:extLst>
-            <a:ext uri="{909E8E84-426E-40DD-AFC4-6F175D3DCCD1}">
-              <a14:hiddenFill xmlns:a14="http://schemas.microsoft.com/office/drawing/2010/main">
-                <a:solidFill>
-                  <a:srgbClr val="FFFFFF"/>
-                </a:solidFill>
-              </a14:hiddenFill>
-            </a:ext>
-          </a:extLst>
         </p:spPr>
       </p:pic>
     </p:spTree>
@@ -32800,13 +30143,13 @@
   <p:clrMapOvr>
     <a:masterClrMapping/>
   </p:clrMapOvr>
-  <mc:AlternateContent xmlns:mc="http://schemas.openxmlformats.org/markup-compatibility/2006">
-    <mc:Choice xmlns:p159="http://schemas.microsoft.com/office/powerpoint/2015/09/main" Requires="p159">
+  <mc:AlternateContent xmlns:mc="http://schemas.openxmlformats.org/markup-compatibility/2006" xmlns:p159="http://schemas.microsoft.com/office/powerpoint/2015/09/main">
+    <mc:Choice Requires="p159">
       <p:transition xmlns:p14="http://schemas.microsoft.com/office/powerpoint/2010/main" spd="slow" p14:dur="2000">
         <p159:morph option="byObject"/>
       </p:transition>
     </mc:Choice>
-    <mc:Fallback>
+    <mc:Fallback xmlns="">
       <p:transition spd="slow">
         <p:fade/>
       </p:transition>
@@ -32836,7 +30179,6 @@
                 <a:lumMod val="150000"/>
               </a:schemeClr>
             </a:duotone>
-            <a:extLst/>
           </a:blip>
           <a:stretch/>
         </a:blipFill>
@@ -32922,13 +30264,13 @@
   <p:clrMapOvr>
     <a:masterClrMapping/>
   </p:clrMapOvr>
-  <mc:AlternateContent xmlns:mc="http://schemas.openxmlformats.org/markup-compatibility/2006">
-    <mc:Choice xmlns:p14="http://schemas.microsoft.com/office/powerpoint/2010/main" Requires="p14">
+  <mc:AlternateContent xmlns:mc="http://schemas.openxmlformats.org/markup-compatibility/2006" xmlns:p14="http://schemas.microsoft.com/office/powerpoint/2010/main">
+    <mc:Choice Requires="p14">
       <p:transition spd="med" p14:dur="700">
         <p:fade/>
       </p:transition>
     </mc:Choice>
-    <mc:Fallback>
+    <mc:Fallback xmlns="">
       <p:transition spd="med">
         <p:fade/>
       </p:transition>
@@ -32958,7 +30300,6 @@
                 <a:lumMod val="90000"/>
               </a:schemeClr>
             </a:duotone>
-            <a:extLst/>
           </a:blip>
           <a:stretch/>
         </a:blipFill>
@@ -33133,13 +30474,13 @@
   <p:clrMapOvr>
     <a:masterClrMapping/>
   </p:clrMapOvr>
-  <mc:AlternateContent xmlns:mc="http://schemas.openxmlformats.org/markup-compatibility/2006">
-    <mc:Choice xmlns:p159="http://schemas.microsoft.com/office/powerpoint/2015/09/main" Requires="p159">
+  <mc:AlternateContent xmlns:mc="http://schemas.openxmlformats.org/markup-compatibility/2006" xmlns:p159="http://schemas.microsoft.com/office/powerpoint/2015/09/main">
+    <mc:Choice Requires="p159">
       <p:transition xmlns:p14="http://schemas.microsoft.com/office/powerpoint/2010/main" spd="slow" p14:dur="2000">
         <p159:morph option="byObject"/>
       </p:transition>
     </mc:Choice>
-    <mc:Fallback>
+    <mc:Fallback xmlns="">
       <p:transition spd="slow">
         <p:fade/>
       </p:transition>
@@ -33169,7 +30510,6 @@
                 <a:lumMod val="90000"/>
               </a:schemeClr>
             </a:duotone>
-            <a:extLst/>
           </a:blip>
           <a:stretch/>
         </a:blipFill>
@@ -33500,13 +30840,13 @@
   <p:clrMapOvr>
     <a:masterClrMapping/>
   </p:clrMapOvr>
-  <mc:AlternateContent xmlns:mc="http://schemas.openxmlformats.org/markup-compatibility/2006">
-    <mc:Choice xmlns:p159="http://schemas.microsoft.com/office/powerpoint/2015/09/main" Requires="p159">
+  <mc:AlternateContent xmlns:mc="http://schemas.openxmlformats.org/markup-compatibility/2006" xmlns:p159="http://schemas.microsoft.com/office/powerpoint/2015/09/main">
+    <mc:Choice Requires="p159">
       <p:transition xmlns:p14="http://schemas.microsoft.com/office/powerpoint/2010/main" spd="slow" p14:dur="2000">
         <p159:morph option="byObject"/>
       </p:transition>
     </mc:Choice>
-    <mc:Fallback>
+    <mc:Fallback xmlns="">
       <p:transition spd="slow">
         <p:fade/>
       </p:transition>
@@ -33536,7 +30876,6 @@
                 <a:lumMod val="90000"/>
               </a:schemeClr>
             </a:duotone>
-            <a:extLst/>
           </a:blip>
           <a:stretch/>
         </a:blipFill>
@@ -33668,7 +31007,7 @@
           </a:xfrm>
         </p:spPr>
         <p:txBody>
-          <a:bodyPr>
+          <a:bodyPr vert="horz" lIns="91440" tIns="45720" rIns="91440" bIns="45720" rtlCol="0" anchor="t">
             <a:normAutofit/>
           </a:bodyPr>
           <a:lstStyle/>
@@ -33718,7 +31057,7 @@
             </a:r>
             <a:r>
               <a:rPr lang="en-US" sz="1800" dirty="0" err="1"/>
-              <a:t>pirncipaux</a:t>
+              <a:t>principaux</a:t>
             </a:r>
             <a:r>
               <a:rPr lang="en-US" sz="1800" dirty="0"/>
@@ -33832,13 +31171,13 @@
   <p:clrMapOvr>
     <a:masterClrMapping/>
   </p:clrMapOvr>
-  <mc:AlternateContent xmlns:mc="http://schemas.openxmlformats.org/markup-compatibility/2006">
-    <mc:Choice xmlns:p14="http://schemas.microsoft.com/office/powerpoint/2010/main" Requires="p14">
+  <mc:AlternateContent xmlns:mc="http://schemas.openxmlformats.org/markup-compatibility/2006" xmlns:p14="http://schemas.microsoft.com/office/powerpoint/2010/main">
+    <mc:Choice Requires="p14">
       <p:transition spd="med" p14:dur="700">
         <p:fade/>
       </p:transition>
     </mc:Choice>
-    <mc:Fallback>
+    <mc:Fallback xmlns="">
       <p:transition spd="med">
         <p:fade/>
       </p:transition>
@@ -34006,13 +31345,13 @@
   <p:clrMapOvr>
     <a:overrideClrMapping bg1="dk1" tx1="lt1" bg2="dk2" tx2="lt2" accent1="accent1" accent2="accent2" accent3="accent3" accent4="accent4" accent5="accent5" accent6="accent6" hlink="hlink" folHlink="folHlink"/>
   </p:clrMapOvr>
-  <mc:AlternateContent xmlns:mc="http://schemas.openxmlformats.org/markup-compatibility/2006">
-    <mc:Choice xmlns:p159="http://schemas.microsoft.com/office/powerpoint/2015/09/main" Requires="p159">
+  <mc:AlternateContent xmlns:mc="http://schemas.openxmlformats.org/markup-compatibility/2006" xmlns:p159="http://schemas.microsoft.com/office/powerpoint/2015/09/main">
+    <mc:Choice Requires="p159">
       <p:transition xmlns:p14="http://schemas.microsoft.com/office/powerpoint/2010/main" spd="slow" p14:dur="2000">
         <p159:morph option="byObject"/>
       </p:transition>
     </mc:Choice>
-    <mc:Fallback>
+    <mc:Fallback xmlns="">
       <p:transition spd="slow">
         <p:fade/>
       </p:transition>
@@ -34143,13 +31482,13 @@
   <p:clrMapOvr>
     <a:masterClrMapping/>
   </p:clrMapOvr>
-  <mc:AlternateContent xmlns:mc="http://schemas.openxmlformats.org/markup-compatibility/2006">
-    <mc:Choice xmlns:p14="http://schemas.microsoft.com/office/powerpoint/2010/main" Requires="p14">
+  <mc:AlternateContent xmlns:mc="http://schemas.openxmlformats.org/markup-compatibility/2006" xmlns:p14="http://schemas.microsoft.com/office/powerpoint/2010/main">
+    <mc:Choice Requires="p14">
       <p:transition spd="med" p14:dur="700">
         <p:fade/>
       </p:transition>
     </mc:Choice>
-    <mc:Fallback>
+    <mc:Fallback xmlns="">
       <p:transition spd="med">
         <p:fade/>
       </p:transition>
@@ -34329,13 +31668,13 @@
   <p:clrMapOvr>
     <a:masterClrMapping/>
   </p:clrMapOvr>
-  <mc:AlternateContent xmlns:mc="http://schemas.openxmlformats.org/markup-compatibility/2006">
-    <mc:Choice xmlns:p159="http://schemas.microsoft.com/office/powerpoint/2015/09/main" Requires="p159">
+  <mc:AlternateContent xmlns:mc="http://schemas.openxmlformats.org/markup-compatibility/2006" xmlns:p159="http://schemas.microsoft.com/office/powerpoint/2015/09/main">
+    <mc:Choice Requires="p159">
       <p:transition xmlns:p14="http://schemas.microsoft.com/office/powerpoint/2010/main" spd="slow" p14:dur="2000">
         <p159:morph option="byObject"/>
       </p:transition>
     </mc:Choice>
-    <mc:Fallback>
+    <mc:Fallback xmlns="">
       <p:transition spd="slow">
         <p:fade/>
       </p:transition>
@@ -34365,7 +31704,6 @@
                 <a:lumMod val="90000"/>
               </a:schemeClr>
             </a:duotone>
-            <a:extLst/>
           </a:blip>
           <a:stretch/>
         </a:blipFill>
@@ -34830,13 +32168,13 @@
   <p:clrMapOvr>
     <a:masterClrMapping/>
   </p:clrMapOvr>
-  <mc:AlternateContent xmlns:mc="http://schemas.openxmlformats.org/markup-compatibility/2006">
-    <mc:Choice xmlns:p14="http://schemas.microsoft.com/office/powerpoint/2010/main" Requires="p14">
+  <mc:AlternateContent xmlns:mc="http://schemas.openxmlformats.org/markup-compatibility/2006" xmlns:p14="http://schemas.microsoft.com/office/powerpoint/2010/main">
+    <mc:Choice Requires="p14">
       <p:transition spd="med" p14:dur="700">
         <p:fade/>
       </p:transition>
     </mc:Choice>
-    <mc:Fallback>
+    <mc:Fallback xmlns="">
       <p:transition spd="med">
         <p:fade/>
       </p:transition>
@@ -35106,7 +32444,6 @@
           <a:effectLst>
             <a:reflection blurRad="12700" stA="38000" endPos="28000" dist="5000" dir="5400000" sy="-100000" algn="bl" rotWithShape="0"/>
           </a:effectLst>
-          <a:extLst/>
         </p:spPr>
       </p:pic>
     </p:spTree>
@@ -35119,13 +32456,13 @@
   <p:clrMapOvr>
     <a:masterClrMapping/>
   </p:clrMapOvr>
-  <mc:AlternateContent xmlns:mc="http://schemas.openxmlformats.org/markup-compatibility/2006">
-    <mc:Choice xmlns:p14="http://schemas.microsoft.com/office/powerpoint/2010/main" Requires="p14">
+  <mc:AlternateContent xmlns:mc="http://schemas.openxmlformats.org/markup-compatibility/2006" xmlns:p14="http://schemas.microsoft.com/office/powerpoint/2010/main">
+    <mc:Choice Requires="p14">
       <p:transition spd="slow" p14:dur="1500">
         <p:split orient="vert"/>
       </p:transition>
     </mc:Choice>
-    <mc:Fallback>
+    <mc:Fallback xmlns="">
       <p:transition spd="slow">
         <p:split orient="vert"/>
       </p:transition>
@@ -35241,7 +32578,7 @@
           </a:xfrm>
         </p:spPr>
         <p:txBody>
-          <a:bodyPr vert="horz" lIns="91440" tIns="45720" rIns="91440" bIns="45720" rtlCol="0">
+          <a:bodyPr vert="horz" lIns="91440" tIns="45720" rIns="91440" bIns="45720" rtlCol="0" anchor="t">
             <a:normAutofit/>
           </a:bodyPr>
           <a:lstStyle/>
@@ -35293,7 +32630,7 @@
             </a:pPr>
             <a:r>
               <a:rPr lang="fr-FR" sz="1800" dirty="0"/>
-              <a:t> Ressources hardware physiques sous la responsabilité du fournisseur de services Cloud. Parallèlement, l'accès aux composants virtualisés est fournit à l'entreprise afin que celle-ci puisse construire ses propres plateformes IT.</a:t>
+              <a:t> Ressources hardware physiques sous la responsabilité du fournisseur de services Cloud. Parallèlement, l'accès aux composants virtualisés est fourni à l'entreprise afin que celle-ci puisse construire ses propres plateformes IT.</a:t>
             </a:r>
           </a:p>
           <a:p>
@@ -35343,13 +32680,13 @@
   <p:clrMapOvr>
     <a:masterClrMapping/>
   </p:clrMapOvr>
-  <mc:AlternateContent xmlns:mc="http://schemas.openxmlformats.org/markup-compatibility/2006">
-    <mc:Choice xmlns:p159="http://schemas.microsoft.com/office/powerpoint/2015/09/main" Requires="p159">
+  <mc:AlternateContent xmlns:mc="http://schemas.openxmlformats.org/markup-compatibility/2006" xmlns:p159="http://schemas.microsoft.com/office/powerpoint/2015/09/main">
+    <mc:Choice Requires="p159">
       <p:transition xmlns:p14="http://schemas.microsoft.com/office/powerpoint/2010/main" spd="slow" p14:dur="2000">
         <p159:morph option="byObject"/>
       </p:transition>
     </mc:Choice>
-    <mc:Fallback>
+    <mc:Fallback xmlns="">
       <p:transition spd="slow">
         <p:fade/>
       </p:transition>
@@ -35379,7 +32716,6 @@
                 <a:lumMod val="90000"/>
               </a:schemeClr>
             </a:duotone>
-            <a:extLst/>
           </a:blip>
           <a:stretch/>
         </a:blipFill>
@@ -35471,13 +32807,13 @@
   <p:clrMapOvr>
     <a:masterClrMapping/>
   </p:clrMapOvr>
-  <mc:AlternateContent xmlns:mc="http://schemas.openxmlformats.org/markup-compatibility/2006">
-    <mc:Choice xmlns:p14="http://schemas.microsoft.com/office/powerpoint/2010/main" Requires="p14">
+  <mc:AlternateContent xmlns:mc="http://schemas.openxmlformats.org/markup-compatibility/2006" xmlns:p14="http://schemas.microsoft.com/office/powerpoint/2010/main">
+    <mc:Choice Requires="p14">
       <p:transition spd="med" p14:dur="700">
         <p:fade/>
       </p:transition>
     </mc:Choice>
-    <mc:Fallback>
+    <mc:Fallback xmlns="">
       <p:transition spd="med">
         <p:fade/>
       </p:transition>
@@ -35617,7 +32953,7 @@
           </a:xfrm>
         </p:spPr>
         <p:txBody>
-          <a:bodyPr vert="horz" lIns="91440" tIns="45720" rIns="91440" bIns="45720" rtlCol="0">
+          <a:bodyPr vert="horz" lIns="91440" tIns="45720" rIns="91440" bIns="45720" rtlCol="0" anchor="t">
             <a:normAutofit/>
           </a:bodyPr>
           <a:lstStyle/>
@@ -35654,7 +32990,7 @@
             </a:pPr>
             <a:r>
               <a:rPr lang="fr-FR" sz="2000" dirty="0"/>
-              <a:t>Fournit une plateforme qui permet au client de développer, lancer et gérer des applications et logiciels sans se soucier de la l’infrastructure et de sa maintenance.</a:t>
+              <a:t>Fournit une plateforme qui permet au client de développer, lancer et gérer des applications et logiciels sans se soucier de l’infrastructure et de sa maintenance.</a:t>
             </a:r>
             <a:br>
               <a:rPr lang="fr-FR" dirty="0"/>
@@ -35737,13 +33073,13 @@
   <p:clrMapOvr>
     <a:masterClrMapping/>
   </p:clrMapOvr>
-  <mc:AlternateContent xmlns:mc="http://schemas.openxmlformats.org/markup-compatibility/2006">
-    <mc:Choice xmlns:p159="http://schemas.microsoft.com/office/powerpoint/2015/09/main" Requires="p159">
+  <mc:AlternateContent xmlns:mc="http://schemas.openxmlformats.org/markup-compatibility/2006" xmlns:p159="http://schemas.microsoft.com/office/powerpoint/2015/09/main">
+    <mc:Choice Requires="p159">
       <p:transition xmlns:p14="http://schemas.microsoft.com/office/powerpoint/2010/main" spd="slow" p14:dur="2000">
         <p159:morph option="byObject"/>
       </p:transition>
     </mc:Choice>
-    <mc:Fallback>
+    <mc:Fallback xmlns="">
       <p:transition spd="slow">
         <p:fade/>
       </p:transition>
@@ -35773,7 +33109,6 @@
                 <a:lumMod val="90000"/>
               </a:schemeClr>
             </a:duotone>
-            <a:extLst/>
           </a:blip>
           <a:stretch/>
         </a:blipFill>
@@ -36111,13 +33446,13 @@
   <p:clrMapOvr>
     <a:masterClrMapping/>
   </p:clrMapOvr>
-  <mc:AlternateContent xmlns:mc="http://schemas.openxmlformats.org/markup-compatibility/2006">
-    <mc:Choice xmlns:p159="http://schemas.microsoft.com/office/powerpoint/2015/09/main" Requires="p159">
+  <mc:AlternateContent xmlns:mc="http://schemas.openxmlformats.org/markup-compatibility/2006" xmlns:p159="http://schemas.microsoft.com/office/powerpoint/2015/09/main">
+    <mc:Choice Requires="p159">
       <p:transition xmlns:p14="http://schemas.microsoft.com/office/powerpoint/2010/main" spd="slow" p14:dur="2000">
         <p159:morph option="byObject"/>
       </p:transition>
     </mc:Choice>
-    <mc:Fallback>
+    <mc:Fallback xmlns="">
       <p:transition spd="slow">
         <p:fade/>
       </p:transition>
@@ -36147,7 +33482,6 @@
                 <a:lumMod val="90000"/>
               </a:schemeClr>
             </a:duotone>
-            <a:extLst/>
           </a:blip>
           <a:stretch/>
         </a:blipFill>
@@ -36292,7 +33626,7 @@
           </a:prstGeom>
         </p:spPr>
         <p:txBody>
-          <a:bodyPr vert="horz" lIns="91440" tIns="45720" rIns="91440" bIns="45720" rtlCol="0">
+          <a:bodyPr vert="horz" lIns="91440" tIns="45720" rIns="91440" bIns="45720" rtlCol="0" anchor="t">
             <a:normAutofit fontScale="85000" lnSpcReduction="10000"/>
           </a:bodyPr>
           <a:lstStyle>
@@ -36471,7 +33805,7 @@
           <a:p>
             <a:r>
               <a:rPr lang="en-US" sz="2100" b="1" dirty="0"/>
-              <a:t> </a:t>
+              <a:t> </a:t>
             </a:r>
             <a:r>
               <a:rPr lang="en-US" sz="2100" b="1" dirty="0" err="1"/>
@@ -36483,7 +33817,7 @@
             </a:r>
             <a:r>
               <a:rPr lang="en-US" sz="2000" dirty="0" err="1"/>
-              <a:t>problème</a:t>
+              <a:t>problèmes</a:t>
             </a:r>
             <a:r>
               <a:rPr lang="en-US" sz="2000" dirty="0"/>
@@ -36529,15 +33863,7 @@
           <a:p>
             <a:r>
               <a:rPr lang="en-US" sz="2100" b="1" dirty="0"/>
-              <a:t> </a:t>
-            </a:r>
-            <a:r>
-              <a:rPr lang="en-US" sz="2100" b="1" dirty="0" err="1"/>
-              <a:t>Sécurité</a:t>
-            </a:r>
-            <a:r>
-              <a:rPr lang="en-US" sz="2100" b="1" dirty="0"/>
-              <a:t> et </a:t>
+              <a:t> Sécurité et </a:t>
             </a:r>
             <a:r>
               <a:rPr lang="en-US" sz="2100" b="1" dirty="0" err="1"/>
@@ -36553,7 +33879,7 @@
             </a:r>
             <a:r>
               <a:rPr lang="en-US" sz="2100" b="1" dirty="0"/>
-              <a:t> : </a:t>
+              <a:t> : </a:t>
             </a:r>
           </a:p>
           <a:p>
@@ -36794,13 +34120,13 @@
   <p:clrMapOvr>
     <a:masterClrMapping/>
   </p:clrMapOvr>
-  <mc:AlternateContent xmlns:mc="http://schemas.openxmlformats.org/markup-compatibility/2006">
-    <mc:Choice xmlns:p159="http://schemas.microsoft.com/office/powerpoint/2015/09/main" Requires="p159">
+  <mc:AlternateContent xmlns:mc="http://schemas.openxmlformats.org/markup-compatibility/2006" xmlns:p159="http://schemas.microsoft.com/office/powerpoint/2015/09/main">
+    <mc:Choice Requires="p159">
       <p:transition xmlns:p14="http://schemas.microsoft.com/office/powerpoint/2010/main" spd="slow" p14:dur="2000">
         <p159:morph option="byObject"/>
       </p:transition>
     </mc:Choice>
-    <mc:Fallback>
+    <mc:Fallback xmlns="">
       <p:transition spd="slow">
         <p:fade/>
       </p:transition>
@@ -36878,7 +34204,7 @@
           </a:xfrm>
         </p:spPr>
         <p:txBody>
-          <a:bodyPr>
+          <a:bodyPr vert="horz" lIns="91440" tIns="45720" rIns="91440" bIns="45720" rtlCol="0" anchor="t">
             <a:normAutofit fontScale="92500" lnSpcReduction="10000"/>
           </a:bodyPr>
           <a:lstStyle/>
@@ -36912,7 +34238,7 @@
             </a:pPr>
             <a:r>
               <a:rPr lang="fr-FR" dirty="0"/>
-              <a:t>  Niveau de disponibilité de 99 à 99,999%, quel temps d’interruption de service peut-on subir sans risque majeur pour l’activité de l’entreprise ?</a:t>
+              <a:t>  Niveau de disponibilité de 98 à 99,999%, quel temps d’interruption de service peut-on subir sans risque majeur pour l’activité de l’entreprise ?</a:t>
             </a:r>
           </a:p>
           <a:p>
@@ -36951,12 +34277,8 @@
               <a:buChar char="Ø"/>
             </a:pPr>
             <a:r>
-              <a:rPr lang="fr-FR"/>
-              <a:t> La</a:t>
-            </a:r>
-            <a:r>
               <a:rPr lang="fr-FR" dirty="0"/>
-              <a:t> </a:t>
+              <a:t> La </a:t>
             </a:r>
             <a:r>
               <a:rPr lang="fr-FR" b="1" dirty="0"/>
@@ -37007,13 +34329,13 @@
   <p:clrMapOvr>
     <a:masterClrMapping/>
   </p:clrMapOvr>
-  <mc:AlternateContent xmlns:mc="http://schemas.openxmlformats.org/markup-compatibility/2006">
-    <mc:Choice xmlns:p159="http://schemas.microsoft.com/office/powerpoint/2015/09/main" Requires="p159">
+  <mc:AlternateContent xmlns:mc="http://schemas.openxmlformats.org/markup-compatibility/2006" xmlns:p159="http://schemas.microsoft.com/office/powerpoint/2015/09/main">
+    <mc:Choice Requires="p159">
       <p:transition xmlns:p14="http://schemas.microsoft.com/office/powerpoint/2010/main" spd="slow" p14:dur="2000">
         <p159:morph option="byObject"/>
       </p:transition>
     </mc:Choice>
-    <mc:Fallback>
+    <mc:Fallback xmlns="">
       <p:transition spd="slow">
         <p:fade/>
       </p:transition>
@@ -37086,7 +34408,7 @@
         </p:nvSpPr>
         <p:spPr/>
         <p:txBody>
-          <a:bodyPr>
+          <a:bodyPr vert="horz" lIns="91440" tIns="45720" rIns="91440" bIns="45720" rtlCol="0" anchor="t">
             <a:normAutofit fontScale="92500"/>
           </a:bodyPr>
           <a:lstStyle/>
@@ -37156,15 +34478,7 @@
             </a:pPr>
             <a:r>
               <a:rPr lang="fr-FR" dirty="0"/>
-              <a:t> Quelles sont les garanties que le fournisseur </a:t>
-            </a:r>
-            <a:r>
-              <a:rPr lang="fr-FR" dirty="0" err="1"/>
-              <a:t>proprose</a:t>
-            </a:r>
-            <a:r>
-              <a:rPr lang="fr-FR" dirty="0"/>
-              <a:t> ?</a:t>
+              <a:t> Quelles sont les garanties que le fournisseur propose ?</a:t>
             </a:r>
             <a:br>
               <a:rPr lang="fr-FR" dirty="0"/>
@@ -37226,13 +34540,13 @@
   <p:clrMapOvr>
     <a:masterClrMapping/>
   </p:clrMapOvr>
-  <mc:AlternateContent xmlns:mc="http://schemas.openxmlformats.org/markup-compatibility/2006">
-    <mc:Choice xmlns:p14="http://schemas.microsoft.com/office/powerpoint/2010/main" Requires="p14">
+  <mc:AlternateContent xmlns:mc="http://schemas.openxmlformats.org/markup-compatibility/2006" xmlns:p14="http://schemas.microsoft.com/office/powerpoint/2010/main">
+    <mc:Choice Requires="p14">
       <p:transition spd="med" p14:dur="700">
         <p:fade/>
       </p:transition>
     </mc:Choice>
-    <mc:Fallback>
+    <mc:Fallback xmlns="">
       <p:transition spd="med">
         <p:fade/>
       </p:transition>
@@ -37413,13 +34727,13 @@
   <p:clrMapOvr>
     <a:masterClrMapping/>
   </p:clrMapOvr>
-  <mc:AlternateContent xmlns:mc="http://schemas.openxmlformats.org/markup-compatibility/2006">
-    <mc:Choice xmlns:p14="http://schemas.microsoft.com/office/powerpoint/2010/main" Requires="p14">
+  <mc:AlternateContent xmlns:mc="http://schemas.openxmlformats.org/markup-compatibility/2006" xmlns:p14="http://schemas.microsoft.com/office/powerpoint/2010/main">
+    <mc:Choice Requires="p14">
       <p:transition spd="med" p14:dur="700">
         <p:fade/>
       </p:transition>
     </mc:Choice>
-    <mc:Fallback>
+    <mc:Fallback xmlns="">
       <p:transition spd="med">
         <p:fade/>
       </p:transition>
@@ -37627,13 +34941,13 @@
   <p:clrMapOvr>
     <a:masterClrMapping/>
   </p:clrMapOvr>
-  <mc:AlternateContent xmlns:mc="http://schemas.openxmlformats.org/markup-compatibility/2006">
-    <mc:Choice xmlns:p159="http://schemas.microsoft.com/office/powerpoint/2015/09/main" Requires="p159">
+  <mc:AlternateContent xmlns:mc="http://schemas.openxmlformats.org/markup-compatibility/2006" xmlns:p159="http://schemas.microsoft.com/office/powerpoint/2015/09/main">
+    <mc:Choice Requires="p159">
       <p:transition xmlns:p14="http://schemas.microsoft.com/office/powerpoint/2010/main" spd="slow" p14:dur="2000">
         <p159:morph option="byObject"/>
       </p:transition>
     </mc:Choice>
-    <mc:Fallback>
+    <mc:Fallback xmlns="">
       <p:transition spd="slow">
         <p:fade/>
       </p:transition>
@@ -37784,7 +35098,7 @@
             </a:pPr>
             <a:r>
               <a:rPr lang="fr-FR" sz="2000" dirty="0"/>
-              <a:t>Certains fournisseurs se sont lancés dans le Green Cloud pour palier aux problèmes écologiques que génèrent le Cloud </a:t>
+              <a:t>Certains fournisseurs se sont lancés dans le Green Cloud pour pallier aux problèmes écologiques que génèrent le Cloud </a:t>
             </a:r>
             <a:r>
               <a:rPr lang="fr-FR" sz="2000" dirty="0" err="1"/>
@@ -37848,13 +35162,13 @@
   <p:clrMapOvr>
     <a:masterClrMapping/>
   </p:clrMapOvr>
-  <mc:AlternateContent xmlns:mc="http://schemas.openxmlformats.org/markup-compatibility/2006">
-    <mc:Choice xmlns:p159="http://schemas.microsoft.com/office/powerpoint/2015/09/main" Requires="p159">
+  <mc:AlternateContent xmlns:mc="http://schemas.openxmlformats.org/markup-compatibility/2006" xmlns:p159="http://schemas.microsoft.com/office/powerpoint/2015/09/main">
+    <mc:Choice Requires="p159">
       <p:transition xmlns:p14="http://schemas.microsoft.com/office/powerpoint/2010/main" spd="slow" p14:dur="2000">
         <p159:morph option="byObject"/>
       </p:transition>
     </mc:Choice>
-    <mc:Fallback>
+    <mc:Fallback xmlns="">
       <p:transition spd="slow">
         <p:fade/>
       </p:transition>
@@ -38087,7 +35401,6 @@
           <a:effectLst>
             <a:reflection blurRad="12700" stA="38000" endPos="28000" dist="5000" dir="5400000" sy="-100000" algn="bl" rotWithShape="0"/>
           </a:effectLst>
-          <a:extLst/>
         </p:spPr>
       </p:pic>
     </p:spTree>
@@ -38100,13 +35413,13 @@
   <p:clrMapOvr>
     <a:masterClrMapping/>
   </p:clrMapOvr>
-  <mc:AlternateContent xmlns:mc="http://schemas.openxmlformats.org/markup-compatibility/2006">
-    <mc:Choice xmlns:p14="http://schemas.microsoft.com/office/powerpoint/2010/main" Requires="p14">
+  <mc:AlternateContent xmlns:mc="http://schemas.openxmlformats.org/markup-compatibility/2006" xmlns:p14="http://schemas.microsoft.com/office/powerpoint/2010/main">
+    <mc:Choice Requires="p14">
       <p:transition spd="med" p14:dur="700">
         <p:fade/>
       </p:transition>
     </mc:Choice>
-    <mc:Fallback>
+    <mc:Fallback xmlns="">
       <p:transition spd="med">
         <p:fade/>
       </p:transition>
@@ -38305,13 +35618,13 @@
   <p:clrMapOvr>
     <a:masterClrMapping/>
   </p:clrMapOvr>
-  <mc:AlternateContent xmlns:mc="http://schemas.openxmlformats.org/markup-compatibility/2006">
-    <mc:Choice xmlns:p14="http://schemas.microsoft.com/office/powerpoint/2010/main" Requires="p14">
+  <mc:AlternateContent xmlns:mc="http://schemas.openxmlformats.org/markup-compatibility/2006" xmlns:p14="http://schemas.microsoft.com/office/powerpoint/2010/main">
+    <mc:Choice Requires="p14">
       <p:transition spd="slow" p14:dur="1300">
         <p14:pan dir="u"/>
       </p:transition>
     </mc:Choice>
-    <mc:Fallback>
+    <mc:Fallback xmlns="">
       <p:transition spd="slow">
         <p:fade/>
       </p:transition>
@@ -38835,13 +36148,13 @@
   <p:clrMapOvr>
     <a:masterClrMapping/>
   </p:clrMapOvr>
-  <mc:AlternateContent xmlns:mc="http://schemas.openxmlformats.org/markup-compatibility/2006">
-    <mc:Choice xmlns:p14="http://schemas.microsoft.com/office/powerpoint/2010/main" Requires="p14">
+  <mc:AlternateContent xmlns:mc="http://schemas.openxmlformats.org/markup-compatibility/2006" xmlns:p14="http://schemas.microsoft.com/office/powerpoint/2010/main">
+    <mc:Choice Requires="p14">
       <p:transition spd="slow" p14:dur="1300">
         <p14:pan dir="u"/>
       </p:transition>
     </mc:Choice>
-    <mc:Fallback>
+    <mc:Fallback xmlns="">
       <p:transition spd="slow">
         <p:fade/>
       </p:transition>
@@ -39459,13 +36772,13 @@
   <p:clrMapOvr>
     <a:masterClrMapping/>
   </p:clrMapOvr>
-  <mc:AlternateContent xmlns:mc="http://schemas.openxmlformats.org/markup-compatibility/2006">
-    <mc:Choice xmlns:p14="http://schemas.microsoft.com/office/powerpoint/2010/main" Requires="p14">
+  <mc:AlternateContent xmlns:mc="http://schemas.openxmlformats.org/markup-compatibility/2006" xmlns:p14="http://schemas.microsoft.com/office/powerpoint/2010/main">
+    <mc:Choice Requires="p14">
       <p:transition spd="slow" p14:dur="1300">
         <p14:pan dir="u"/>
       </p:transition>
     </mc:Choice>
-    <mc:Fallback>
+    <mc:Fallback xmlns="">
       <p:transition spd="slow">
         <p:fade/>
       </p:transition>
@@ -39495,7 +36808,6 @@
                 <a:lumMod val="90000"/>
               </a:schemeClr>
             </a:duotone>
-            <a:extLst/>
           </a:blip>
           <a:stretch/>
         </a:blipFill>
@@ -39668,15 +36980,6 @@
               <a:srgbClr val="FFFFFF"/>
             </a:contourClr>
           </a:sp3d>
-          <a:extLst>
-            <a:ext uri="{909E8E84-426E-40DD-AFC4-6F175D3DCCD1}">
-              <a14:hiddenFill xmlns:a14="http://schemas.microsoft.com/office/drawing/2010/main">
-                <a:solidFill>
-                  <a:srgbClr val="FFFFFF"/>
-                </a:solidFill>
-              </a14:hiddenFill>
-            </a:ext>
-          </a:extLst>
         </p:spPr>
       </p:pic>
     </p:spTree>
@@ -39689,13 +36992,13 @@
   <p:clrMapOvr>
     <a:masterClrMapping/>
   </p:clrMapOvr>
-  <mc:AlternateContent xmlns:mc="http://schemas.openxmlformats.org/markup-compatibility/2006">
-    <mc:Choice xmlns:p159="http://schemas.microsoft.com/office/powerpoint/2015/09/main" Requires="p159">
+  <mc:AlternateContent xmlns:mc="http://schemas.openxmlformats.org/markup-compatibility/2006" xmlns:p159="http://schemas.microsoft.com/office/powerpoint/2015/09/main">
+    <mc:Choice Requires="p159">
       <p:transition xmlns:p14="http://schemas.microsoft.com/office/powerpoint/2010/main" spd="slow" p14:dur="2000">
         <p159:morph option="byObject"/>
       </p:transition>
     </mc:Choice>
-    <mc:Fallback>
+    <mc:Fallback xmlns="">
       <p:transition spd="slow">
         <p:fade/>
       </p:transition>
@@ -39832,13 +37135,13 @@
   <p:clrMapOvr>
     <a:masterClrMapping/>
   </p:clrMapOvr>
-  <mc:AlternateContent xmlns:mc="http://schemas.openxmlformats.org/markup-compatibility/2006">
-    <mc:Choice xmlns:p14="http://schemas.microsoft.com/office/powerpoint/2010/main" Requires="p14">
+  <mc:AlternateContent xmlns:mc="http://schemas.openxmlformats.org/markup-compatibility/2006" xmlns:p14="http://schemas.microsoft.com/office/powerpoint/2010/main">
+    <mc:Choice Requires="p14">
       <p:transition spd="med" p14:dur="700">
         <p:fade/>
       </p:transition>
     </mc:Choice>
-    <mc:Fallback>
+    <mc:Fallback xmlns="">
       <p:transition spd="med">
         <p:fade/>
       </p:transition>
@@ -40275,13 +37578,13 @@
   <p:clrMapOvr>
     <a:masterClrMapping/>
   </p:clrMapOvr>
-  <mc:AlternateContent xmlns:mc="http://schemas.openxmlformats.org/markup-compatibility/2006">
-    <mc:Choice xmlns:p14="http://schemas.microsoft.com/office/powerpoint/2010/main" Requires="p14">
+  <mc:AlternateContent xmlns:mc="http://schemas.openxmlformats.org/markup-compatibility/2006" xmlns:p14="http://schemas.microsoft.com/office/powerpoint/2010/main">
+    <mc:Choice Requires="p14">
       <p:transition spd="med" p14:dur="700">
         <p:fade/>
       </p:transition>
     </mc:Choice>
-    <mc:Fallback>
+    <mc:Fallback xmlns="">
       <p:transition spd="med">
         <p:fade/>
       </p:transition>
@@ -40311,7 +37614,6 @@
                 <a:lumMod val="150000"/>
               </a:schemeClr>
             </a:duotone>
-            <a:extLst/>
           </a:blip>
           <a:stretch/>
         </a:blipFill>
@@ -40385,7 +37687,7 @@
           </a:xfrm>
         </p:spPr>
         <p:txBody>
-          <a:bodyPr vert="horz" lIns="91440" tIns="45720" rIns="91440" bIns="45720" rtlCol="0">
+          <a:bodyPr vert="horz" lIns="91440" tIns="45720" rIns="91440" bIns="45720" rtlCol="0" anchor="t">
             <a:normAutofit/>
           </a:bodyPr>
           <a:lstStyle/>
@@ -40398,8 +37700,8 @@
               <a:buChar char="§"/>
             </a:pPr>
             <a:r>
-              <a:rPr lang="fr-FR" sz="1600" dirty="0"/>
-              <a:t>  Le plus populaire</a:t>
+              <a:rPr lang="fr-FR" sz="2000" dirty="0"/>
+              <a:t>  Le plus populaire</a:t>
             </a:r>
           </a:p>
           <a:p>
@@ -40411,8 +37713,8 @@
               <a:buChar char="§"/>
             </a:pPr>
             <a:r>
-              <a:rPr lang="fr-FR" sz="1600" dirty="0"/>
-              <a:t>  Services fournis dans un environnement virtualisé (utilisant les ressources physiques de machines en réseau)</a:t>
+              <a:rPr lang="fr-FR" sz="2000" dirty="0"/>
+              <a:t>  Fournit des services à des clients multiples en utilisant la même infrastructure partagée.</a:t>
             </a:r>
           </a:p>
           <a:p>
@@ -40424,21 +37726,8 @@
               <a:buChar char="§"/>
             </a:pPr>
             <a:r>
-              <a:rPr lang="fr-FR" sz="1600" dirty="0"/>
-              <a:t>  Fournit des services à des clients multiples en utilisant la même infrastructure partagée.</a:t>
-            </a:r>
-          </a:p>
-          <a:p>
-            <a:pPr>
-              <a:lnSpc>
-                <a:spcPct val="110000"/>
-              </a:lnSpc>
-              <a:buFont typeface="Wingdings" panose="05000000000000000000" pitchFamily="2" charset="2"/>
-              <a:buChar char="§"/>
-            </a:pPr>
-            <a:r>
-              <a:rPr lang="fr-FR" sz="1600" dirty="0"/>
-              <a:t>  Propose différents types de services.</a:t>
+              <a:rPr lang="fr-FR" sz="2000" dirty="0"/>
+              <a:t>  Propose différents types de services.</a:t>
             </a:r>
           </a:p>
         </p:txBody>
@@ -40503,15 +37792,6 @@
               <a:srgbClr val="C0C0C0"/>
             </a:contourClr>
           </a:sp3d>
-          <a:extLst>
-            <a:ext uri="{909E8E84-426E-40DD-AFC4-6F175D3DCCD1}">
-              <a14:hiddenFill xmlns:a14="http://schemas.microsoft.com/office/drawing/2010/main">
-                <a:solidFill>
-                  <a:srgbClr val="FFFFFF"/>
-                </a:solidFill>
-              </a14:hiddenFill>
-            </a:ext>
-          </a:extLst>
         </p:spPr>
       </p:pic>
     </p:spTree>
@@ -40524,13 +37804,13 @@
   <p:clrMapOvr>
     <a:masterClrMapping/>
   </p:clrMapOvr>
-  <mc:AlternateContent xmlns:mc="http://schemas.openxmlformats.org/markup-compatibility/2006">
-    <mc:Choice xmlns:p159="http://schemas.microsoft.com/office/powerpoint/2015/09/main" Requires="p159">
+  <mc:AlternateContent xmlns:mc="http://schemas.openxmlformats.org/markup-compatibility/2006" xmlns:p159="http://schemas.microsoft.com/office/powerpoint/2015/09/main">
+    <mc:Choice Requires="p159">
       <p:transition xmlns:p14="http://schemas.microsoft.com/office/powerpoint/2010/main" spd="slow" p14:dur="2000">
         <p159:morph option="byObject"/>
       </p:transition>
     </mc:Choice>
-    <mc:Fallback>
+    <mc:Fallback xmlns="">
       <p:transition spd="slow">
         <p:fade/>
       </p:transition>
@@ -40560,7 +37840,6 @@
                 <a:lumMod val="90000"/>
               </a:schemeClr>
             </a:duotone>
-            <a:extLst/>
           </a:blip>
           <a:stretch/>
         </a:blipFill>
@@ -40646,13 +37925,13 @@
   <p:clrMapOvr>
     <a:masterClrMapping/>
   </p:clrMapOvr>
-  <mc:AlternateContent xmlns:mc="http://schemas.openxmlformats.org/markup-compatibility/2006">
-    <mc:Choice xmlns:p14="http://schemas.microsoft.com/office/powerpoint/2010/main" Requires="p14">
+  <mc:AlternateContent xmlns:mc="http://schemas.openxmlformats.org/markup-compatibility/2006" xmlns:p14="http://schemas.microsoft.com/office/powerpoint/2010/main">
+    <mc:Choice Requires="p14">
       <p:transition spd="med" p14:dur="700">
         <p:fade/>
       </p:transition>
     </mc:Choice>
-    <mc:Fallback>
+    <mc:Fallback xmlns="">
       <p:transition spd="med">
         <p:fade/>
       </p:transition>
@@ -40682,7 +37961,6 @@
                 <a:lumMod val="150000"/>
               </a:schemeClr>
             </a:duotone>
-            <a:extLst/>
           </a:blip>
           <a:stretch/>
         </a:blipFill>
@@ -40756,7 +38034,7 @@
           </a:xfrm>
         </p:spPr>
         <p:txBody>
-          <a:bodyPr vert="horz" lIns="91440" tIns="45720" rIns="91440" bIns="45720" rtlCol="0">
+          <a:bodyPr vert="horz" lIns="91440" tIns="45720" rIns="91440" bIns="45720" rtlCol="0" anchor="t">
             <a:normAutofit/>
           </a:bodyPr>
           <a:lstStyle/>
@@ -40770,21 +38048,9 @@
             </a:pPr>
             <a:r>
               <a:rPr lang="fr-FR" sz="2000" dirty="0"/>
-              <a:t>  Constitué d'un environnement distinct &amp; sécurisé dédié à un seul client.</a:t>
-            </a:r>
-          </a:p>
-          <a:p>
-            <a:pPr>
-              <a:lnSpc>
-                <a:spcPct val="110000"/>
-              </a:lnSpc>
-              <a:buFont typeface="Wingdings" panose="05000000000000000000" pitchFamily="2" charset="2"/>
-              <a:buChar char="§"/>
-            </a:pPr>
-            <a:r>
-              <a:rPr lang="fr-FR" sz="2000" dirty="0"/>
-              <a:t>  Services fournis dans un environnement virtualisé (utilisant les ressources physiques de machines en réseau).</a:t>
-            </a:r>
+              <a:t>  Constitué d'un environnement distinct &amp; sécurisé dédié à un seul client.</a:t>
+            </a:r>
+            <a:endParaRPr lang="fr-FR" dirty="0"/>
           </a:p>
         </p:txBody>
       </p:sp>
@@ -40848,15 +38114,6 @@
               <a:srgbClr val="C0C0C0"/>
             </a:contourClr>
           </a:sp3d>
-          <a:extLst>
-            <a:ext uri="{909E8E84-426E-40DD-AFC4-6F175D3DCCD1}">
-              <a14:hiddenFill xmlns:a14="http://schemas.microsoft.com/office/drawing/2010/main">
-                <a:solidFill>
-                  <a:srgbClr val="FFFFFF"/>
-                </a:solidFill>
-              </a14:hiddenFill>
-            </a:ext>
-          </a:extLst>
         </p:spPr>
       </p:pic>
     </p:spTree>
@@ -40869,13 +38126,13 @@
   <p:clrMapOvr>
     <a:masterClrMapping/>
   </p:clrMapOvr>
-  <mc:AlternateContent xmlns:mc="http://schemas.openxmlformats.org/markup-compatibility/2006">
-    <mc:Choice xmlns:p159="http://schemas.microsoft.com/office/powerpoint/2015/09/main" Requires="p159">
+  <mc:AlternateContent xmlns:mc="http://schemas.openxmlformats.org/markup-compatibility/2006" xmlns:p159="http://schemas.microsoft.com/office/powerpoint/2015/09/main">
+    <mc:Choice Requires="p159">
       <p:transition xmlns:p14="http://schemas.microsoft.com/office/powerpoint/2010/main" spd="slow" p14:dur="2000">
         <p159:morph option="byObject"/>
       </p:transition>
     </mc:Choice>
-    <mc:Fallback>
+    <mc:Fallback xmlns="">
       <p:transition spd="slow">
         <p:fade/>
       </p:transition>

</xml_diff>